<commit_message>
Update atopic diseases poster.pptx
</commit_message>
<xml_diff>
--- a/atopic diseases poster.pptx
+++ b/atopic diseases poster.pptx
@@ -770,20 +770,6 @@
 </pc:chgInfo>
 </file>
 
-<file path=ppt/comments/comment1.xml><?xml version="1.0" encoding="utf-8"?>
-<p:cmLst xmlns:a="http://schemas.openxmlformats.org/drawingml/2006/main" xmlns:r="http://schemas.openxmlformats.org/officeDocument/2006/relationships" xmlns:p="http://schemas.openxmlformats.org/presentationml/2006/main">
-  <p:cm authorId="1" dt="2023-06-16T09:06:03.450" idx="8">
-    <p:pos x="2880" y="18344"/>
-    <p:text>Instead of text use a formula. You can use two formulas, one for the standard and the 2nd for the GAM</p:text>
-    <p:extLst>
-      <p:ext uri="{C676402C-5697-4E1C-873F-D02D1690AC5C}">
-        <p15:threadingInfo xmlns:p15="http://schemas.microsoft.com/office/powerpoint/2012/main" timeZoneBias="-180"/>
-      </p:ext>
-    </p:extLst>
-  </p:cm>
-</p:cmLst>
-</file>
-
 <file path=ppt/notesMasters/notesMaster1.xml><?xml version="1.0" encoding="utf-8"?>
 <p:notesMaster xmlns:a="http://schemas.openxmlformats.org/drawingml/2006/main" xmlns:r="http://schemas.openxmlformats.org/officeDocument/2006/relationships" xmlns:p="http://schemas.openxmlformats.org/presentationml/2006/main">
   <p:cSld>
@@ -866,7 +852,7 @@
           <a:p>
             <a:fld id="{CFC00A23-1BFE-4A7E-A521-7B2182A093B7}" type="datetimeFigureOut">
               <a:rPr lang="he-IL" smtClean="0"/>
-              <a:t>כ"ז/סיון/תשפ"ג</a:t>
+              <a:t>כ"ח/סיון/תשפ"ג</a:t>
             </a:fld>
             <a:endParaRPr lang="he-IL"/>
           </a:p>
@@ -1265,7 +1251,7 @@
           <a:p>
             <a:fld id="{449B0C55-391A-4BA7-BF59-0A370099757C}" type="datetimeFigureOut">
               <a:rPr lang="he-IL" smtClean="0"/>
-              <a:t>כ"ז/סיון/תשפ"ג</a:t>
+              <a:t>כ"ח/סיון/תשפ"ג</a:t>
             </a:fld>
             <a:endParaRPr lang="he-IL"/>
           </a:p>
@@ -1435,7 +1421,7 @@
           <a:p>
             <a:fld id="{449B0C55-391A-4BA7-BF59-0A370099757C}" type="datetimeFigureOut">
               <a:rPr lang="he-IL" smtClean="0"/>
-              <a:t>כ"ז/סיון/תשפ"ג</a:t>
+              <a:t>כ"ח/סיון/תשפ"ג</a:t>
             </a:fld>
             <a:endParaRPr lang="he-IL"/>
           </a:p>
@@ -1615,7 +1601,7 @@
           <a:p>
             <a:fld id="{449B0C55-391A-4BA7-BF59-0A370099757C}" type="datetimeFigureOut">
               <a:rPr lang="he-IL" smtClean="0"/>
-              <a:t>כ"ז/סיון/תשפ"ג</a:t>
+              <a:t>כ"ח/סיון/תשפ"ג</a:t>
             </a:fld>
             <a:endParaRPr lang="he-IL"/>
           </a:p>
@@ -1785,7 +1771,7 @@
           <a:p>
             <a:fld id="{449B0C55-391A-4BA7-BF59-0A370099757C}" type="datetimeFigureOut">
               <a:rPr lang="he-IL" smtClean="0"/>
-              <a:t>כ"ז/סיון/תשפ"ג</a:t>
+              <a:t>כ"ח/סיון/תשפ"ג</a:t>
             </a:fld>
             <a:endParaRPr lang="he-IL"/>
           </a:p>
@@ -2029,7 +2015,7 @@
           <a:p>
             <a:fld id="{449B0C55-391A-4BA7-BF59-0A370099757C}" type="datetimeFigureOut">
               <a:rPr lang="he-IL" smtClean="0"/>
-              <a:t>כ"ז/סיון/תשפ"ג</a:t>
+              <a:t>כ"ח/סיון/תשפ"ג</a:t>
             </a:fld>
             <a:endParaRPr lang="he-IL"/>
           </a:p>
@@ -2261,7 +2247,7 @@
           <a:p>
             <a:fld id="{449B0C55-391A-4BA7-BF59-0A370099757C}" type="datetimeFigureOut">
               <a:rPr lang="he-IL" smtClean="0"/>
-              <a:t>כ"ז/סיון/תשפ"ג</a:t>
+              <a:t>כ"ח/סיון/תשפ"ג</a:t>
             </a:fld>
             <a:endParaRPr lang="he-IL"/>
           </a:p>
@@ -2628,7 +2614,7 @@
           <a:p>
             <a:fld id="{449B0C55-391A-4BA7-BF59-0A370099757C}" type="datetimeFigureOut">
               <a:rPr lang="he-IL" smtClean="0"/>
-              <a:t>כ"ז/סיון/תשפ"ג</a:t>
+              <a:t>כ"ח/סיון/תשפ"ג</a:t>
             </a:fld>
             <a:endParaRPr lang="he-IL"/>
           </a:p>
@@ -2746,7 +2732,7 @@
           <a:p>
             <a:fld id="{449B0C55-391A-4BA7-BF59-0A370099757C}" type="datetimeFigureOut">
               <a:rPr lang="he-IL" smtClean="0"/>
-              <a:t>כ"ז/סיון/תשפ"ג</a:t>
+              <a:t>כ"ח/סיון/תשפ"ג</a:t>
             </a:fld>
             <a:endParaRPr lang="he-IL"/>
           </a:p>
@@ -2841,7 +2827,7 @@
           <a:p>
             <a:fld id="{449B0C55-391A-4BA7-BF59-0A370099757C}" type="datetimeFigureOut">
               <a:rPr lang="he-IL" smtClean="0"/>
-              <a:t>כ"ז/סיון/תשפ"ג</a:t>
+              <a:t>כ"ח/סיון/תשפ"ג</a:t>
             </a:fld>
             <a:endParaRPr lang="he-IL"/>
           </a:p>
@@ -3118,7 +3104,7 @@
           <a:p>
             <a:fld id="{449B0C55-391A-4BA7-BF59-0A370099757C}" type="datetimeFigureOut">
               <a:rPr lang="he-IL" smtClean="0"/>
-              <a:t>כ"ז/סיון/תשפ"ג</a:t>
+              <a:t>כ"ח/סיון/תשפ"ג</a:t>
             </a:fld>
             <a:endParaRPr lang="he-IL"/>
           </a:p>
@@ -3375,7 +3361,7 @@
           <a:p>
             <a:fld id="{449B0C55-391A-4BA7-BF59-0A370099757C}" type="datetimeFigureOut">
               <a:rPr lang="he-IL" smtClean="0"/>
-              <a:t>כ"ז/סיון/תשפ"ג</a:t>
+              <a:t>כ"ח/סיון/תשפ"ג</a:t>
             </a:fld>
             <a:endParaRPr lang="he-IL"/>
           </a:p>
@@ -3588,7 +3574,7 @@
           <a:p>
             <a:fld id="{449B0C55-391A-4BA7-BF59-0A370099757C}" type="datetimeFigureOut">
               <a:rPr lang="he-IL" smtClean="0"/>
-              <a:t>כ"ז/סיון/תשפ"ג</a:t>
+              <a:t>כ"ח/סיון/תשפ"ג</a:t>
             </a:fld>
             <a:endParaRPr lang="he-IL"/>
           </a:p>
@@ -4290,14 +4276,14 @@
           <p:nvPr>
             <p:extLst>
               <p:ext uri="{D42A27DB-BD31-4B8C-83A1-F6EECF244321}">
-                <p14:modId xmlns:p14="http://schemas.microsoft.com/office/powerpoint/2010/main" val="202566197"/>
+                <p14:modId xmlns:p14="http://schemas.microsoft.com/office/powerpoint/2010/main" val="3777460287"/>
               </p:ext>
             </p:extLst>
           </p:nvPr>
         </p:nvGraphicFramePr>
         <p:xfrm>
-          <a:off x="64869" y="4863700"/>
-          <a:ext cx="13680000" cy="5149215"/>
+          <a:off x="64869" y="4863702"/>
+          <a:ext cx="13708875" cy="5149215"/>
         </p:xfrm>
         <a:graphic>
           <a:graphicData uri="http://schemas.openxmlformats.org/drawingml/2006/table">
@@ -4306,7 +4292,7 @@
                 <a:tableStyleId>{F5AB1C69-6EDB-4FF4-983F-18BD219EF322}</a:tableStyleId>
               </a:tblPr>
               <a:tblGrid>
-                <a:gridCol w="13680000">
+                <a:gridCol w="13708875">
                   <a:extLst>
                     <a:ext uri="{9D8B030D-6E8A-4147-A177-3AD203B41FA5}">
                       <a16:colId xmlns:a16="http://schemas.microsoft.com/office/drawing/2014/main" val="3747045786"/>
@@ -4314,7 +4300,7 @@
                   </a:extLst>
                 </a:gridCol>
               </a:tblGrid>
-              <a:tr h="720000">
+              <a:tr h="718521">
                 <a:tc>
                   <a:txBody>
                     <a:bodyPr/>
@@ -4329,7 +4315,7 @@
                         <a:rPr lang="en-US" sz="3200" dirty="0">
                           <a:latin typeface="+mj-lt"/>
                         </a:rPr>
-                        <a:t>Background</a:t>
+                        <a:t>Background and previous studies</a:t>
                       </a:r>
                       <a:endParaRPr lang="he-IL" sz="3200" dirty="0">
                         <a:latin typeface="+mj-lt"/>
@@ -4381,80 +4367,97 @@
                   </a:ext>
                 </a:extLst>
               </a:tr>
-              <a:tr h="1984992">
+              <a:tr h="4252882">
                 <a:tc>
                   <a:txBody>
                     <a:bodyPr/>
                     <a:lstStyle/>
                     <a:p>
-                      <a:pPr marL="0" indent="0" algn="l" rtl="0">
+                      <a:pPr marL="0" marR="0" lvl="0" indent="0" algn="l" defTabSz="2951958" rtl="0" eaLnBrk="1" fontAlgn="auto" latinLnBrk="0" hangingPunct="1">
                         <a:lnSpc>
                           <a:spcPct val="150000"/>
                         </a:lnSpc>
+                        <a:spcBef>
+                          <a:spcPts val="0"/>
+                        </a:spcBef>
+                        <a:spcAft>
+                          <a:spcPts val="0"/>
+                        </a:spcAft>
+                        <a:buClrTx/>
+                        <a:buSzTx/>
                         <a:buFont typeface="Arial" panose="020B0604020202020204" pitchFamily="34" charset="0"/>
                         <a:buNone/>
+                        <a:tabLst/>
+                        <a:defRPr/>
                       </a:pPr>
+                      <a:r>
+                        <a:rPr lang="en-US" sz="3200" b="1" kern="1200" dirty="0">
+                          <a:solidFill>
+                            <a:schemeClr val="dk1"/>
+                          </a:solidFill>
+                          <a:latin typeface="+mj-lt"/>
+                          <a:ea typeface="+mn-ea"/>
+                          <a:cs typeface="+mn-cs"/>
+                        </a:rPr>
+                        <a:t>Background: </a:t>
+                      </a:r>
+                      <a:r>
+                        <a:rPr lang="en-US" sz="3200" kern="1200" dirty="0">
+                          <a:solidFill>
+                            <a:schemeClr val="dk1"/>
+                          </a:solidFill>
+                          <a:latin typeface="+mj-lt"/>
+                          <a:ea typeface="+mn-ea"/>
+                          <a:cs typeface="+mn-cs"/>
+                        </a:rPr>
+                        <a:t>Atopy is a type of allergy. Two main causes are genetics and hygiene- lack of exposure to antigens in childhood. The pandemic created a special situation for investigation the last.</a:t>
+                      </a:r>
+                    </a:p>
+                    <a:p>
+                      <a:pPr marL="0" marR="0" lvl="0" indent="0" algn="l" defTabSz="2951958" rtl="0" eaLnBrk="1" fontAlgn="auto" latinLnBrk="0" hangingPunct="1">
+                        <a:lnSpc>
+                          <a:spcPct val="150000"/>
+                        </a:lnSpc>
+                        <a:spcBef>
+                          <a:spcPts val="0"/>
+                        </a:spcBef>
+                        <a:spcAft>
+                          <a:spcPts val="0"/>
+                        </a:spcAft>
+                        <a:buClrTx/>
+                        <a:buSzTx/>
+                        <a:buFont typeface="Arial" panose="020B0604020202020204" pitchFamily="34" charset="0"/>
+                        <a:buNone/>
+                        <a:tabLst/>
+                        <a:defRPr/>
+                      </a:pPr>
+                      <a:r>
+                        <a:rPr lang="en-US" sz="3200" b="1" kern="1200" dirty="0">
+                          <a:solidFill>
+                            <a:schemeClr val="dk1"/>
+                          </a:solidFill>
+                          <a:latin typeface="+mj-lt"/>
+                          <a:ea typeface="+mn-ea"/>
+                          <a:cs typeface="+mn-cs"/>
+                        </a:rPr>
+                        <a:t>Previous studies: </a:t>
+                      </a:r>
+                      <a:r>
+                        <a:rPr lang="en-US" sz="3200" b="0" kern="1200" dirty="0">
+                          <a:solidFill>
+                            <a:schemeClr val="dk1"/>
+                          </a:solidFill>
+                          <a:latin typeface="+mj-lt"/>
+                          <a:ea typeface="+mn-ea"/>
+                          <a:cs typeface="+mn-cs"/>
+                        </a:rPr>
+                        <a:t>According to Israeli Ministry of Health, </a:t>
+                      </a:r>
                       <a:r>
                         <a:rPr lang="en-US" sz="3200" dirty="0">
                           <a:latin typeface="+mj-lt"/>
                         </a:rPr>
-                        <a:t>COVID-19 had increased hygiene awareness. </a:t>
-                      </a:r>
-                      <a:br>
-                        <a:rPr lang="en-US" sz="3200" dirty="0">
-                          <a:latin typeface="+mj-lt"/>
-                        </a:rPr>
-                      </a:br>
-                      <a:r>
-                        <a:rPr lang="en-US" sz="3200" dirty="0">
-                          <a:latin typeface="+mj-lt"/>
-                        </a:rPr>
-                        <a:t>Following the pandemic, several studies led to the following findings:</a:t>
-                      </a:r>
-                    </a:p>
-                    <a:p>
-                      <a:pPr marL="457200" indent="-457200" algn="l" rtl="0">
-                        <a:lnSpc>
-                          <a:spcPct val="150000"/>
-                        </a:lnSpc>
-                        <a:buFont typeface="Arial" panose="020B0604020202020204" pitchFamily="34" charset="0"/>
-                        <a:buChar char="•"/>
-                      </a:pPr>
-                      <a:r>
-                        <a:rPr lang="en-US" sz="3200" dirty="0">
-                          <a:latin typeface="+mj-lt"/>
-                        </a:rPr>
-                        <a:t>Social distance reduced the prevalence of pediatric non-COVID infections.</a:t>
-                      </a:r>
-                    </a:p>
-                    <a:p>
-                      <a:pPr marL="457200" indent="-457200" algn="l" rtl="0">
-                        <a:lnSpc>
-                          <a:spcPct val="150000"/>
-                        </a:lnSpc>
-                        <a:buFont typeface="Arial" panose="020B0604020202020204" pitchFamily="34" charset="0"/>
-                        <a:buChar char="•"/>
-                      </a:pPr>
-                      <a:r>
-                        <a:rPr lang="en-US" sz="3200" dirty="0">
-                          <a:latin typeface="+mj-lt"/>
-                        </a:rPr>
-                        <a:t>Infants born in the first peek had significantly less respiratory morbidity at the first year.  </a:t>
-                      </a:r>
-                    </a:p>
-                    <a:p>
-                      <a:pPr marL="457200" indent="-457200" algn="l" rtl="0">
-                        <a:lnSpc>
-                          <a:spcPct val="150000"/>
-                        </a:lnSpc>
-                        <a:buFont typeface="Arial" panose="020B0604020202020204" pitchFamily="34" charset="0"/>
-                        <a:buChar char="•"/>
-                      </a:pPr>
-                      <a:r>
-                        <a:rPr lang="en-US" sz="3200" dirty="0">
-                          <a:latin typeface="+mj-lt"/>
-                        </a:rPr>
-                        <a:t>creased pediatric viral infections following the 1st and 2nd lockdowns.</a:t>
+                        <a:t>COVID19 caused decrease in respiratory infections following the restrictions. It may explain research findings of low incidence of respiratory infections in babies born early in the pandemic.</a:t>
                       </a:r>
                     </a:p>
                   </a:txBody>
@@ -4531,14 +4534,14 @@
           <p:nvPr>
             <p:extLst>
               <p:ext uri="{D42A27DB-BD31-4B8C-83A1-F6EECF244321}">
-                <p14:modId xmlns:p14="http://schemas.microsoft.com/office/powerpoint/2010/main" val="2053013747"/>
+                <p14:modId xmlns:p14="http://schemas.microsoft.com/office/powerpoint/2010/main" val="3118121256"/>
               </p:ext>
             </p:extLst>
           </p:nvPr>
         </p:nvGraphicFramePr>
         <p:xfrm>
-          <a:off x="64869" y="10165881"/>
-          <a:ext cx="13680000" cy="4055814"/>
+          <a:off x="64869" y="10012914"/>
+          <a:ext cx="13682740" cy="2680891"/>
         </p:xfrm>
         <a:graphic>
           <a:graphicData uri="http://schemas.openxmlformats.org/drawingml/2006/table">
@@ -4547,7 +4550,7 @@
                 <a:tableStyleId>{F5AB1C69-6EDB-4FF4-983F-18BD219EF322}</a:tableStyleId>
               </a:tblPr>
               <a:tblGrid>
-                <a:gridCol w="13680000">
+                <a:gridCol w="13682740">
                   <a:extLst>
                     <a:ext uri="{9D8B030D-6E8A-4147-A177-3AD203B41FA5}">
                       <a16:colId xmlns:a16="http://schemas.microsoft.com/office/drawing/2014/main" val="3747045786"/>
@@ -4555,7 +4558,7 @@
                   </a:extLst>
                 </a:gridCol>
               </a:tblGrid>
-              <a:tr h="743164">
+              <a:tr h="745200">
                 <a:tc>
                   <a:txBody>
                     <a:bodyPr/>
@@ -4622,7 +4625,7 @@
                   </a:ext>
                 </a:extLst>
               </a:tr>
-              <a:tr h="1655797">
+              <a:tr h="1935691">
                 <a:tc>
                   <a:txBody>
                     <a:bodyPr/>
@@ -4644,16 +4647,8 @@
                           <a:ea typeface="+mn-ea"/>
                           <a:cs typeface="+mn-cs"/>
                         </a:rPr>
-                        <a:t>Examine the impact of a highly hygienic environment on atopic comorbidities among infants. </a:t>
+                        <a:t>Examine the impact of a highly hygienic environment during, before and after COVID19 on Atopic diseases among babies.</a:t>
                       </a:r>
-                      <a:endParaRPr lang="en-US" sz="3200" kern="1200" dirty="0">
-                        <a:solidFill>
-                          <a:schemeClr val="dk1"/>
-                        </a:solidFill>
-                        <a:latin typeface="+mj-lt"/>
-                        <a:ea typeface="+mn-ea"/>
-                        <a:cs typeface="+mn-cs"/>
-                      </a:endParaRPr>
                     </a:p>
                   </a:txBody>
                   <a:tcPr>
@@ -4710,83 +4705,6 @@
                   </a:ext>
                 </a:extLst>
               </a:tr>
-              <a:tr h="1655797">
-                <a:tc>
-                  <a:txBody>
-                    <a:bodyPr/>
-                    <a:lstStyle/>
-                    <a:p>
-                      <a:pPr marL="0" indent="0" algn="l" rtl="0">
-                        <a:lnSpc>
-                          <a:spcPct val="150000"/>
-                        </a:lnSpc>
-                        <a:buFont typeface="Arial" panose="020B0604020202020204" pitchFamily="34" charset="0"/>
-                        <a:buNone/>
-                      </a:pPr>
-                      <a:endParaRPr lang="en-US" sz="3200" kern="1200" dirty="0">
-                        <a:solidFill>
-                          <a:schemeClr val="dk1"/>
-                        </a:solidFill>
-                        <a:latin typeface="+mj-lt"/>
-                        <a:ea typeface="+mn-ea"/>
-                        <a:cs typeface="+mn-cs"/>
-                      </a:endParaRPr>
-                    </a:p>
-                  </a:txBody>
-                  <a:tcPr>
-                    <a:lnL w="38100" cap="flat" cmpd="sng" algn="ctr">
-                      <a:solidFill>
-                        <a:schemeClr val="bg1"/>
-                      </a:solidFill>
-                      <a:prstDash val="solid"/>
-                      <a:round/>
-                      <a:headEnd type="none" w="med" len="med"/>
-                      <a:tailEnd type="none" w="med" len="med"/>
-                    </a:lnL>
-                    <a:lnR w="38100" cap="flat" cmpd="sng" algn="ctr">
-                      <a:solidFill>
-                        <a:schemeClr val="bg1"/>
-                      </a:solidFill>
-                      <a:prstDash val="solid"/>
-                      <a:round/>
-                      <a:headEnd type="none" w="med" len="med"/>
-                      <a:tailEnd type="none" w="med" len="med"/>
-                    </a:lnR>
-                    <a:lnT w="38100" cap="flat" cmpd="sng" algn="ctr">
-                      <a:solidFill>
-                        <a:schemeClr val="bg1"/>
-                      </a:solidFill>
-                      <a:prstDash val="solid"/>
-                      <a:round/>
-                      <a:headEnd type="none" w="med" len="med"/>
-                      <a:tailEnd type="none" w="med" len="med"/>
-                    </a:lnT>
-                    <a:lnB w="38100" cap="flat" cmpd="sng" algn="ctr">
-                      <a:solidFill>
-                        <a:schemeClr val="bg1"/>
-                      </a:solidFill>
-                      <a:prstDash val="solid"/>
-                      <a:round/>
-                      <a:headEnd type="none" w="med" len="med"/>
-                      <a:tailEnd type="none" w="med" len="med"/>
-                    </a:lnB>
-                    <a:lnTlToBr w="12700" cmpd="sng">
-                      <a:noFill/>
-                      <a:prstDash val="solid"/>
-                    </a:lnTlToBr>
-                    <a:lnBlToTr w="12700" cmpd="sng">
-                      <a:noFill/>
-                      <a:prstDash val="solid"/>
-                    </a:lnBlToTr>
-                    <a:noFill/>
-                  </a:tcPr>
-                </a:tc>
-                <a:extLst>
-                  <a:ext uri="{0D108BD9-81ED-4DB2-BD59-A6C34878D82A}">
-                    <a16:rowId xmlns:a16="http://schemas.microsoft.com/office/drawing/2014/main" val="3938412812"/>
-                  </a:ext>
-                </a:extLst>
-              </a:tr>
             </a:tbl>
           </a:graphicData>
         </a:graphic>
@@ -4806,14 +4724,14 @@
           <p:nvPr>
             <p:extLst>
               <p:ext uri="{D42A27DB-BD31-4B8C-83A1-F6EECF244321}">
-                <p14:modId xmlns:p14="http://schemas.microsoft.com/office/powerpoint/2010/main" val="1897800182"/>
+                <p14:modId xmlns:p14="http://schemas.microsoft.com/office/powerpoint/2010/main" val="856282411"/>
               </p:ext>
             </p:extLst>
           </p:nvPr>
         </p:nvGraphicFramePr>
         <p:xfrm>
           <a:off x="13881928" y="4863702"/>
-          <a:ext cx="15516000" cy="24681438"/>
+          <a:ext cx="15516000" cy="24830033"/>
         </p:xfrm>
         <a:graphic>
           <a:graphicData uri="http://schemas.openxmlformats.org/drawingml/2006/table">
@@ -4830,7 +4748,7 @@
                   </a:extLst>
                 </a:gridCol>
               </a:tblGrid>
-              <a:tr h="712941">
+              <a:tr h="748708">
                 <a:tc>
                   <a:txBody>
                     <a:bodyPr/>
@@ -4893,7 +4811,7 @@
                   </a:ext>
                 </a:extLst>
               </a:tr>
-              <a:tr h="23968497">
+              <a:tr h="24081325">
                 <a:tc>
                   <a:txBody>
                     <a:bodyPr/>
@@ -5555,14 +5473,14 @@
           <p:nvPr>
             <p:extLst>
               <p:ext uri="{D42A27DB-BD31-4B8C-83A1-F6EECF244321}">
-                <p14:modId xmlns:p14="http://schemas.microsoft.com/office/powerpoint/2010/main" val="3447511194"/>
+                <p14:modId xmlns:p14="http://schemas.microsoft.com/office/powerpoint/2010/main" val="244857467"/>
               </p:ext>
             </p:extLst>
           </p:nvPr>
         </p:nvGraphicFramePr>
         <p:xfrm>
           <a:off x="64869" y="12718864"/>
-          <a:ext cx="13680000" cy="12498587"/>
+          <a:ext cx="13680000" cy="12341423"/>
         </p:xfrm>
         <a:graphic>
           <a:graphicData uri="http://schemas.openxmlformats.org/drawingml/2006/table">
@@ -5579,7 +5497,7 @@
                   </a:extLst>
                 </a:gridCol>
               </a:tblGrid>
-              <a:tr h="0">
+              <a:tr h="745200">
                 <a:tc>
                   <a:txBody>
                     <a:bodyPr/>
@@ -5653,7 +5571,7 @@
                   </a:ext>
                 </a:extLst>
               </a:tr>
-              <a:tr h="11751192">
+              <a:tr h="11594028">
                 <a:tc>
                   <a:txBody>
                     <a:bodyPr/>
@@ -5971,14 +5889,14 @@
               <p:nvPr>
                 <p:extLst>
                   <p:ext uri="{D42A27DB-BD31-4B8C-83A1-F6EECF244321}">
-                    <p14:modId xmlns:p14="http://schemas.microsoft.com/office/powerpoint/2010/main" val="3024389625"/>
+                    <p14:modId xmlns:p14="http://schemas.microsoft.com/office/powerpoint/2010/main" val="3266362276"/>
                   </p:ext>
                 </p:extLst>
               </p:nvPr>
             </p:nvGraphicFramePr>
             <p:xfrm>
-              <a:off x="93744" y="25050291"/>
-              <a:ext cx="13680000" cy="9383071"/>
+              <a:off x="0" y="25050291"/>
+              <a:ext cx="13773744" cy="9436588"/>
             </p:xfrm>
             <a:graphic>
               <a:graphicData uri="http://schemas.openxmlformats.org/drawingml/2006/table">
@@ -5987,7 +5905,7 @@
                     <a:tableStyleId>{F5AB1C69-6EDB-4FF4-983F-18BD219EF322}</a:tableStyleId>
                   </a:tblPr>
                   <a:tblGrid>
-                    <a:gridCol w="13680000">
+                    <a:gridCol w="13773744">
                       <a:extLst>
                         <a:ext uri="{9D8B030D-6E8A-4147-A177-3AD203B41FA5}">
                           <a16:colId xmlns:a16="http://schemas.microsoft.com/office/drawing/2014/main" val="3747045786"/>
@@ -5995,7 +5913,7 @@
                       </a:extLst>
                     </a:gridCol>
                   </a:tblGrid>
-                  <a:tr h="514408">
+                  <a:tr h="745200">
                     <a:tc>
                       <a:txBody>
                         <a:bodyPr/>
@@ -6012,7 +5930,7 @@
                             <a:rPr lang="en-US" sz="3200" dirty="0">
                               <a:latin typeface="+mj-lt"/>
                             </a:rPr>
-                            <a:t>Statistical Methods</a:t>
+                            <a:t>Statistical Models</a:t>
                           </a:r>
                           <a:endParaRPr lang="en-US" sz="3200" kern="1200" dirty="0">
                             <a:solidFill>
@@ -6069,7 +5987,7 @@
                       </a:ext>
                     </a:extLst>
                   </a:tr>
-                  <a:tr h="8635676">
+                  <a:tr h="8689193">
                     <a:tc>
                       <a:txBody>
                         <a:bodyPr/>
@@ -6091,7 +6009,7 @@
                               <a:ea typeface="+mn-ea"/>
                               <a:cs typeface="+mn-cs"/>
                             </a:rPr>
-                            <a:t>Basis model – </a:t>
+                            <a:t>Basis model </a:t>
                           </a:r>
                           <a:r>
                             <a:rPr lang="en-US" sz="3200" b="0" kern="1200" dirty="0">
@@ -6102,7 +6020,7 @@
                               <a:ea typeface="+mn-ea"/>
                               <a:cs typeface="+mn-cs"/>
                             </a:rPr>
-                            <a:t>used in both models : </a:t>
+                            <a:t>: </a:t>
                           </a:r>
                         </a:p>
                         <a:p>
@@ -6131,7 +6049,7 @@
                                     <a:schemeClr val="dk1"/>
                                   </a:solidFill>
                                   <a:effectLst/>
-                                  <a:latin typeface="+mn-lt"/>
+                                  <a:latin typeface="Cambria Math" panose="02040503050406030204" pitchFamily="18" charset="0"/>
                                   <a:ea typeface="+mn-ea"/>
                                   <a:cs typeface="+mn-cs"/>
                                 </a:rPr>
@@ -6145,7 +6063,7 @@
                                         <a:schemeClr val="dk1"/>
                                       </a:solidFill>
                                       <a:effectLst/>
-                                      <a:latin typeface="+mn-lt"/>
+                                      <a:latin typeface="Cambria Math" panose="02040503050406030204" pitchFamily="18" charset="0"/>
                                       <a:ea typeface="+mn-ea"/>
                                       <a:cs typeface="+mn-cs"/>
                                     </a:rPr>
@@ -6158,7 +6076,7 @@
                                         <a:schemeClr val="dk1"/>
                                       </a:solidFill>
                                       <a:effectLst/>
-                                      <a:latin typeface="+mn-lt"/>
+                                      <a:latin typeface="Cambria Math" panose="02040503050406030204" pitchFamily="18" charset="0"/>
                                       <a:ea typeface="+mn-ea"/>
                                       <a:cs typeface="+mn-cs"/>
                                     </a:rPr>
@@ -6184,7 +6102,7 @@
                                         <a:schemeClr val="dk1"/>
                                       </a:solidFill>
                                       <a:effectLst/>
-                                      <a:latin typeface="+mn-lt"/>
+                                      <a:latin typeface="Cambria Math" panose="02040503050406030204" pitchFamily="18" charset="0"/>
                                       <a:ea typeface="+mn-ea"/>
                                       <a:cs typeface="+mn-cs"/>
                                     </a:rPr>
@@ -6196,7 +6114,7 @@
                                         <a:schemeClr val="dk1"/>
                                       </a:solidFill>
                                       <a:effectLst/>
-                                      <a:latin typeface="+mn-lt"/>
+                                      <a:latin typeface="Cambria Math" panose="02040503050406030204" pitchFamily="18" charset="0"/>
                                       <a:ea typeface="+mn-ea"/>
                                       <a:cs typeface="+mn-cs"/>
                                     </a:rPr>
@@ -6208,7 +6126,7 @@
                                         <a:schemeClr val="dk1"/>
                                       </a:solidFill>
                                       <a:effectLst/>
-                                      <a:latin typeface="+mn-lt"/>
+                                      <a:latin typeface="Cambria Math" panose="02040503050406030204" pitchFamily="18" charset="0"/>
                                       <a:ea typeface="+mn-ea"/>
                                       <a:cs typeface="+mn-cs"/>
                                     </a:rPr>
@@ -6222,7 +6140,7 @@
                                     <a:schemeClr val="dk1"/>
                                   </a:solidFill>
                                   <a:effectLst/>
-                                  <a:latin typeface="+mn-lt"/>
+                                  <a:latin typeface="Cambria Math" panose="02040503050406030204" pitchFamily="18" charset="0"/>
                                   <a:ea typeface="+mn-ea"/>
                                   <a:cs typeface="+mn-cs"/>
                                 </a:rPr>
@@ -6236,7 +6154,7 @@
                                         <a:schemeClr val="dk1"/>
                                       </a:solidFill>
                                       <a:effectLst/>
-                                      <a:latin typeface="+mn-lt"/>
+                                      <a:latin typeface="Cambria Math" panose="02040503050406030204" pitchFamily="18" charset="0"/>
                                       <a:ea typeface="+mn-ea"/>
                                       <a:cs typeface="+mn-cs"/>
                                     </a:rPr>
@@ -6249,7 +6167,7 @@
                                         <a:schemeClr val="dk1"/>
                                       </a:solidFill>
                                       <a:effectLst/>
-                                      <a:latin typeface="+mn-lt"/>
+                                      <a:latin typeface="Cambria Math" panose="02040503050406030204" pitchFamily="18" charset="0"/>
                                       <a:ea typeface="+mn-ea"/>
                                       <a:cs typeface="+mn-cs"/>
                                     </a:rPr>
@@ -6263,7 +6181,7 @@
                                         <a:schemeClr val="dk1"/>
                                       </a:solidFill>
                                       <a:effectLst/>
-                                      <a:latin typeface="+mn-lt"/>
+                                      <a:latin typeface="Cambria Math" panose="02040503050406030204" pitchFamily="18" charset="0"/>
                                       <a:ea typeface="+mn-ea"/>
                                       <a:cs typeface="+mn-cs"/>
                                     </a:rPr>
@@ -6277,7 +6195,7 @@
                                     <a:schemeClr val="dk1"/>
                                   </a:solidFill>
                                   <a:effectLst/>
-                                  <a:latin typeface="+mn-lt"/>
+                                  <a:latin typeface="Cambria Math" panose="02040503050406030204" pitchFamily="18" charset="0"/>
                                   <a:ea typeface="+mn-ea"/>
                                   <a:cs typeface="+mn-cs"/>
                                 </a:rPr>
@@ -6291,7 +6209,7 @@
                                         <a:schemeClr val="dk1"/>
                                       </a:solidFill>
                                       <a:effectLst/>
-                                      <a:latin typeface="+mn-lt"/>
+                                      <a:latin typeface="Cambria Math" panose="02040503050406030204" pitchFamily="18" charset="0"/>
                                       <a:ea typeface="+mn-ea"/>
                                       <a:cs typeface="+mn-cs"/>
                                     </a:rPr>
@@ -6304,7 +6222,7 @@
                                         <a:schemeClr val="dk1"/>
                                       </a:solidFill>
                                       <a:effectLst/>
-                                      <a:latin typeface="+mn-lt"/>
+                                      <a:latin typeface="Cambria Math" panose="02040503050406030204" pitchFamily="18" charset="0"/>
                                       <a:ea typeface="+mn-ea"/>
                                       <a:cs typeface="+mn-cs"/>
                                     </a:rPr>
@@ -6318,7 +6236,7 @@
                                         <a:schemeClr val="dk1"/>
                                       </a:solidFill>
                                       <a:effectLst/>
-                                      <a:latin typeface="+mn-lt"/>
+                                      <a:latin typeface="Cambria Math" panose="02040503050406030204" pitchFamily="18" charset="0"/>
                                       <a:ea typeface="+mn-ea"/>
                                       <a:cs typeface="+mn-cs"/>
                                     </a:rPr>
@@ -6334,7 +6252,7 @@
                                         <a:schemeClr val="dk1"/>
                                       </a:solidFill>
                                       <a:effectLst/>
-                                      <a:latin typeface="+mn-lt"/>
+                                      <a:latin typeface="Cambria Math" panose="02040503050406030204" pitchFamily="18" charset="0"/>
                                       <a:ea typeface="+mn-ea"/>
                                       <a:cs typeface="+mn-cs"/>
                                     </a:rPr>
@@ -6349,7 +6267,7 @@
                                             <a:schemeClr val="dk1"/>
                                           </a:solidFill>
                                           <a:effectLst/>
-                                          <a:latin typeface="+mn-lt"/>
+                                          <a:latin typeface="Cambria Math" panose="02040503050406030204" pitchFamily="18" charset="0"/>
                                           <a:ea typeface="+mn-ea"/>
                                           <a:cs typeface="+mn-cs"/>
                                         </a:rPr>
@@ -6362,7 +6280,7 @@
                                             <a:schemeClr val="dk1"/>
                                           </a:solidFill>
                                           <a:effectLst/>
-                                          <a:latin typeface="+mn-lt"/>
+                                          <a:latin typeface="Cambria Math" panose="02040503050406030204" pitchFamily="18" charset="0"/>
                                           <a:ea typeface="+mn-ea"/>
                                           <a:cs typeface="+mn-cs"/>
                                         </a:rPr>
@@ -6376,7 +6294,7 @@
                                             <a:schemeClr val="dk1"/>
                                           </a:solidFill>
                                           <a:effectLst/>
-                                          <a:latin typeface="+mn-lt"/>
+                                          <a:latin typeface="Cambria Math" panose="02040503050406030204" pitchFamily="18" charset="0"/>
                                           <a:ea typeface="+mn-ea"/>
                                           <a:cs typeface="+mn-cs"/>
                                         </a:rPr>
@@ -6392,7 +6310,7 @@
                                         <a:schemeClr val="dk1"/>
                                       </a:solidFill>
                                       <a:effectLst/>
-                                      <a:latin typeface="+mn-lt"/>
+                                      <a:latin typeface="Cambria Math" panose="02040503050406030204" pitchFamily="18" charset="0"/>
                                       <a:ea typeface="+mn-ea"/>
                                       <a:cs typeface="+mn-cs"/>
                                     </a:rPr>
@@ -6404,7 +6322,7 @@
                                         <a:schemeClr val="dk1"/>
                                       </a:solidFill>
                                       <a:effectLst/>
-                                      <a:latin typeface="+mn-lt"/>
+                                      <a:latin typeface="Cambria Math" panose="02040503050406030204" pitchFamily="18" charset="0"/>
                                       <a:ea typeface="+mn-ea"/>
                                       <a:cs typeface="+mn-cs"/>
                                     </a:rPr>
@@ -6416,7 +6334,7 @@
                                         <a:schemeClr val="dk1"/>
                                       </a:solidFill>
                                       <a:effectLst/>
-                                      <a:latin typeface="+mn-lt"/>
+                                      <a:latin typeface="Cambria Math" panose="02040503050406030204" pitchFamily="18" charset="0"/>
                                       <a:ea typeface="+mn-ea"/>
                                       <a:cs typeface="+mn-cs"/>
                                     </a:rPr>
@@ -6430,7 +6348,7 @@
                                     <a:schemeClr val="dk1"/>
                                   </a:solidFill>
                                   <a:effectLst/>
-                                  <a:latin typeface="+mn-lt"/>
+                                  <a:latin typeface="Cambria Math" panose="02040503050406030204" pitchFamily="18" charset="0"/>
                                   <a:ea typeface="+mn-ea"/>
                                   <a:cs typeface="+mn-cs"/>
                                 </a:rPr>
@@ -6444,7 +6362,7 @@
                                         <a:schemeClr val="dk1"/>
                                       </a:solidFill>
                                       <a:effectLst/>
-                                      <a:latin typeface="+mn-lt"/>
+                                      <a:latin typeface="Cambria Math" panose="02040503050406030204" pitchFamily="18" charset="0"/>
                                       <a:ea typeface="+mn-ea"/>
                                       <a:cs typeface="+mn-cs"/>
                                     </a:rPr>
@@ -6457,7 +6375,7 @@
                                         <a:schemeClr val="dk1"/>
                                       </a:solidFill>
                                       <a:effectLst/>
-                                      <a:latin typeface="+mn-lt"/>
+                                      <a:latin typeface="Cambria Math" panose="02040503050406030204" pitchFamily="18" charset="0"/>
                                       <a:ea typeface="+mn-ea"/>
                                       <a:cs typeface="+mn-cs"/>
                                     </a:rPr>
@@ -6471,7 +6389,7 @@
                                         <a:schemeClr val="dk1"/>
                                       </a:solidFill>
                                       <a:effectLst/>
-                                      <a:latin typeface="+mn-lt"/>
+                                      <a:latin typeface="Cambria Math" panose="02040503050406030204" pitchFamily="18" charset="0"/>
                                       <a:ea typeface="+mn-ea"/>
                                       <a:cs typeface="+mn-cs"/>
                                     </a:rPr>
@@ -6487,7 +6405,7 @@
                                         <a:schemeClr val="dk1"/>
                                       </a:solidFill>
                                       <a:effectLst/>
-                                      <a:latin typeface="+mn-lt"/>
+                                      <a:latin typeface="Cambria Math" panose="02040503050406030204" pitchFamily="18" charset="0"/>
                                       <a:ea typeface="+mn-ea"/>
                                       <a:cs typeface="+mn-cs"/>
                                     </a:rPr>
@@ -6500,7 +6418,7 @@
                                         <a:schemeClr val="dk1"/>
                                       </a:solidFill>
                                       <a:effectLst/>
-                                      <a:latin typeface="+mn-lt"/>
+                                      <a:latin typeface="Cambria Math" panose="02040503050406030204" pitchFamily="18" charset="0"/>
                                       <a:ea typeface="+mn-ea"/>
                                       <a:cs typeface="+mn-cs"/>
                                     </a:rPr>
@@ -6514,7 +6432,7 @@
                                         <a:schemeClr val="dk1"/>
                                       </a:solidFill>
                                       <a:effectLst/>
-                                      <a:latin typeface="+mn-lt"/>
+                                      <a:latin typeface="Cambria Math" panose="02040503050406030204" pitchFamily="18" charset="0"/>
                                       <a:ea typeface="+mn-ea"/>
                                       <a:cs typeface="+mn-cs"/>
                                     </a:rPr>
@@ -6528,7 +6446,7 @@
                                             <a:schemeClr val="dk1"/>
                                           </a:solidFill>
                                           <a:effectLst/>
-                                          <a:latin typeface="+mn-lt"/>
+                                          <a:latin typeface="Cambria Math" panose="02040503050406030204" pitchFamily="18" charset="0"/>
                                           <a:ea typeface="+mn-ea"/>
                                           <a:cs typeface="+mn-cs"/>
                                         </a:rPr>
@@ -6541,7 +6459,7 @@
                                             <a:schemeClr val="dk1"/>
                                           </a:solidFill>
                                           <a:effectLst/>
-                                          <a:latin typeface="+mn-lt"/>
+                                          <a:latin typeface="Cambria Math" panose="02040503050406030204" pitchFamily="18" charset="0"/>
                                           <a:ea typeface="+mn-ea"/>
                                           <a:cs typeface="+mn-cs"/>
                                         </a:rPr>
@@ -6555,7 +6473,7 @@
                                             <a:schemeClr val="dk1"/>
                                           </a:solidFill>
                                           <a:effectLst/>
-                                          <a:latin typeface="+mn-lt"/>
+                                          <a:latin typeface="Cambria Math" panose="02040503050406030204" pitchFamily="18" charset="0"/>
                                           <a:ea typeface="+mn-ea"/>
                                           <a:cs typeface="+mn-cs"/>
                                         </a:rPr>
@@ -6567,7 +6485,7 @@
                                             <a:schemeClr val="dk1"/>
                                           </a:solidFill>
                                           <a:effectLst/>
-                                          <a:latin typeface="+mn-lt"/>
+                                          <a:latin typeface="Cambria Math" panose="02040503050406030204" pitchFamily="18" charset="0"/>
                                           <a:ea typeface="+mn-ea"/>
                                           <a:cs typeface="+mn-cs"/>
                                         </a:rPr>
@@ -6579,7 +6497,7 @@
                                             <a:schemeClr val="dk1"/>
                                           </a:solidFill>
                                           <a:effectLst/>
-                                          <a:latin typeface="+mn-lt"/>
+                                          <a:latin typeface="Cambria Math" panose="02040503050406030204" pitchFamily="18" charset="0"/>
                                           <a:ea typeface="+mn-ea"/>
                                           <a:cs typeface="+mn-cs"/>
                                         </a:rPr>
@@ -6593,7 +6511,7 @@
                                         <a:schemeClr val="dk1"/>
                                       </a:solidFill>
                                       <a:effectLst/>
-                                      <a:latin typeface="+mn-lt"/>
+                                      <a:latin typeface="Cambria Math" panose="02040503050406030204" pitchFamily="18" charset="0"/>
                                       <a:ea typeface="+mn-ea"/>
                                       <a:cs typeface="+mn-cs"/>
                                     </a:rPr>
@@ -6607,7 +6525,7 @@
                                     <a:schemeClr val="dk1"/>
                                   </a:solidFill>
                                   <a:effectLst/>
-                                  <a:latin typeface="+mn-lt"/>
+                                  <a:latin typeface="Cambria Math" panose="02040503050406030204" pitchFamily="18" charset="0"/>
                                   <a:ea typeface="+mn-ea"/>
                                   <a:cs typeface="+mn-cs"/>
                                 </a:rPr>
@@ -6621,7 +6539,7 @@
                                         <a:schemeClr val="dk1"/>
                                       </a:solidFill>
                                       <a:effectLst/>
-                                      <a:latin typeface="+mn-lt"/>
+                                      <a:latin typeface="Cambria Math" panose="02040503050406030204" pitchFamily="18" charset="0"/>
                                       <a:ea typeface="+mn-ea"/>
                                       <a:cs typeface="+mn-cs"/>
                                     </a:rPr>
@@ -6634,7 +6552,7 @@
                                         <a:schemeClr val="dk1"/>
                                       </a:solidFill>
                                       <a:effectLst/>
-                                      <a:latin typeface="+mn-lt"/>
+                                      <a:latin typeface="Cambria Math" panose="02040503050406030204" pitchFamily="18" charset="0"/>
                                       <a:ea typeface="+mn-ea"/>
                                       <a:cs typeface="+mn-cs"/>
                                     </a:rPr>
@@ -6648,7 +6566,7 @@
                                         <a:schemeClr val="dk1"/>
                                       </a:solidFill>
                                       <a:effectLst/>
-                                      <a:latin typeface="+mn-lt"/>
+                                      <a:latin typeface="Cambria Math" panose="02040503050406030204" pitchFamily="18" charset="0"/>
                                       <a:ea typeface="+mn-ea"/>
                                       <a:cs typeface="+mn-cs"/>
                                     </a:rPr>
@@ -6664,7 +6582,7 @@
                                         <a:schemeClr val="dk1"/>
                                       </a:solidFill>
                                       <a:effectLst/>
-                                      <a:latin typeface="+mn-lt"/>
+                                      <a:latin typeface="Cambria Math" panose="02040503050406030204" pitchFamily="18" charset="0"/>
                                       <a:ea typeface="+mn-ea"/>
                                       <a:cs typeface="+mn-cs"/>
                                     </a:rPr>
@@ -6677,7 +6595,7 @@
                                         <a:schemeClr val="dk1"/>
                                       </a:solidFill>
                                       <a:effectLst/>
-                                      <a:latin typeface="+mn-lt"/>
+                                      <a:latin typeface="Cambria Math" panose="02040503050406030204" pitchFamily="18" charset="0"/>
                                       <a:ea typeface="+mn-ea"/>
                                       <a:cs typeface="+mn-cs"/>
                                     </a:rPr>
@@ -6691,7 +6609,7 @@
                                         <a:schemeClr val="dk1"/>
                                       </a:solidFill>
                                       <a:effectLst/>
-                                      <a:latin typeface="+mn-lt"/>
+                                      <a:latin typeface="Cambria Math" panose="02040503050406030204" pitchFamily="18" charset="0"/>
                                       <a:ea typeface="+mn-ea"/>
                                       <a:cs typeface="+mn-cs"/>
                                     </a:rPr>
@@ -6705,7 +6623,7 @@
                                     <a:schemeClr val="dk1"/>
                                   </a:solidFill>
                                   <a:effectLst/>
-                                  <a:latin typeface="+mn-lt"/>
+                                  <a:latin typeface="Cambria Math" panose="02040503050406030204" pitchFamily="18" charset="0"/>
                                   <a:ea typeface="+mn-ea"/>
                                   <a:cs typeface="+mn-cs"/>
                                 </a:rPr>
@@ -6719,7 +6637,7 @@
                                         <a:schemeClr val="dk1"/>
                                       </a:solidFill>
                                       <a:effectLst/>
-                                      <a:latin typeface="+mn-lt"/>
+                                      <a:latin typeface="Cambria Math" panose="02040503050406030204" pitchFamily="18" charset="0"/>
                                       <a:ea typeface="+mn-ea"/>
                                       <a:cs typeface="+mn-cs"/>
                                     </a:rPr>
@@ -6732,7 +6650,7 @@
                                         <a:schemeClr val="dk1"/>
                                       </a:solidFill>
                                       <a:effectLst/>
-                                      <a:latin typeface="+mn-lt"/>
+                                      <a:latin typeface="Cambria Math" panose="02040503050406030204" pitchFamily="18" charset="0"/>
                                       <a:ea typeface="+mn-ea"/>
                                       <a:cs typeface="+mn-cs"/>
                                     </a:rPr>
@@ -6746,7 +6664,7 @@
                                         <a:schemeClr val="dk1"/>
                                       </a:solidFill>
                                       <a:effectLst/>
-                                      <a:latin typeface="+mn-lt"/>
+                                      <a:latin typeface="Cambria Math" panose="02040503050406030204" pitchFamily="18" charset="0"/>
                                       <a:ea typeface="+mn-ea"/>
                                       <a:cs typeface="+mn-cs"/>
                                     </a:rPr>
@@ -6762,7 +6680,7 @@
                                         <a:schemeClr val="dk1"/>
                                       </a:solidFill>
                                       <a:effectLst/>
-                                      <a:latin typeface="+mn-lt"/>
+                                      <a:latin typeface="Cambria Math" panose="02040503050406030204" pitchFamily="18" charset="0"/>
                                       <a:ea typeface="+mn-ea"/>
                                       <a:cs typeface="+mn-cs"/>
                                     </a:rPr>
@@ -6775,7 +6693,7 @@
                                         <a:schemeClr val="dk1"/>
                                       </a:solidFill>
                                       <a:effectLst/>
-                                      <a:latin typeface="+mn-lt"/>
+                                      <a:latin typeface="Cambria Math" panose="02040503050406030204" pitchFamily="18" charset="0"/>
                                       <a:ea typeface="+mn-ea"/>
                                       <a:cs typeface="+mn-cs"/>
                                     </a:rPr>
@@ -6789,7 +6707,7 @@
                                         <a:schemeClr val="dk1"/>
                                       </a:solidFill>
                                       <a:effectLst/>
-                                      <a:latin typeface="+mn-lt"/>
+                                      <a:latin typeface="Cambria Math" panose="02040503050406030204" pitchFamily="18" charset="0"/>
                                       <a:ea typeface="+mn-ea"/>
                                       <a:cs typeface="+mn-cs"/>
                                     </a:rPr>
@@ -6803,7 +6721,7 @@
                                             <a:schemeClr val="dk1"/>
                                           </a:solidFill>
                                           <a:effectLst/>
-                                          <a:latin typeface="+mn-lt"/>
+                                          <a:latin typeface="Cambria Math" panose="02040503050406030204" pitchFamily="18" charset="0"/>
                                           <a:ea typeface="+mn-ea"/>
                                           <a:cs typeface="+mn-cs"/>
                                         </a:rPr>
@@ -6816,7 +6734,7 @@
                                             <a:schemeClr val="dk1"/>
                                           </a:solidFill>
                                           <a:effectLst/>
-                                          <a:latin typeface="+mn-lt"/>
+                                          <a:latin typeface="Cambria Math" panose="02040503050406030204" pitchFamily="18" charset="0"/>
                                           <a:ea typeface="+mn-ea"/>
                                           <a:cs typeface="+mn-cs"/>
                                         </a:rPr>
@@ -6830,7 +6748,7 @@
                                             <a:schemeClr val="dk1"/>
                                           </a:solidFill>
                                           <a:effectLst/>
-                                          <a:latin typeface="+mn-lt"/>
+                                          <a:latin typeface="Cambria Math" panose="02040503050406030204" pitchFamily="18" charset="0"/>
                                           <a:ea typeface="+mn-ea"/>
                                           <a:cs typeface="+mn-cs"/>
                                         </a:rPr>
@@ -6842,7 +6760,7 @@
                                             <a:schemeClr val="dk1"/>
                                           </a:solidFill>
                                           <a:effectLst/>
-                                          <a:latin typeface="+mn-lt"/>
+                                          <a:latin typeface="Cambria Math" panose="02040503050406030204" pitchFamily="18" charset="0"/>
                                           <a:ea typeface="+mn-ea"/>
                                           <a:cs typeface="+mn-cs"/>
                                         </a:rPr>
@@ -6854,7 +6772,7 @@
                                             <a:schemeClr val="dk1"/>
                                           </a:solidFill>
                                           <a:effectLst/>
-                                          <a:latin typeface="+mn-lt"/>
+                                          <a:latin typeface="Cambria Math" panose="02040503050406030204" pitchFamily="18" charset="0"/>
                                           <a:ea typeface="+mn-ea"/>
                                           <a:cs typeface="+mn-cs"/>
                                         </a:rPr>
@@ -6870,7 +6788,7 @@
                                     <a:schemeClr val="dk1"/>
                                   </a:solidFill>
                                   <a:effectLst/>
-                                  <a:latin typeface="+mn-lt"/>
+                                  <a:latin typeface="Cambria Math" panose="02040503050406030204" pitchFamily="18" charset="0"/>
                                   <a:ea typeface="+mn-ea"/>
                                   <a:cs typeface="+mn-cs"/>
                                 </a:rPr>
@@ -6884,7 +6802,7 @@
                                         <a:schemeClr val="dk1"/>
                                       </a:solidFill>
                                       <a:effectLst/>
-                                      <a:latin typeface="+mn-lt"/>
+                                      <a:latin typeface="Cambria Math" panose="02040503050406030204" pitchFamily="18" charset="0"/>
                                       <a:ea typeface="+mn-ea"/>
                                       <a:cs typeface="+mn-cs"/>
                                     </a:rPr>
@@ -6897,7 +6815,7 @@
                                         <a:schemeClr val="dk1"/>
                                       </a:solidFill>
                                       <a:effectLst/>
-                                      <a:latin typeface="+mn-lt"/>
+                                      <a:latin typeface="Cambria Math" panose="02040503050406030204" pitchFamily="18" charset="0"/>
                                       <a:ea typeface="+mn-ea"/>
                                       <a:cs typeface="+mn-cs"/>
                                     </a:rPr>
@@ -6911,7 +6829,7 @@
                                         <a:schemeClr val="dk1"/>
                                       </a:solidFill>
                                       <a:effectLst/>
-                                      <a:latin typeface="+mn-lt"/>
+                                      <a:latin typeface="Cambria Math" panose="02040503050406030204" pitchFamily="18" charset="0"/>
                                       <a:ea typeface="+mn-ea"/>
                                       <a:cs typeface="+mn-cs"/>
                                     </a:rPr>
@@ -6927,7 +6845,7 @@
                                         <a:schemeClr val="dk1"/>
                                       </a:solidFill>
                                       <a:effectLst/>
-                                      <a:latin typeface="+mn-lt"/>
+                                      <a:latin typeface="Cambria Math" panose="02040503050406030204" pitchFamily="18" charset="0"/>
                                       <a:ea typeface="+mn-ea"/>
                                       <a:cs typeface="+mn-cs"/>
                                     </a:rPr>
@@ -6942,7 +6860,7 @@
                                             <a:schemeClr val="dk1"/>
                                           </a:solidFill>
                                           <a:effectLst/>
-                                          <a:latin typeface="+mn-lt"/>
+                                          <a:latin typeface="Cambria Math" panose="02040503050406030204" pitchFamily="18" charset="0"/>
                                           <a:ea typeface="+mn-ea"/>
                                           <a:cs typeface="+mn-cs"/>
                                         </a:rPr>
@@ -6955,7 +6873,7 @@
                                             <a:schemeClr val="dk1"/>
                                           </a:solidFill>
                                           <a:effectLst/>
-                                          <a:latin typeface="+mn-lt"/>
+                                          <a:latin typeface="Cambria Math" panose="02040503050406030204" pitchFamily="18" charset="0"/>
                                           <a:ea typeface="+mn-ea"/>
                                           <a:cs typeface="+mn-cs"/>
                                         </a:rPr>
@@ -6969,7 +6887,7 @@
                                             <a:schemeClr val="dk1"/>
                                           </a:solidFill>
                                           <a:effectLst/>
-                                          <a:latin typeface="+mn-lt"/>
+                                          <a:latin typeface="Cambria Math" panose="02040503050406030204" pitchFamily="18" charset="0"/>
                                           <a:ea typeface="+mn-ea"/>
                                           <a:cs typeface="+mn-cs"/>
                                         </a:rPr>
@@ -6985,7 +6903,7 @@
                                         <a:schemeClr val="dk1"/>
                                       </a:solidFill>
                                       <a:effectLst/>
-                                      <a:latin typeface="+mn-lt"/>
+                                      <a:latin typeface="Cambria Math" panose="02040503050406030204" pitchFamily="18" charset="0"/>
                                       <a:ea typeface="+mn-ea"/>
                                       <a:cs typeface="+mn-cs"/>
                                     </a:rPr>
@@ -6997,7 +6915,7 @@
                                         <a:schemeClr val="dk1"/>
                                       </a:solidFill>
                                       <a:effectLst/>
-                                      <a:latin typeface="+mn-lt"/>
+                                      <a:latin typeface="Cambria Math" panose="02040503050406030204" pitchFamily="18" charset="0"/>
                                       <a:ea typeface="+mn-ea"/>
                                       <a:cs typeface="+mn-cs"/>
                                     </a:rPr>
@@ -7011,7 +6929,7 @@
                                     <a:schemeClr val="dk1"/>
                                   </a:solidFill>
                                   <a:effectLst/>
-                                  <a:latin typeface="+mn-lt"/>
+                                  <a:latin typeface="Cambria Math" panose="02040503050406030204" pitchFamily="18" charset="0"/>
                                   <a:ea typeface="+mn-ea"/>
                                   <a:cs typeface="+mn-cs"/>
                                 </a:rPr>
@@ -7025,7 +6943,7 @@
                                         <a:schemeClr val="dk1"/>
                                       </a:solidFill>
                                       <a:effectLst/>
-                                      <a:latin typeface="+mn-lt"/>
+                                      <a:latin typeface="Cambria Math" panose="02040503050406030204" pitchFamily="18" charset="0"/>
                                       <a:ea typeface="+mn-ea"/>
                                       <a:cs typeface="+mn-cs"/>
                                     </a:rPr>
@@ -7038,7 +6956,7 @@
                                         <a:schemeClr val="dk1"/>
                                       </a:solidFill>
                                       <a:effectLst/>
-                                      <a:latin typeface="+mn-lt"/>
+                                      <a:latin typeface="Cambria Math" panose="02040503050406030204" pitchFamily="18" charset="0"/>
                                       <a:ea typeface="+mn-ea"/>
                                       <a:cs typeface="+mn-cs"/>
                                     </a:rPr>
@@ -7052,7 +6970,7 @@
                                         <a:schemeClr val="dk1"/>
                                       </a:solidFill>
                                       <a:effectLst/>
-                                      <a:latin typeface="+mn-lt"/>
+                                      <a:latin typeface="Cambria Math" panose="02040503050406030204" pitchFamily="18" charset="0"/>
                                       <a:ea typeface="+mn-ea"/>
                                       <a:cs typeface="+mn-cs"/>
                                     </a:rPr>
@@ -7068,7 +6986,7 @@
                                         <a:schemeClr val="dk1"/>
                                       </a:solidFill>
                                       <a:effectLst/>
-                                      <a:latin typeface="+mn-lt"/>
+                                      <a:latin typeface="Cambria Math" panose="02040503050406030204" pitchFamily="18" charset="0"/>
                                       <a:ea typeface="+mn-ea"/>
                                       <a:cs typeface="+mn-cs"/>
                                     </a:rPr>
@@ -7081,7 +6999,7 @@
                                         <a:schemeClr val="dk1"/>
                                       </a:solidFill>
                                       <a:effectLst/>
-                                      <a:latin typeface="+mn-lt"/>
+                                      <a:latin typeface="Cambria Math" panose="02040503050406030204" pitchFamily="18" charset="0"/>
                                       <a:ea typeface="+mn-ea"/>
                                       <a:cs typeface="+mn-cs"/>
                                     </a:rPr>
@@ -7095,11 +7013,23 @@
                                         <a:schemeClr val="dk1"/>
                                       </a:solidFill>
                                       <a:effectLst/>
-                                      <a:latin typeface="+mn-lt"/>
+                                      <a:latin typeface="Cambria Math" panose="02040503050406030204" pitchFamily="18" charset="0"/>
                                       <a:ea typeface="+mn-ea"/>
                                       <a:cs typeface="+mn-cs"/>
                                     </a:rPr>
-                                    <m:t>𝑑𝑒𝑙𝑖𝑣𝑎𝑟𝑦</m:t>
+                                    <m:t>𝑑𝑒𝑙𝑖𝑣</m:t>
+                                  </m:r>
+                                  <m:r>
+                                    <a:rPr lang="en-US" sz="2800" b="0" i="1" kern="1200" smtClean="0">
+                                      <a:solidFill>
+                                        <a:schemeClr val="dk1"/>
+                                      </a:solidFill>
+                                      <a:effectLst/>
+                                      <a:latin typeface="Cambria Math" panose="02040503050406030204" pitchFamily="18" charset="0"/>
+                                      <a:ea typeface="+mn-ea"/>
+                                      <a:cs typeface="+mn-cs"/>
+                                    </a:rPr>
+                                    <m:t>𝑒𝑟</m:t>
                                   </m:r>
                                   <m:r>
                                     <a:rPr lang="en-US" sz="2800" i="1" kern="1200">
@@ -7107,7 +7037,7 @@
                                         <a:schemeClr val="dk1"/>
                                       </a:solidFill>
                                       <a:effectLst/>
-                                      <a:latin typeface="+mn-lt"/>
+                                      <a:latin typeface="Cambria Math" panose="02040503050406030204" pitchFamily="18" charset="0"/>
                                       <a:ea typeface="+mn-ea"/>
                                       <a:cs typeface="+mn-cs"/>
                                     </a:rPr>
@@ -7119,7 +7049,7 @@
                                         <a:schemeClr val="dk1"/>
                                       </a:solidFill>
                                       <a:effectLst/>
-                                      <a:latin typeface="+mn-lt"/>
+                                      <a:latin typeface="Cambria Math" panose="02040503050406030204" pitchFamily="18" charset="0"/>
                                       <a:ea typeface="+mn-ea"/>
                                       <a:cs typeface="+mn-cs"/>
                                     </a:rPr>
@@ -7133,7 +7063,7 @@
                                     <a:schemeClr val="dk1"/>
                                   </a:solidFill>
                                   <a:effectLst/>
-                                  <a:latin typeface="+mn-lt"/>
+                                  <a:latin typeface="Cambria Math" panose="02040503050406030204" pitchFamily="18" charset="0"/>
                                   <a:ea typeface="+mn-ea"/>
                                   <a:cs typeface="+mn-cs"/>
                                 </a:rPr>
@@ -7147,7 +7077,7 @@
                                         <a:schemeClr val="dk1"/>
                                       </a:solidFill>
                                       <a:effectLst/>
-                                      <a:latin typeface="+mn-lt"/>
+                                      <a:latin typeface="Cambria Math" panose="02040503050406030204" pitchFamily="18" charset="0"/>
                                       <a:ea typeface="+mn-ea"/>
                                       <a:cs typeface="+mn-cs"/>
                                     </a:rPr>
@@ -7160,7 +7090,7 @@
                                         <a:schemeClr val="dk1"/>
                                       </a:solidFill>
                                       <a:effectLst/>
-                                      <a:latin typeface="+mn-lt"/>
+                                      <a:latin typeface="Cambria Math" panose="02040503050406030204" pitchFamily="18" charset="0"/>
                                       <a:ea typeface="+mn-ea"/>
                                       <a:cs typeface="+mn-cs"/>
                                     </a:rPr>
@@ -7174,7 +7104,7 @@
                                         <a:schemeClr val="dk1"/>
                                       </a:solidFill>
                                       <a:effectLst/>
-                                      <a:latin typeface="+mn-lt"/>
+                                      <a:latin typeface="Cambria Math" panose="02040503050406030204" pitchFamily="18" charset="0"/>
                                       <a:ea typeface="+mn-ea"/>
                                       <a:cs typeface="+mn-cs"/>
                                     </a:rPr>
@@ -7190,7 +7120,7 @@
                                         <a:schemeClr val="dk1"/>
                                       </a:solidFill>
                                       <a:effectLst/>
-                                      <a:latin typeface="+mn-lt"/>
+                                      <a:latin typeface="Cambria Math" panose="02040503050406030204" pitchFamily="18" charset="0"/>
                                       <a:ea typeface="+mn-ea"/>
                                       <a:cs typeface="+mn-cs"/>
                                     </a:rPr>
@@ -7203,7 +7133,7 @@
                                         <a:schemeClr val="dk1"/>
                                       </a:solidFill>
                                       <a:effectLst/>
-                                      <a:latin typeface="+mn-lt"/>
+                                      <a:latin typeface="Cambria Math" panose="02040503050406030204" pitchFamily="18" charset="0"/>
                                       <a:ea typeface="+mn-ea"/>
                                       <a:cs typeface="+mn-cs"/>
                                     </a:rPr>
@@ -7217,7 +7147,7 @@
                                         <a:schemeClr val="dk1"/>
                                       </a:solidFill>
                                       <a:effectLst/>
-                                      <a:latin typeface="+mn-lt"/>
+                                      <a:latin typeface="Cambria Math" panose="02040503050406030204" pitchFamily="18" charset="0"/>
                                       <a:ea typeface="+mn-ea"/>
                                       <a:cs typeface="+mn-cs"/>
                                     </a:rPr>
@@ -7229,7 +7159,7 @@
                                         <a:schemeClr val="dk1"/>
                                       </a:solidFill>
                                       <a:effectLst/>
-                                      <a:latin typeface="+mn-lt"/>
+                                      <a:latin typeface="Cambria Math" panose="02040503050406030204" pitchFamily="18" charset="0"/>
                                       <a:ea typeface="+mn-ea"/>
                                       <a:cs typeface="+mn-cs"/>
                                     </a:rPr>
@@ -7241,11 +7171,11 @@
                                         <a:schemeClr val="dk1"/>
                                       </a:solidFill>
                                       <a:effectLst/>
-                                      <a:latin typeface="+mn-lt"/>
+                                      <a:latin typeface="Cambria Math" panose="02040503050406030204" pitchFamily="18" charset="0"/>
                                       <a:ea typeface="+mn-ea"/>
                                       <a:cs typeface="+mn-cs"/>
                                     </a:rPr>
-                                    <m:t>𝑠𝑝𝑜𝑛</m:t>
+                                    <m:t>𝑠𝑝𝑜𝑛𝑡</m:t>
                                   </m:r>
                                 </m:sub>
                               </m:sSub>
@@ -7255,7 +7185,7 @@
                                     <a:schemeClr val="dk1"/>
                                   </a:solidFill>
                                   <a:effectLst/>
-                                  <a:latin typeface="+mn-lt"/>
+                                  <a:latin typeface="Cambria Math" panose="02040503050406030204" pitchFamily="18" charset="0"/>
                                   <a:ea typeface="+mn-ea"/>
                                   <a:cs typeface="+mn-cs"/>
                                 </a:rPr>
@@ -7269,7 +7199,7 @@
                                         <a:schemeClr val="dk1"/>
                                       </a:solidFill>
                                       <a:effectLst/>
-                                      <a:latin typeface="+mn-lt"/>
+                                      <a:latin typeface="Cambria Math" panose="02040503050406030204" pitchFamily="18" charset="0"/>
                                       <a:ea typeface="+mn-ea"/>
                                       <a:cs typeface="+mn-cs"/>
                                     </a:rPr>
@@ -7282,7 +7212,7 @@
                                         <a:schemeClr val="dk1"/>
                                       </a:solidFill>
                                       <a:effectLst/>
-                                      <a:latin typeface="+mn-lt"/>
+                                      <a:latin typeface="Cambria Math" panose="02040503050406030204" pitchFamily="18" charset="0"/>
                                       <a:ea typeface="+mn-ea"/>
                                       <a:cs typeface="+mn-cs"/>
                                     </a:rPr>
@@ -7296,7 +7226,7 @@
                                         <a:schemeClr val="dk1"/>
                                       </a:solidFill>
                                       <a:effectLst/>
-                                      <a:latin typeface="+mn-lt"/>
+                                      <a:latin typeface="Cambria Math" panose="02040503050406030204" pitchFamily="18" charset="0"/>
                                       <a:ea typeface="+mn-ea"/>
                                       <a:cs typeface="+mn-cs"/>
                                     </a:rPr>
@@ -7312,7 +7242,7 @@
                                         <a:schemeClr val="dk1"/>
                                       </a:solidFill>
                                       <a:effectLst/>
-                                      <a:latin typeface="+mn-lt"/>
+                                      <a:latin typeface="Cambria Math" panose="02040503050406030204" pitchFamily="18" charset="0"/>
                                       <a:ea typeface="+mn-ea"/>
                                       <a:cs typeface="+mn-cs"/>
                                     </a:rPr>
@@ -7325,7 +7255,7 @@
                                         <a:schemeClr val="dk1"/>
                                       </a:solidFill>
                                       <a:effectLst/>
-                                      <a:latin typeface="+mn-lt"/>
+                                      <a:latin typeface="Cambria Math" panose="02040503050406030204" pitchFamily="18" charset="0"/>
                                       <a:ea typeface="+mn-ea"/>
                                       <a:cs typeface="+mn-cs"/>
                                     </a:rPr>
@@ -7334,12 +7264,12 @@
                                 </m:e>
                                 <m:sub>
                                   <m:r>
-                                    <a:rPr lang="en-US" sz="2800" i="1" kern="1200">
+                                    <a:rPr lang="en-US" sz="2800" b="0" i="1" kern="1200" smtClean="0">
                                       <a:solidFill>
                                         <a:schemeClr val="dk1"/>
                                       </a:solidFill>
                                       <a:effectLst/>
-                                      <a:latin typeface="+mn-lt"/>
+                                      <a:latin typeface="Cambria Math" panose="02040503050406030204" pitchFamily="18" charset="0"/>
                                       <a:ea typeface="+mn-ea"/>
                                       <a:cs typeface="+mn-cs"/>
                                     </a:rPr>
@@ -7351,19 +7281,19 @@
                                         <a:schemeClr val="dk1"/>
                                       </a:solidFill>
                                       <a:effectLst/>
-                                      <a:latin typeface="+mn-lt"/>
+                                      <a:latin typeface="Cambria Math" panose="02040503050406030204" pitchFamily="18" charset="0"/>
                                       <a:ea typeface="+mn-ea"/>
                                       <a:cs typeface="+mn-cs"/>
                                     </a:rPr>
                                     <m:t>.</m:t>
                                   </m:r>
                                   <m:r>
-                                    <a:rPr lang="en-US" sz="2800" i="1" kern="1200">
+                                    <a:rPr lang="en-US" sz="2800" b="0" i="1" kern="1200" smtClean="0">
                                       <a:solidFill>
                                         <a:schemeClr val="dk1"/>
                                       </a:solidFill>
                                       <a:effectLst/>
-                                      <a:latin typeface="+mn-lt"/>
+                                      <a:latin typeface="Cambria Math" panose="02040503050406030204" pitchFamily="18" charset="0"/>
                                       <a:ea typeface="+mn-ea"/>
                                       <a:cs typeface="+mn-cs"/>
                                     </a:rPr>
@@ -7377,7 +7307,7 @@
                                     <a:schemeClr val="dk1"/>
                                   </a:solidFill>
                                   <a:effectLst/>
-                                  <a:latin typeface="+mn-lt"/>
+                                  <a:latin typeface="Cambria Math" panose="02040503050406030204" pitchFamily="18" charset="0"/>
                                   <a:ea typeface="+mn-ea"/>
                                   <a:cs typeface="+mn-cs"/>
                                 </a:rPr>
@@ -7391,7 +7321,7 @@
                                         <a:schemeClr val="dk1"/>
                                       </a:solidFill>
                                       <a:effectLst/>
-                                      <a:latin typeface="+mn-lt"/>
+                                      <a:latin typeface="Cambria Math" panose="02040503050406030204" pitchFamily="18" charset="0"/>
                                       <a:ea typeface="+mn-ea"/>
                                       <a:cs typeface="+mn-cs"/>
                                     </a:rPr>
@@ -7404,7 +7334,7 @@
                                         <a:schemeClr val="dk1"/>
                                       </a:solidFill>
                                       <a:effectLst/>
-                                      <a:latin typeface="+mn-lt"/>
+                                      <a:latin typeface="Cambria Math" panose="02040503050406030204" pitchFamily="18" charset="0"/>
                                       <a:ea typeface="+mn-ea"/>
                                       <a:cs typeface="+mn-cs"/>
                                     </a:rPr>
@@ -7418,7 +7348,7 @@
                                         <a:schemeClr val="dk1"/>
                                       </a:solidFill>
                                       <a:effectLst/>
-                                      <a:latin typeface="+mn-lt"/>
+                                      <a:latin typeface="Cambria Math" panose="02040503050406030204" pitchFamily="18" charset="0"/>
                                       <a:ea typeface="+mn-ea"/>
                                       <a:cs typeface="+mn-cs"/>
                                     </a:rPr>
@@ -7434,7 +7364,7 @@
                                         <a:schemeClr val="dk1"/>
                                       </a:solidFill>
                                       <a:effectLst/>
-                                      <a:latin typeface="+mn-lt"/>
+                                      <a:latin typeface="Cambria Math" panose="02040503050406030204" pitchFamily="18" charset="0"/>
                                       <a:ea typeface="+mn-ea"/>
                                       <a:cs typeface="+mn-cs"/>
                                     </a:rPr>
@@ -7447,7 +7377,7 @@
                                         <a:schemeClr val="dk1"/>
                                       </a:solidFill>
                                       <a:effectLst/>
-                                      <a:latin typeface="+mn-lt"/>
+                                      <a:latin typeface="Cambria Math" panose="02040503050406030204" pitchFamily="18" charset="0"/>
                                       <a:ea typeface="+mn-ea"/>
                                       <a:cs typeface="+mn-cs"/>
                                     </a:rPr>
@@ -7461,11 +7391,23 @@
                                         <a:schemeClr val="dk1"/>
                                       </a:solidFill>
                                       <a:effectLst/>
-                                      <a:latin typeface="+mn-lt"/>
+                                      <a:latin typeface="Cambria Math" panose="02040503050406030204" pitchFamily="18" charset="0"/>
                                       <a:ea typeface="+mn-ea"/>
                                       <a:cs typeface="+mn-cs"/>
                                     </a:rPr>
                                     <m:t>𝑓𝑒𝑒𝑑</m:t>
+                                  </m:r>
+                                  <m:r>
+                                    <a:rPr lang="en-US" sz="2800" b="0" i="1" kern="1200" smtClean="0">
+                                      <a:solidFill>
+                                        <a:schemeClr val="dk1"/>
+                                      </a:solidFill>
+                                      <a:effectLst/>
+                                      <a:latin typeface="Cambria Math" panose="02040503050406030204" pitchFamily="18" charset="0"/>
+                                      <a:ea typeface="+mn-ea"/>
+                                      <a:cs typeface="+mn-cs"/>
+                                    </a:rPr>
+                                    <m:t>𝑖𝑛𝑔</m:t>
                                   </m:r>
                                   <m:r>
                                     <a:rPr lang="en-US" sz="2800" i="1" kern="1200">
@@ -7473,7 +7415,7 @@
                                         <a:schemeClr val="dk1"/>
                                       </a:solidFill>
                                       <a:effectLst/>
-                                      <a:latin typeface="+mn-lt"/>
+                                      <a:latin typeface="Cambria Math" panose="02040503050406030204" pitchFamily="18" charset="0"/>
                                       <a:ea typeface="+mn-ea"/>
                                       <a:cs typeface="+mn-cs"/>
                                     </a:rPr>
@@ -7485,7 +7427,7 @@
                                         <a:schemeClr val="dk1"/>
                                       </a:solidFill>
                                       <a:effectLst/>
-                                      <a:latin typeface="+mn-lt"/>
+                                      <a:latin typeface="Cambria Math" panose="02040503050406030204" pitchFamily="18" charset="0"/>
                                       <a:ea typeface="+mn-ea"/>
                                       <a:cs typeface="+mn-cs"/>
                                     </a:rPr>
@@ -7499,7 +7441,7 @@
                                     <a:schemeClr val="dk1"/>
                                   </a:solidFill>
                                   <a:effectLst/>
-                                  <a:latin typeface="+mn-lt"/>
+                                  <a:latin typeface="Cambria Math" panose="02040503050406030204" pitchFamily="18" charset="0"/>
                                   <a:ea typeface="+mn-ea"/>
                                   <a:cs typeface="+mn-cs"/>
                                 </a:rPr>
@@ -7513,7 +7455,7 @@
                                         <a:schemeClr val="dk1"/>
                                       </a:solidFill>
                                       <a:effectLst/>
-                                      <a:latin typeface="+mn-lt"/>
+                                      <a:latin typeface="Cambria Math" panose="02040503050406030204" pitchFamily="18" charset="0"/>
                                       <a:ea typeface="+mn-ea"/>
                                       <a:cs typeface="+mn-cs"/>
                                     </a:rPr>
@@ -7526,7 +7468,7 @@
                                         <a:schemeClr val="dk1"/>
                                       </a:solidFill>
                                       <a:effectLst/>
-                                      <a:latin typeface="+mn-lt"/>
+                                      <a:latin typeface="Cambria Math" panose="02040503050406030204" pitchFamily="18" charset="0"/>
                                       <a:ea typeface="+mn-ea"/>
                                       <a:cs typeface="+mn-cs"/>
                                     </a:rPr>
@@ -7540,7 +7482,7 @@
                                         <a:schemeClr val="dk1"/>
                                       </a:solidFill>
                                       <a:effectLst/>
-                                      <a:latin typeface="+mn-lt"/>
+                                      <a:latin typeface="Cambria Math" panose="02040503050406030204" pitchFamily="18" charset="0"/>
                                       <a:ea typeface="+mn-ea"/>
                                       <a:cs typeface="+mn-cs"/>
                                     </a:rPr>
@@ -7556,7 +7498,7 @@
                                         <a:schemeClr val="dk1"/>
                                       </a:solidFill>
                                       <a:effectLst/>
-                                      <a:latin typeface="+mn-lt"/>
+                                      <a:latin typeface="Cambria Math" panose="02040503050406030204" pitchFamily="18" charset="0"/>
                                       <a:ea typeface="+mn-ea"/>
                                       <a:cs typeface="+mn-cs"/>
                                     </a:rPr>
@@ -7569,7 +7511,7 @@
                                         <a:schemeClr val="dk1"/>
                                       </a:solidFill>
                                       <a:effectLst/>
-                                      <a:latin typeface="+mn-lt"/>
+                                      <a:latin typeface="Cambria Math" panose="02040503050406030204" pitchFamily="18" charset="0"/>
                                       <a:ea typeface="+mn-ea"/>
                                       <a:cs typeface="+mn-cs"/>
                                     </a:rPr>
@@ -7583,7 +7525,7 @@
                                         <a:schemeClr val="dk1"/>
                                       </a:solidFill>
                                       <a:effectLst/>
-                                      <a:latin typeface="+mn-lt"/>
+                                      <a:latin typeface="Cambria Math" panose="02040503050406030204" pitchFamily="18" charset="0"/>
                                       <a:ea typeface="+mn-ea"/>
                                       <a:cs typeface="+mn-cs"/>
                                     </a:rPr>
@@ -7595,11 +7537,11 @@
                                         <a:schemeClr val="dk1"/>
                                       </a:solidFill>
                                       <a:effectLst/>
-                                      <a:latin typeface="+mn-lt"/>
+                                      <a:latin typeface="Cambria Math" panose="02040503050406030204" pitchFamily="18" charset="0"/>
                                       <a:ea typeface="+mn-ea"/>
                                       <a:cs typeface="+mn-cs"/>
                                     </a:rPr>
-                                    <m:t>𝑒𝑙𝑡</m:t>
+                                    <m:t>𝑒𝑎</m:t>
                                   </m:r>
                                   <m:r>
                                     <a:rPr lang="en-US" sz="2800" i="1" kern="1200">
@@ -7607,7 +7549,19 @@
                                         <a:schemeClr val="dk1"/>
                                       </a:solidFill>
                                       <a:effectLst/>
-                                      <a:latin typeface="+mn-lt"/>
+                                      <a:latin typeface="Cambria Math" panose="02040503050406030204" pitchFamily="18" charset="0"/>
+                                      <a:ea typeface="+mn-ea"/>
+                                      <a:cs typeface="+mn-cs"/>
+                                    </a:rPr>
+                                    <m:t>𝑙𝑡</m:t>
+                                  </m:r>
+                                  <m:r>
+                                    <a:rPr lang="en-US" sz="2800" i="1" kern="1200">
+                                      <a:solidFill>
+                                        <a:schemeClr val="dk1"/>
+                                      </a:solidFill>
+                                      <a:effectLst/>
+                                      <a:latin typeface="Cambria Math" panose="02040503050406030204" pitchFamily="18" charset="0"/>
                                       <a:ea typeface="+mn-ea"/>
                                       <a:cs typeface="+mn-cs"/>
                                     </a:rPr>
@@ -7619,7 +7573,7 @@
                                         <a:schemeClr val="dk1"/>
                                       </a:solidFill>
                                       <a:effectLst/>
-                                      <a:latin typeface="+mn-lt"/>
+                                      <a:latin typeface="Cambria Math" panose="02040503050406030204" pitchFamily="18" charset="0"/>
                                       <a:ea typeface="+mn-ea"/>
                                       <a:cs typeface="+mn-cs"/>
                                     </a:rPr>
@@ -7631,7 +7585,7 @@
                                         <a:schemeClr val="dk1"/>
                                       </a:solidFill>
                                       <a:effectLst/>
-                                      <a:latin typeface="+mn-lt"/>
+                                      <a:latin typeface="Cambria Math" panose="02040503050406030204" pitchFamily="18" charset="0"/>
                                       <a:ea typeface="+mn-ea"/>
                                       <a:cs typeface="+mn-cs"/>
                                     </a:rPr>
@@ -7643,7 +7597,7 @@
                                         <a:schemeClr val="dk1"/>
                                       </a:solidFill>
                                       <a:effectLst/>
-                                      <a:latin typeface="+mn-lt"/>
+                                      <a:latin typeface="Cambria Math" panose="02040503050406030204" pitchFamily="18" charset="0"/>
                                       <a:ea typeface="+mn-ea"/>
                                       <a:cs typeface="+mn-cs"/>
                                     </a:rPr>
@@ -7655,7 +7609,7 @@
                                         <a:schemeClr val="dk1"/>
                                       </a:solidFill>
                                       <a:effectLst/>
-                                      <a:latin typeface="+mn-lt"/>
+                                      <a:latin typeface="Cambria Math" panose="02040503050406030204" pitchFamily="18" charset="0"/>
                                       <a:ea typeface="+mn-ea"/>
                                       <a:cs typeface="+mn-cs"/>
                                     </a:rPr>
@@ -7667,7 +7621,7 @@
                                         <a:schemeClr val="dk1"/>
                                       </a:solidFill>
                                       <a:effectLst/>
-                                      <a:latin typeface="+mn-lt"/>
+                                      <a:latin typeface="Cambria Math" panose="02040503050406030204" pitchFamily="18" charset="0"/>
                                       <a:ea typeface="+mn-ea"/>
                                       <a:cs typeface="+mn-cs"/>
                                     </a:rPr>
@@ -7681,7 +7635,7 @@
                                     <a:schemeClr val="dk1"/>
                                   </a:solidFill>
                                   <a:effectLst/>
-                                  <a:latin typeface="+mn-lt"/>
+                                  <a:latin typeface="Cambria Math" panose="02040503050406030204" pitchFamily="18" charset="0"/>
                                   <a:ea typeface="+mn-ea"/>
                                   <a:cs typeface="+mn-cs"/>
                                 </a:rPr>
@@ -7695,7 +7649,7 @@
                                         <a:schemeClr val="dk1"/>
                                       </a:solidFill>
                                       <a:effectLst/>
-                                      <a:latin typeface="+mn-lt"/>
+                                      <a:latin typeface="Cambria Math" panose="02040503050406030204" pitchFamily="18" charset="0"/>
                                       <a:ea typeface="+mn-ea"/>
                                       <a:cs typeface="+mn-cs"/>
                                     </a:rPr>
@@ -7708,7 +7662,7 @@
                                         <a:schemeClr val="dk1"/>
                                       </a:solidFill>
                                       <a:effectLst/>
-                                      <a:latin typeface="+mn-lt"/>
+                                      <a:latin typeface="Cambria Math" panose="02040503050406030204" pitchFamily="18" charset="0"/>
                                       <a:ea typeface="+mn-ea"/>
                                       <a:cs typeface="+mn-cs"/>
                                     </a:rPr>
@@ -7722,7 +7676,7 @@
                                         <a:schemeClr val="dk1"/>
                                       </a:solidFill>
                                       <a:effectLst/>
-                                      <a:latin typeface="+mn-lt"/>
+                                      <a:latin typeface="Cambria Math" panose="02040503050406030204" pitchFamily="18" charset="0"/>
                                       <a:ea typeface="+mn-ea"/>
                                       <a:cs typeface="+mn-cs"/>
                                     </a:rPr>
@@ -7738,7 +7692,7 @@
                                         <a:schemeClr val="dk1"/>
                                       </a:solidFill>
                                       <a:effectLst/>
-                                      <a:latin typeface="+mn-lt"/>
+                                      <a:latin typeface="Cambria Math" panose="02040503050406030204" pitchFamily="18" charset="0"/>
                                       <a:ea typeface="+mn-ea"/>
                                       <a:cs typeface="+mn-cs"/>
                                     </a:rPr>
@@ -7751,7 +7705,7 @@
                                         <a:schemeClr val="dk1"/>
                                       </a:solidFill>
                                       <a:effectLst/>
-                                      <a:latin typeface="+mn-lt"/>
+                                      <a:latin typeface="Cambria Math" panose="02040503050406030204" pitchFamily="18" charset="0"/>
                                       <a:ea typeface="+mn-ea"/>
                                       <a:cs typeface="+mn-cs"/>
                                     </a:rPr>
@@ -7765,7 +7719,7 @@
                                         <a:schemeClr val="dk1"/>
                                       </a:solidFill>
                                       <a:effectLst/>
-                                      <a:latin typeface="+mn-lt"/>
+                                      <a:latin typeface="Cambria Math" panose="02040503050406030204" pitchFamily="18" charset="0"/>
                                       <a:ea typeface="+mn-ea"/>
                                       <a:cs typeface="+mn-cs"/>
                                     </a:rPr>
@@ -7777,11 +7731,11 @@
                                         <a:schemeClr val="dk1"/>
                                       </a:solidFill>
                                       <a:effectLst/>
-                                      <a:latin typeface="+mn-lt"/>
+                                      <a:latin typeface="Cambria Math" panose="02040503050406030204" pitchFamily="18" charset="0"/>
                                       <a:ea typeface="+mn-ea"/>
                                       <a:cs typeface="+mn-cs"/>
                                     </a:rPr>
-                                    <m:t>𝑒𝑙𝑡</m:t>
+                                    <m:t>𝑒𝑎</m:t>
                                   </m:r>
                                   <m:r>
                                     <a:rPr lang="en-US" sz="2800" i="1" kern="1200">
@@ -7789,7 +7743,19 @@
                                         <a:schemeClr val="dk1"/>
                                       </a:solidFill>
                                       <a:effectLst/>
-                                      <a:latin typeface="+mn-lt"/>
+                                      <a:latin typeface="Cambria Math" panose="02040503050406030204" pitchFamily="18" charset="0"/>
+                                      <a:ea typeface="+mn-ea"/>
+                                      <a:cs typeface="+mn-cs"/>
+                                    </a:rPr>
+                                    <m:t>𝑙𝑡</m:t>
+                                  </m:r>
+                                  <m:r>
+                                    <a:rPr lang="en-US" sz="2800" i="1" kern="1200">
+                                      <a:solidFill>
+                                        <a:schemeClr val="dk1"/>
+                                      </a:solidFill>
+                                      <a:effectLst/>
+                                      <a:latin typeface="Cambria Math" panose="02040503050406030204" pitchFamily="18" charset="0"/>
                                       <a:ea typeface="+mn-ea"/>
                                       <a:cs typeface="+mn-cs"/>
                                     </a:rPr>
@@ -7801,7 +7767,7 @@
                                         <a:schemeClr val="dk1"/>
                                       </a:solidFill>
                                       <a:effectLst/>
-                                      <a:latin typeface="+mn-lt"/>
+                                      <a:latin typeface="Cambria Math" panose="02040503050406030204" pitchFamily="18" charset="0"/>
                                       <a:ea typeface="+mn-ea"/>
                                       <a:cs typeface="+mn-cs"/>
                                     </a:rPr>
@@ -7813,7 +7779,7 @@
                                         <a:schemeClr val="dk1"/>
                                       </a:solidFill>
                                       <a:effectLst/>
-                                      <a:latin typeface="+mn-lt"/>
+                                      <a:latin typeface="Cambria Math" panose="02040503050406030204" pitchFamily="18" charset="0"/>
                                       <a:ea typeface="+mn-ea"/>
                                       <a:cs typeface="+mn-cs"/>
                                     </a:rPr>
@@ -7825,7 +7791,7 @@
                                         <a:schemeClr val="dk1"/>
                                       </a:solidFill>
                                       <a:effectLst/>
-                                      <a:latin typeface="+mn-lt"/>
+                                      <a:latin typeface="Cambria Math" panose="02040503050406030204" pitchFamily="18" charset="0"/>
                                       <a:ea typeface="+mn-ea"/>
                                       <a:cs typeface="+mn-cs"/>
                                     </a:rPr>
@@ -7837,7 +7803,7 @@
                                         <a:schemeClr val="dk1"/>
                                       </a:solidFill>
                                       <a:effectLst/>
-                                      <a:latin typeface="+mn-lt"/>
+                                      <a:latin typeface="Cambria Math" panose="02040503050406030204" pitchFamily="18" charset="0"/>
                                       <a:ea typeface="+mn-ea"/>
                                       <a:cs typeface="+mn-cs"/>
                                     </a:rPr>
@@ -7849,7 +7815,7 @@
                                         <a:schemeClr val="dk1"/>
                                       </a:solidFill>
                                       <a:effectLst/>
-                                      <a:latin typeface="+mn-lt"/>
+                                      <a:latin typeface="Cambria Math" panose="02040503050406030204" pitchFamily="18" charset="0"/>
                                       <a:ea typeface="+mn-ea"/>
                                       <a:cs typeface="+mn-cs"/>
                                     </a:rPr>
@@ -7863,7 +7829,7 @@
                                     <a:schemeClr val="dk1"/>
                                   </a:solidFill>
                                   <a:effectLst/>
-                                  <a:latin typeface="+mn-lt"/>
+                                  <a:latin typeface="Cambria Math" panose="02040503050406030204" pitchFamily="18" charset="0"/>
                                   <a:ea typeface="+mn-ea"/>
                                   <a:cs typeface="+mn-cs"/>
                                 </a:rPr>
@@ -7877,7 +7843,7 @@
                                         <a:schemeClr val="dk1"/>
                                       </a:solidFill>
                                       <a:effectLst/>
-                                      <a:latin typeface="+mn-lt"/>
+                                      <a:latin typeface="Cambria Math" panose="02040503050406030204" pitchFamily="18" charset="0"/>
                                       <a:ea typeface="+mn-ea"/>
                                       <a:cs typeface="+mn-cs"/>
                                     </a:rPr>
@@ -7890,7 +7856,7 @@
                                         <a:schemeClr val="dk1"/>
                                       </a:solidFill>
                                       <a:effectLst/>
-                                      <a:latin typeface="+mn-lt"/>
+                                      <a:latin typeface="Cambria Math" panose="02040503050406030204" pitchFamily="18" charset="0"/>
                                       <a:ea typeface="+mn-ea"/>
                                       <a:cs typeface="+mn-cs"/>
                                     </a:rPr>
@@ -7904,7 +7870,7 @@
                                         <a:schemeClr val="dk1"/>
                                       </a:solidFill>
                                       <a:effectLst/>
-                                      <a:latin typeface="+mn-lt"/>
+                                      <a:latin typeface="Cambria Math" panose="02040503050406030204" pitchFamily="18" charset="0"/>
                                       <a:ea typeface="+mn-ea"/>
                                       <a:cs typeface="+mn-cs"/>
                                     </a:rPr>
@@ -7918,7 +7884,7 @@
                                     <a:schemeClr val="dk1"/>
                                   </a:solidFill>
                                   <a:effectLst/>
-                                  <a:latin typeface="+mn-lt"/>
+                                  <a:latin typeface="Cambria Math" panose="02040503050406030204" pitchFamily="18" charset="0"/>
                                   <a:ea typeface="+mn-ea"/>
                                   <a:cs typeface="+mn-cs"/>
                                 </a:rPr>
@@ -7930,7 +7896,7 @@
                                     <a:schemeClr val="dk1"/>
                                   </a:solidFill>
                                   <a:effectLst/>
-                                  <a:latin typeface="+mn-lt"/>
+                                  <a:latin typeface="Cambria Math" panose="02040503050406030204" pitchFamily="18" charset="0"/>
                                   <a:ea typeface="+mn-ea"/>
                                   <a:cs typeface="+mn-cs"/>
                                 </a:rPr>
@@ -7942,7 +7908,7 @@
                                     <a:schemeClr val="dk1"/>
                                   </a:solidFill>
                                   <a:effectLst/>
-                                  <a:latin typeface="+mn-lt"/>
+                                  <a:latin typeface="Cambria Math" panose="02040503050406030204" pitchFamily="18" charset="0"/>
                                   <a:ea typeface="+mn-ea"/>
                                   <a:cs typeface="+mn-cs"/>
                                 </a:rPr>
@@ -7956,7 +7922,7 @@
                                         <a:schemeClr val="dk1"/>
                                       </a:solidFill>
                                       <a:effectLst/>
-                                      <a:latin typeface="+mn-lt"/>
+                                      <a:latin typeface="Cambria Math" panose="02040503050406030204" pitchFamily="18" charset="0"/>
                                       <a:ea typeface="+mn-ea"/>
                                       <a:cs typeface="+mn-cs"/>
                                     </a:rPr>
@@ -7969,7 +7935,7 @@
                                         <a:schemeClr val="dk1"/>
                                       </a:solidFill>
                                       <a:effectLst/>
-                                      <a:latin typeface="+mn-lt"/>
+                                      <a:latin typeface="Cambria Math" panose="02040503050406030204" pitchFamily="18" charset="0"/>
                                       <a:ea typeface="+mn-ea"/>
                                       <a:cs typeface="+mn-cs"/>
                                     </a:rPr>
@@ -7983,7 +7949,7 @@
                                         <a:schemeClr val="dk1"/>
                                       </a:solidFill>
                                       <a:effectLst/>
-                                      <a:latin typeface="+mn-lt"/>
+                                      <a:latin typeface="Cambria Math" panose="02040503050406030204" pitchFamily="18" charset="0"/>
                                       <a:ea typeface="+mn-ea"/>
                                       <a:cs typeface="+mn-cs"/>
                                     </a:rPr>
@@ -7997,7 +7963,7 @@
                                     <a:schemeClr val="dk1"/>
                                   </a:solidFill>
                                   <a:effectLst/>
-                                  <a:latin typeface="+mn-lt"/>
+                                  <a:latin typeface="Cambria Math" panose="02040503050406030204" pitchFamily="18" charset="0"/>
                                   <a:ea typeface="+mn-ea"/>
                                   <a:cs typeface="+mn-cs"/>
                                 </a:rPr>
@@ -8011,7 +7977,7 @@
                                         <a:schemeClr val="dk1"/>
                                       </a:solidFill>
                                       <a:effectLst/>
-                                      <a:latin typeface="+mn-lt"/>
+                                      <a:latin typeface="Cambria Math" panose="02040503050406030204" pitchFamily="18" charset="0"/>
                                       <a:ea typeface="+mn-ea"/>
                                       <a:cs typeface="+mn-cs"/>
                                     </a:rPr>
@@ -8024,7 +7990,7 @@
                                         <a:schemeClr val="dk1"/>
                                       </a:solidFill>
                                       <a:effectLst/>
-                                      <a:latin typeface="+mn-lt"/>
+                                      <a:latin typeface="Cambria Math" panose="02040503050406030204" pitchFamily="18" charset="0"/>
                                       <a:ea typeface="+mn-ea"/>
                                       <a:cs typeface="+mn-cs"/>
                                     </a:rPr>
@@ -8038,7 +8004,7 @@
                                         <a:schemeClr val="dk1"/>
                                       </a:solidFill>
                                       <a:effectLst/>
-                                      <a:latin typeface="+mn-lt"/>
+                                      <a:latin typeface="Cambria Math" panose="02040503050406030204" pitchFamily="18" charset="0"/>
                                       <a:ea typeface="+mn-ea"/>
                                       <a:cs typeface="+mn-cs"/>
                                     </a:rPr>
@@ -8054,7 +8020,7 @@
                                         <a:schemeClr val="dk1"/>
                                       </a:solidFill>
                                       <a:effectLst/>
-                                      <a:latin typeface="+mn-lt"/>
+                                      <a:latin typeface="Cambria Math" panose="02040503050406030204" pitchFamily="18" charset="0"/>
                                       <a:ea typeface="+mn-ea"/>
                                       <a:cs typeface="+mn-cs"/>
                                     </a:rPr>
@@ -8067,7 +8033,7 @@
                                         <a:schemeClr val="dk1"/>
                                       </a:solidFill>
                                       <a:effectLst/>
-                                      <a:latin typeface="+mn-lt"/>
+                                      <a:latin typeface="Cambria Math" panose="02040503050406030204" pitchFamily="18" charset="0"/>
                                       <a:ea typeface="+mn-ea"/>
                                       <a:cs typeface="+mn-cs"/>
                                     </a:rPr>
@@ -8081,7 +8047,7 @@
                                         <a:schemeClr val="dk1"/>
                                       </a:solidFill>
                                       <a:effectLst/>
-                                      <a:latin typeface="+mn-lt"/>
+                                      <a:latin typeface="Cambria Math" panose="02040503050406030204" pitchFamily="18" charset="0"/>
                                       <a:ea typeface="+mn-ea"/>
                                       <a:cs typeface="+mn-cs"/>
                                     </a:rPr>
@@ -8093,7 +8059,7 @@
                                         <a:schemeClr val="dk1"/>
                                       </a:solidFill>
                                       <a:effectLst/>
-                                      <a:latin typeface="+mn-lt"/>
+                                      <a:latin typeface="Cambria Math" panose="02040503050406030204" pitchFamily="18" charset="0"/>
                                       <a:ea typeface="+mn-ea"/>
                                       <a:cs typeface="+mn-cs"/>
                                     </a:rPr>
@@ -8105,7 +8071,7 @@
                                         <a:schemeClr val="dk1"/>
                                       </a:solidFill>
                                       <a:effectLst/>
-                                      <a:latin typeface="+mn-lt"/>
+                                      <a:latin typeface="Cambria Math" panose="02040503050406030204" pitchFamily="18" charset="0"/>
                                       <a:ea typeface="+mn-ea"/>
                                       <a:cs typeface="+mn-cs"/>
                                     </a:rPr>
@@ -8119,7 +8085,7 @@
                                             <a:schemeClr val="dk1"/>
                                           </a:solidFill>
                                           <a:effectLst/>
-                                          <a:latin typeface="+mn-lt"/>
+                                          <a:latin typeface="Cambria Math" panose="02040503050406030204" pitchFamily="18" charset="0"/>
                                           <a:ea typeface="+mn-ea"/>
                                           <a:cs typeface="+mn-cs"/>
                                         </a:rPr>
@@ -8132,7 +8098,7 @@
                                             <a:schemeClr val="dk1"/>
                                           </a:solidFill>
                                           <a:effectLst/>
-                                          <a:latin typeface="+mn-lt"/>
+                                          <a:latin typeface="Cambria Math" panose="02040503050406030204" pitchFamily="18" charset="0"/>
                                           <a:ea typeface="+mn-ea"/>
                                           <a:cs typeface="+mn-cs"/>
                                         </a:rPr>
@@ -8146,7 +8112,7 @@
                                             <a:schemeClr val="dk1"/>
                                           </a:solidFill>
                                           <a:effectLst/>
-                                          <a:latin typeface="+mn-lt"/>
+                                          <a:latin typeface="Cambria Math" panose="02040503050406030204" pitchFamily="18" charset="0"/>
                                           <a:ea typeface="+mn-ea"/>
                                           <a:cs typeface="+mn-cs"/>
                                         </a:rPr>
@@ -8158,7 +8124,7 @@
                                             <a:schemeClr val="dk1"/>
                                           </a:solidFill>
                                           <a:effectLst/>
-                                          <a:latin typeface="+mn-lt"/>
+                                          <a:latin typeface="Cambria Math" panose="02040503050406030204" pitchFamily="18" charset="0"/>
                                           <a:ea typeface="+mn-ea"/>
                                           <a:cs typeface="+mn-cs"/>
                                         </a:rPr>
@@ -8170,7 +8136,7 @@
                                             <a:schemeClr val="dk1"/>
                                           </a:solidFill>
                                           <a:effectLst/>
-                                          <a:latin typeface="+mn-lt"/>
+                                          <a:latin typeface="Cambria Math" panose="02040503050406030204" pitchFamily="18" charset="0"/>
                                           <a:ea typeface="+mn-ea"/>
                                           <a:cs typeface="+mn-cs"/>
                                         </a:rPr>
@@ -8186,7 +8152,7 @@
                                     <a:schemeClr val="dk1"/>
                                   </a:solidFill>
                                   <a:effectLst/>
-                                  <a:latin typeface="+mn-lt"/>
+                                  <a:latin typeface="Cambria Math" panose="02040503050406030204" pitchFamily="18" charset="0"/>
                                   <a:ea typeface="+mn-ea"/>
                                   <a:cs typeface="+mn-cs"/>
                                 </a:rPr>
@@ -8200,7 +8166,7 @@
                                         <a:schemeClr val="dk1"/>
                                       </a:solidFill>
                                       <a:effectLst/>
-                                      <a:latin typeface="+mn-lt"/>
+                                      <a:latin typeface="Cambria Math" panose="02040503050406030204" pitchFamily="18" charset="0"/>
                                       <a:ea typeface="+mn-ea"/>
                                       <a:cs typeface="+mn-cs"/>
                                     </a:rPr>
@@ -8213,7 +8179,7 @@
                                         <a:schemeClr val="dk1"/>
                                       </a:solidFill>
                                       <a:effectLst/>
-                                      <a:latin typeface="+mn-lt"/>
+                                      <a:latin typeface="Cambria Math" panose="02040503050406030204" pitchFamily="18" charset="0"/>
                                       <a:ea typeface="+mn-ea"/>
                                       <a:cs typeface="+mn-cs"/>
                                     </a:rPr>
@@ -8227,7 +8193,7 @@
                                         <a:schemeClr val="dk1"/>
                                       </a:solidFill>
                                       <a:effectLst/>
-                                      <a:latin typeface="+mn-lt"/>
+                                      <a:latin typeface="Cambria Math" panose="02040503050406030204" pitchFamily="18" charset="0"/>
                                       <a:ea typeface="+mn-ea"/>
                                       <a:cs typeface="+mn-cs"/>
                                     </a:rPr>
@@ -8243,7 +8209,7 @@
                                         <a:schemeClr val="dk1"/>
                                       </a:solidFill>
                                       <a:effectLst/>
-                                      <a:latin typeface="+mn-lt"/>
+                                      <a:latin typeface="Cambria Math" panose="02040503050406030204" pitchFamily="18" charset="0"/>
                                       <a:ea typeface="+mn-ea"/>
                                       <a:cs typeface="+mn-cs"/>
                                     </a:rPr>
@@ -8256,7 +8222,7 @@
                                         <a:schemeClr val="dk1"/>
                                       </a:solidFill>
                                       <a:effectLst/>
-                                      <a:latin typeface="+mn-lt"/>
+                                      <a:latin typeface="Cambria Math" panose="02040503050406030204" pitchFamily="18" charset="0"/>
                                       <a:ea typeface="+mn-ea"/>
                                       <a:cs typeface="+mn-cs"/>
                                     </a:rPr>
@@ -8270,7 +8236,7 @@
                                         <a:schemeClr val="dk1"/>
                                       </a:solidFill>
                                       <a:effectLst/>
-                                      <a:latin typeface="+mn-lt"/>
+                                      <a:latin typeface="Cambria Math" panose="02040503050406030204" pitchFamily="18" charset="0"/>
                                       <a:ea typeface="+mn-ea"/>
                                       <a:cs typeface="+mn-cs"/>
                                     </a:rPr>
@@ -8282,7 +8248,7 @@
                                         <a:schemeClr val="dk1"/>
                                       </a:solidFill>
                                       <a:effectLst/>
-                                      <a:latin typeface="+mn-lt"/>
+                                      <a:latin typeface="Cambria Math" panose="02040503050406030204" pitchFamily="18" charset="0"/>
                                       <a:ea typeface="+mn-ea"/>
                                       <a:cs typeface="+mn-cs"/>
                                     </a:rPr>
@@ -8294,7 +8260,7 @@
                                         <a:schemeClr val="dk1"/>
                                       </a:solidFill>
                                       <a:effectLst/>
-                                      <a:latin typeface="+mn-lt"/>
+                                      <a:latin typeface="Cambria Math" panose="02040503050406030204" pitchFamily="18" charset="0"/>
                                       <a:ea typeface="+mn-ea"/>
                                       <a:cs typeface="+mn-cs"/>
                                     </a:rPr>
@@ -8308,7 +8274,7 @@
                                             <a:schemeClr val="dk1"/>
                                           </a:solidFill>
                                           <a:effectLst/>
-                                          <a:latin typeface="+mn-lt"/>
+                                          <a:latin typeface="Cambria Math" panose="02040503050406030204" pitchFamily="18" charset="0"/>
                                           <a:ea typeface="+mn-ea"/>
                                           <a:cs typeface="+mn-cs"/>
                                         </a:rPr>
@@ -8321,7 +8287,7 @@
                                             <a:schemeClr val="dk1"/>
                                           </a:solidFill>
                                           <a:effectLst/>
-                                          <a:latin typeface="+mn-lt"/>
+                                          <a:latin typeface="Cambria Math" panose="02040503050406030204" pitchFamily="18" charset="0"/>
                                           <a:ea typeface="+mn-ea"/>
                                           <a:cs typeface="+mn-cs"/>
                                         </a:rPr>
@@ -8335,7 +8301,7 @@
                                             <a:schemeClr val="dk1"/>
                                           </a:solidFill>
                                           <a:effectLst/>
-                                          <a:latin typeface="+mn-lt"/>
+                                          <a:latin typeface="Cambria Math" panose="02040503050406030204" pitchFamily="18" charset="0"/>
                                           <a:ea typeface="+mn-ea"/>
                                           <a:cs typeface="+mn-cs"/>
                                         </a:rPr>
@@ -8353,6 +8319,18 @@
                                         </a:rPr>
                                         <m:t>𝑚</m:t>
                                       </m:r>
+                                      <m:r>
+                                        <a:rPr lang="en-US" sz="2800" b="0" i="1" kern="1200" smtClean="0">
+                                          <a:solidFill>
+                                            <a:schemeClr val="dk1"/>
+                                          </a:solidFill>
+                                          <a:effectLst/>
+                                          <a:latin typeface="Cambria Math" panose="02040503050406030204" pitchFamily="18" charset="0"/>
+                                          <a:ea typeface="+mn-ea"/>
+                                          <a:cs typeface="+mn-cs"/>
+                                        </a:rPr>
+                                        <m:t>𝑖𝑐</m:t>
+                                      </m:r>
                                     </m:sub>
                                   </m:sSub>
                                 </m:sub>
@@ -8363,7 +8341,7 @@
                                     <a:schemeClr val="dk1"/>
                                   </a:solidFill>
                                   <a:effectLst/>
-                                  <a:latin typeface="+mn-lt"/>
+                                  <a:latin typeface="Cambria Math" panose="02040503050406030204" pitchFamily="18" charset="0"/>
                                   <a:ea typeface="+mn-ea"/>
                                   <a:cs typeface="+mn-cs"/>
                                 </a:rPr>
@@ -8377,7 +8355,7 @@
                                         <a:schemeClr val="dk1"/>
                                       </a:solidFill>
                                       <a:effectLst/>
-                                      <a:latin typeface="+mn-lt"/>
+                                      <a:latin typeface="Cambria Math" panose="02040503050406030204" pitchFamily="18" charset="0"/>
                                       <a:ea typeface="+mn-ea"/>
                                       <a:cs typeface="+mn-cs"/>
                                     </a:rPr>
@@ -8390,7 +8368,7 @@
                                         <a:schemeClr val="dk1"/>
                                       </a:solidFill>
                                       <a:effectLst/>
-                                      <a:latin typeface="+mn-lt"/>
+                                      <a:latin typeface="Cambria Math" panose="02040503050406030204" pitchFamily="18" charset="0"/>
                                       <a:ea typeface="+mn-ea"/>
                                       <a:cs typeface="+mn-cs"/>
                                     </a:rPr>
@@ -8404,7 +8382,7 @@
                                         <a:schemeClr val="dk1"/>
                                       </a:solidFill>
                                       <a:effectLst/>
-                                      <a:latin typeface="+mn-lt"/>
+                                      <a:latin typeface="Cambria Math" panose="02040503050406030204" pitchFamily="18" charset="0"/>
                                       <a:ea typeface="+mn-ea"/>
                                       <a:cs typeface="+mn-cs"/>
                                     </a:rPr>
@@ -8420,7 +8398,7 @@
                                         <a:schemeClr val="dk1"/>
                                       </a:solidFill>
                                       <a:effectLst/>
-                                      <a:latin typeface="+mn-lt"/>
+                                      <a:latin typeface="Cambria Math" panose="02040503050406030204" pitchFamily="18" charset="0"/>
                                       <a:ea typeface="+mn-ea"/>
                                       <a:cs typeface="+mn-cs"/>
                                     </a:rPr>
@@ -8433,7 +8411,7 @@
                                         <a:schemeClr val="dk1"/>
                                       </a:solidFill>
                                       <a:effectLst/>
-                                      <a:latin typeface="+mn-lt"/>
+                                      <a:latin typeface="Cambria Math" panose="02040503050406030204" pitchFamily="18" charset="0"/>
                                       <a:ea typeface="+mn-ea"/>
                                       <a:cs typeface="+mn-cs"/>
                                     </a:rPr>
@@ -8447,7 +8425,7 @@
                                         <a:schemeClr val="dk1"/>
                                       </a:solidFill>
                                       <a:effectLst/>
-                                      <a:latin typeface="+mn-lt"/>
+                                      <a:latin typeface="Cambria Math" panose="02040503050406030204" pitchFamily="18" charset="0"/>
                                       <a:ea typeface="+mn-ea"/>
                                       <a:cs typeface="+mn-cs"/>
                                     </a:rPr>
@@ -8461,7 +8439,7 @@
                                             <a:schemeClr val="dk1"/>
                                           </a:solidFill>
                                           <a:effectLst/>
-                                          <a:latin typeface="+mn-lt"/>
+                                          <a:latin typeface="Cambria Math" panose="02040503050406030204" pitchFamily="18" charset="0"/>
                                           <a:ea typeface="+mn-ea"/>
                                           <a:cs typeface="+mn-cs"/>
                                         </a:rPr>
@@ -8474,7 +8452,7 @@
                                             <a:schemeClr val="dk1"/>
                                           </a:solidFill>
                                           <a:effectLst/>
-                                          <a:latin typeface="+mn-lt"/>
+                                          <a:latin typeface="Cambria Math" panose="02040503050406030204" pitchFamily="18" charset="0"/>
                                           <a:ea typeface="+mn-ea"/>
                                           <a:cs typeface="+mn-cs"/>
                                         </a:rPr>
@@ -8488,7 +8466,7 @@
                                             <a:schemeClr val="dk1"/>
                                           </a:solidFill>
                                           <a:effectLst/>
-                                          <a:latin typeface="+mn-lt"/>
+                                          <a:latin typeface="Cambria Math" panose="02040503050406030204" pitchFamily="18" charset="0"/>
                                           <a:ea typeface="+mn-ea"/>
                                           <a:cs typeface="+mn-cs"/>
                                         </a:rPr>
@@ -8500,7 +8478,7 @@
                                             <a:schemeClr val="dk1"/>
                                           </a:solidFill>
                                           <a:effectLst/>
-                                          <a:latin typeface="+mn-lt"/>
+                                          <a:latin typeface="Cambria Math" panose="02040503050406030204" pitchFamily="18" charset="0"/>
                                           <a:ea typeface="+mn-ea"/>
                                           <a:cs typeface="+mn-cs"/>
                                         </a:rPr>
@@ -8516,7 +8494,7 @@
                                     <a:schemeClr val="dk1"/>
                                   </a:solidFill>
                                   <a:effectLst/>
-                                  <a:latin typeface="+mn-lt"/>
+                                  <a:latin typeface="Cambria Math" panose="02040503050406030204" pitchFamily="18" charset="0"/>
                                   <a:ea typeface="+mn-ea"/>
                                   <a:cs typeface="+mn-cs"/>
                                 </a:rPr>
@@ -8530,7 +8508,7 @@
                                         <a:schemeClr val="dk1"/>
                                       </a:solidFill>
                                       <a:effectLst/>
-                                      <a:latin typeface="+mn-lt"/>
+                                      <a:latin typeface="Cambria Math" panose="02040503050406030204" pitchFamily="18" charset="0"/>
                                       <a:ea typeface="+mn-ea"/>
                                       <a:cs typeface="+mn-cs"/>
                                     </a:rPr>
@@ -8543,7 +8521,7 @@
                                         <a:schemeClr val="dk1"/>
                                       </a:solidFill>
                                       <a:effectLst/>
-                                      <a:latin typeface="+mn-lt"/>
+                                      <a:latin typeface="Cambria Math" panose="02040503050406030204" pitchFamily="18" charset="0"/>
                                       <a:ea typeface="+mn-ea"/>
                                       <a:cs typeface="+mn-cs"/>
                                     </a:rPr>
@@ -8557,7 +8535,7 @@
                                         <a:schemeClr val="dk1"/>
                                       </a:solidFill>
                                       <a:effectLst/>
-                                      <a:latin typeface="+mn-lt"/>
+                                      <a:latin typeface="Cambria Math" panose="02040503050406030204" pitchFamily="18" charset="0"/>
                                       <a:ea typeface="+mn-ea"/>
                                       <a:cs typeface="+mn-cs"/>
                                     </a:rPr>
@@ -8573,7 +8551,7 @@
                                         <a:schemeClr val="dk1"/>
                                       </a:solidFill>
                                       <a:effectLst/>
-                                      <a:latin typeface="+mn-lt"/>
+                                      <a:latin typeface="Cambria Math" panose="02040503050406030204" pitchFamily="18" charset="0"/>
                                       <a:ea typeface="+mn-ea"/>
                                       <a:cs typeface="+mn-cs"/>
                                     </a:rPr>
@@ -8586,7 +8564,7 @@
                                         <a:schemeClr val="dk1"/>
                                       </a:solidFill>
                                       <a:effectLst/>
-                                      <a:latin typeface="+mn-lt"/>
+                                      <a:latin typeface="Cambria Math" panose="02040503050406030204" pitchFamily="18" charset="0"/>
                                       <a:ea typeface="+mn-ea"/>
                                       <a:cs typeface="+mn-cs"/>
                                     </a:rPr>
@@ -8594,27 +8572,15 @@
                                   </m:r>
                                 </m:e>
                                 <m:sub>
-                                  <m:r>
-                                    <a:rPr lang="en-US" sz="2800" i="1" kern="1200">
-                                      <a:solidFill>
-                                        <a:schemeClr val="dk1"/>
-                                      </a:solidFill>
-                                      <a:effectLst/>
-                                      <a:latin typeface="+mn-lt"/>
-                                      <a:ea typeface="+mn-ea"/>
-                                      <a:cs typeface="+mn-cs"/>
-                                    </a:rPr>
-                                    <m:t>𝑛𝑢𝑟</m:t>
-                                  </m:r>
                                   <m:sSub>
                                     <m:sSubPr>
                                       <m:ctrlPr>
-                                        <a:rPr lang="en-US" sz="2800" i="1" kern="1200">
+                                        <a:rPr lang="en-US" sz="2800" b="0" i="1" kern="1200" smtClean="0">
                                           <a:solidFill>
                                             <a:schemeClr val="dk1"/>
                                           </a:solidFill>
                                           <a:effectLst/>
-                                          <a:latin typeface="+mn-lt"/>
+                                          <a:latin typeface="Cambria Math" panose="02040503050406030204" pitchFamily="18" charset="0"/>
                                           <a:ea typeface="+mn-ea"/>
                                           <a:cs typeface="+mn-cs"/>
                                         </a:rPr>
@@ -8622,26 +8588,26 @@
                                     </m:sSubPr>
                                     <m:e>
                                       <m:r>
-                                        <a:rPr lang="en-US" sz="2800" i="1" kern="1200">
+                                        <a:rPr lang="en-US" sz="2800" b="0" i="1" kern="1200" smtClean="0">
                                           <a:solidFill>
                                             <a:schemeClr val="dk1"/>
                                           </a:solidFill>
                                           <a:effectLst/>
-                                          <a:latin typeface="+mn-lt"/>
+                                          <a:latin typeface="Cambria Math" panose="02040503050406030204" pitchFamily="18" charset="0"/>
                                           <a:ea typeface="+mn-ea"/>
                                           <a:cs typeface="+mn-cs"/>
                                         </a:rPr>
-                                        <m:t>𝑠</m:t>
+                                        <m:t>𝑛𝑢𝑟𝑠</m:t>
                                       </m:r>
                                     </m:e>
                                     <m:sub>
                                       <m:r>
-                                        <a:rPr lang="en-US" sz="2800" i="1" kern="1200">
+                                        <a:rPr lang="en-US" sz="2800" b="0" i="1" kern="1200" smtClean="0">
                                           <a:solidFill>
                                             <a:schemeClr val="dk1"/>
                                           </a:solidFill>
                                           <a:effectLst/>
-                                          <a:latin typeface="+mn-lt"/>
+                                          <a:latin typeface="Cambria Math" panose="02040503050406030204" pitchFamily="18" charset="0"/>
                                           <a:ea typeface="+mn-ea"/>
                                           <a:cs typeface="+mn-cs"/>
                                         </a:rPr>
@@ -8657,7 +8623,7 @@
                                     <a:schemeClr val="dk1"/>
                                   </a:solidFill>
                                   <a:effectLst/>
-                                  <a:latin typeface="+mn-lt"/>
+                                  <a:latin typeface="Cambria Math" panose="02040503050406030204" pitchFamily="18" charset="0"/>
                                   <a:ea typeface="+mn-ea"/>
                                   <a:cs typeface="+mn-cs"/>
                                 </a:rPr>
@@ -8671,7 +8637,7 @@
                                         <a:schemeClr val="dk1"/>
                                       </a:solidFill>
                                       <a:effectLst/>
-                                      <a:latin typeface="+mn-lt"/>
+                                      <a:latin typeface="Cambria Math" panose="02040503050406030204" pitchFamily="18" charset="0"/>
                                       <a:ea typeface="+mn-ea"/>
                                       <a:cs typeface="+mn-cs"/>
                                     </a:rPr>
@@ -8684,7 +8650,7 @@
                                         <a:schemeClr val="dk1"/>
                                       </a:solidFill>
                                       <a:effectLst/>
-                                      <a:latin typeface="+mn-lt"/>
+                                      <a:latin typeface="Cambria Math" panose="02040503050406030204" pitchFamily="18" charset="0"/>
                                       <a:ea typeface="+mn-ea"/>
                                       <a:cs typeface="+mn-cs"/>
                                     </a:rPr>
@@ -8698,7 +8664,7 @@
                                         <a:schemeClr val="dk1"/>
                                       </a:solidFill>
                                       <a:effectLst/>
-                                      <a:latin typeface="+mn-lt"/>
+                                      <a:latin typeface="Cambria Math" panose="02040503050406030204" pitchFamily="18" charset="0"/>
                                       <a:ea typeface="+mn-ea"/>
                                       <a:cs typeface="+mn-cs"/>
                                     </a:rPr>
@@ -8714,7 +8680,7 @@
                                         <a:schemeClr val="dk1"/>
                                       </a:solidFill>
                                       <a:effectLst/>
-                                      <a:latin typeface="+mn-lt"/>
+                                      <a:latin typeface="Cambria Math" panose="02040503050406030204" pitchFamily="18" charset="0"/>
                                       <a:ea typeface="+mn-ea"/>
                                       <a:cs typeface="+mn-cs"/>
                                     </a:rPr>
@@ -8727,7 +8693,7 @@
                                         <a:schemeClr val="dk1"/>
                                       </a:solidFill>
                                       <a:effectLst/>
-                                      <a:latin typeface="+mn-lt"/>
+                                      <a:latin typeface="Cambria Math" panose="02040503050406030204" pitchFamily="18" charset="0"/>
                                       <a:ea typeface="+mn-ea"/>
                                       <a:cs typeface="+mn-cs"/>
                                     </a:rPr>
@@ -8741,7 +8707,7 @@
                                         <a:schemeClr val="dk1"/>
                                       </a:solidFill>
                                       <a:effectLst/>
-                                      <a:latin typeface="+mn-lt"/>
+                                      <a:latin typeface="Cambria Math" panose="02040503050406030204" pitchFamily="18" charset="0"/>
                                       <a:ea typeface="+mn-ea"/>
                                       <a:cs typeface="+mn-cs"/>
                                     </a:rPr>
@@ -8755,7 +8721,7 @@
                                             <a:schemeClr val="dk1"/>
                                           </a:solidFill>
                                           <a:effectLst/>
-                                          <a:latin typeface="+mn-lt"/>
+                                          <a:latin typeface="Cambria Math" panose="02040503050406030204" pitchFamily="18" charset="0"/>
                                           <a:ea typeface="+mn-ea"/>
                                           <a:cs typeface="+mn-cs"/>
                                         </a:rPr>
@@ -8768,7 +8734,7 @@
                                             <a:schemeClr val="dk1"/>
                                           </a:solidFill>
                                           <a:effectLst/>
-                                          <a:latin typeface="+mn-lt"/>
+                                          <a:latin typeface="Cambria Math" panose="02040503050406030204" pitchFamily="18" charset="0"/>
                                           <a:ea typeface="+mn-ea"/>
                                           <a:cs typeface="+mn-cs"/>
                                         </a:rPr>
@@ -8782,35 +8748,11 @@
                                             <a:schemeClr val="dk1"/>
                                           </a:solidFill>
                                           <a:effectLst/>
-                                          <a:latin typeface="+mn-lt"/>
+                                          <a:latin typeface="Cambria Math" panose="02040503050406030204" pitchFamily="18" charset="0"/>
                                           <a:ea typeface="+mn-ea"/>
                                           <a:cs typeface="+mn-cs"/>
                                         </a:rPr>
-                                        <m:t>𝑑𝑎𝑦</m:t>
-                                      </m:r>
-                                      <m:r>
-                                        <a:rPr lang="en-US" sz="2800" i="1" kern="1200">
-                                          <a:solidFill>
-                                            <a:schemeClr val="dk1"/>
-                                          </a:solidFill>
-                                          <a:effectLst/>
-                                          <a:latin typeface="+mn-lt"/>
-                                          <a:ea typeface="+mn-ea"/>
-                                          <a:cs typeface="+mn-cs"/>
-                                        </a:rPr>
-                                        <m:t>.</m:t>
-                                      </m:r>
-                                      <m:r>
-                                        <a:rPr lang="en-US" sz="2800" i="1" kern="1200">
-                                          <a:solidFill>
-                                            <a:schemeClr val="dk1"/>
-                                          </a:solidFill>
-                                          <a:effectLst/>
-                                          <a:latin typeface="+mn-lt"/>
-                                          <a:ea typeface="+mn-ea"/>
-                                          <a:cs typeface="+mn-cs"/>
-                                        </a:rPr>
-                                        <m:t>𝑐𝑎𝑟𝑒</m:t>
+                                        <m:t>𝑑𝑎𝑦𝑐𝑎𝑟𝑒</m:t>
                                       </m:r>
                                     </m:sub>
                                   </m:sSub>
@@ -8822,7 +8764,7 @@
                                     <a:schemeClr val="dk1"/>
                                   </a:solidFill>
                                   <a:effectLst/>
-                                  <a:latin typeface="+mn-lt"/>
+                                  <a:latin typeface="Cambria Math" panose="02040503050406030204" pitchFamily="18" charset="0"/>
                                   <a:ea typeface="+mn-ea"/>
                                   <a:cs typeface="+mn-cs"/>
                                 </a:rPr>
@@ -8836,7 +8778,7 @@
                                         <a:schemeClr val="dk1"/>
                                       </a:solidFill>
                                       <a:effectLst/>
-                                      <a:latin typeface="+mn-lt"/>
+                                      <a:latin typeface="Cambria Math" panose="02040503050406030204" pitchFamily="18" charset="0"/>
                                       <a:ea typeface="+mn-ea"/>
                                       <a:cs typeface="+mn-cs"/>
                                     </a:rPr>
@@ -8849,7 +8791,7 @@
                                         <a:schemeClr val="dk1"/>
                                       </a:solidFill>
                                       <a:effectLst/>
-                                      <a:latin typeface="+mn-lt"/>
+                                      <a:latin typeface="Cambria Math" panose="02040503050406030204" pitchFamily="18" charset="0"/>
                                       <a:ea typeface="+mn-ea"/>
                                       <a:cs typeface="+mn-cs"/>
                                     </a:rPr>
@@ -8863,7 +8805,7 @@
                                         <a:schemeClr val="dk1"/>
                                       </a:solidFill>
                                       <a:effectLst/>
-                                      <a:latin typeface="+mn-lt"/>
+                                      <a:latin typeface="Cambria Math" panose="02040503050406030204" pitchFamily="18" charset="0"/>
                                       <a:ea typeface="+mn-ea"/>
                                       <a:cs typeface="+mn-cs"/>
                                     </a:rPr>
@@ -8879,7 +8821,7 @@
                                         <a:schemeClr val="dk1"/>
                                       </a:solidFill>
                                       <a:effectLst/>
-                                      <a:latin typeface="+mn-lt"/>
+                                      <a:latin typeface="Cambria Math" panose="02040503050406030204" pitchFamily="18" charset="0"/>
                                       <a:ea typeface="+mn-ea"/>
                                       <a:cs typeface="+mn-cs"/>
                                     </a:rPr>
@@ -8892,7 +8834,7 @@
                                         <a:schemeClr val="dk1"/>
                                       </a:solidFill>
                                       <a:effectLst/>
-                                      <a:latin typeface="+mn-lt"/>
+                                      <a:latin typeface="Cambria Math" panose="02040503050406030204" pitchFamily="18" charset="0"/>
                                       <a:ea typeface="+mn-ea"/>
                                       <a:cs typeface="+mn-cs"/>
                                     </a:rPr>
@@ -8906,7 +8848,7 @@
                                         <a:schemeClr val="dk1"/>
                                       </a:solidFill>
                                       <a:effectLst/>
-                                      <a:latin typeface="+mn-lt"/>
+                                      <a:latin typeface="Cambria Math" panose="02040503050406030204" pitchFamily="18" charset="0"/>
                                       <a:ea typeface="+mn-ea"/>
                                       <a:cs typeface="+mn-cs"/>
                                     </a:rPr>
@@ -8920,7 +8862,7 @@
                                             <a:schemeClr val="dk1"/>
                                           </a:solidFill>
                                           <a:effectLst/>
-                                          <a:latin typeface="+mn-lt"/>
+                                          <a:latin typeface="Cambria Math" panose="02040503050406030204" pitchFamily="18" charset="0"/>
                                           <a:ea typeface="+mn-ea"/>
                                           <a:cs typeface="+mn-cs"/>
                                         </a:rPr>
@@ -8933,7 +8875,7 @@
                                             <a:schemeClr val="dk1"/>
                                           </a:solidFill>
                                           <a:effectLst/>
-                                          <a:latin typeface="+mn-lt"/>
+                                          <a:latin typeface="Cambria Math" panose="02040503050406030204" pitchFamily="18" charset="0"/>
                                           <a:ea typeface="+mn-ea"/>
                                           <a:cs typeface="+mn-cs"/>
                                         </a:rPr>
@@ -8947,7 +8889,7 @@
                                             <a:schemeClr val="dk1"/>
                                           </a:solidFill>
                                           <a:effectLst/>
-                                          <a:latin typeface="+mn-lt"/>
+                                          <a:latin typeface="Cambria Math" panose="02040503050406030204" pitchFamily="18" charset="0"/>
                                           <a:ea typeface="+mn-ea"/>
                                           <a:cs typeface="+mn-cs"/>
                                         </a:rPr>
@@ -8959,7 +8901,7 @@
                                             <a:schemeClr val="dk1"/>
                                           </a:solidFill>
                                           <a:effectLst/>
-                                          <a:latin typeface="+mn-lt"/>
+                                          <a:latin typeface="Cambria Math" panose="02040503050406030204" pitchFamily="18" charset="0"/>
                                           <a:ea typeface="+mn-ea"/>
                                           <a:cs typeface="+mn-cs"/>
                                         </a:rPr>
@@ -8975,7 +8917,7 @@
                                     <a:schemeClr val="dk1"/>
                                   </a:solidFill>
                                   <a:effectLst/>
-                                  <a:latin typeface="+mn-lt"/>
+                                  <a:latin typeface="Cambria Math" panose="02040503050406030204" pitchFamily="18" charset="0"/>
                                   <a:ea typeface="+mn-ea"/>
                                   <a:cs typeface="+mn-cs"/>
                                 </a:rPr>
@@ -8989,7 +8931,7 @@
                                         <a:schemeClr val="dk1"/>
                                       </a:solidFill>
                                       <a:effectLst/>
-                                      <a:latin typeface="+mn-lt"/>
+                                      <a:latin typeface="Cambria Math" panose="02040503050406030204" pitchFamily="18" charset="0"/>
                                       <a:ea typeface="+mn-ea"/>
                                       <a:cs typeface="+mn-cs"/>
                                     </a:rPr>
@@ -9002,7 +8944,7 @@
                                         <a:schemeClr val="dk1"/>
                                       </a:solidFill>
                                       <a:effectLst/>
-                                      <a:latin typeface="+mn-lt"/>
+                                      <a:latin typeface="Cambria Math" panose="02040503050406030204" pitchFamily="18" charset="0"/>
                                       <a:ea typeface="+mn-ea"/>
                                       <a:cs typeface="+mn-cs"/>
                                     </a:rPr>
@@ -9016,7 +8958,7 @@
                                         <a:schemeClr val="dk1"/>
                                       </a:solidFill>
                                       <a:effectLst/>
-                                      <a:latin typeface="+mn-lt"/>
+                                      <a:latin typeface="Cambria Math" panose="02040503050406030204" pitchFamily="18" charset="0"/>
                                       <a:ea typeface="+mn-ea"/>
                                       <a:cs typeface="+mn-cs"/>
                                     </a:rPr>
@@ -9032,7 +8974,7 @@
                                         <a:schemeClr val="dk1"/>
                                       </a:solidFill>
                                       <a:effectLst/>
-                                      <a:latin typeface="+mn-lt"/>
+                                      <a:latin typeface="Cambria Math" panose="02040503050406030204" pitchFamily="18" charset="0"/>
                                       <a:ea typeface="+mn-ea"/>
                                       <a:cs typeface="+mn-cs"/>
                                     </a:rPr>
@@ -9045,7 +8987,7 @@
                                         <a:schemeClr val="dk1"/>
                                       </a:solidFill>
                                       <a:effectLst/>
-                                      <a:latin typeface="+mn-lt"/>
+                                      <a:latin typeface="Cambria Math" panose="02040503050406030204" pitchFamily="18" charset="0"/>
                                       <a:ea typeface="+mn-ea"/>
                                       <a:cs typeface="+mn-cs"/>
                                     </a:rPr>
@@ -9059,7 +9001,7 @@
                                         <a:schemeClr val="dk1"/>
                                       </a:solidFill>
                                       <a:effectLst/>
-                                      <a:latin typeface="+mn-lt"/>
+                                      <a:latin typeface="Cambria Math" panose="02040503050406030204" pitchFamily="18" charset="0"/>
                                       <a:ea typeface="+mn-ea"/>
                                       <a:cs typeface="+mn-cs"/>
                                     </a:rPr>
@@ -9073,7 +9015,7 @@
                                             <a:schemeClr val="dk1"/>
                                           </a:solidFill>
                                           <a:effectLst/>
-                                          <a:latin typeface="+mn-lt"/>
+                                          <a:latin typeface="Cambria Math" panose="02040503050406030204" pitchFamily="18" charset="0"/>
                                           <a:ea typeface="+mn-ea"/>
                                           <a:cs typeface="+mn-cs"/>
                                         </a:rPr>
@@ -9081,12 +9023,12 @@
                                     </m:sSubPr>
                                     <m:e>
                                       <m:r>
-                                        <a:rPr lang="en-US" sz="2800" i="1" kern="1200">
+                                        <a:rPr lang="en-US" sz="2800" b="0" i="1" kern="1200" smtClean="0">
                                           <a:solidFill>
                                             <a:schemeClr val="dk1"/>
                                           </a:solidFill>
                                           <a:effectLst/>
-                                          <a:latin typeface="+mn-lt"/>
+                                          <a:latin typeface="Cambria Math" panose="02040503050406030204" pitchFamily="18" charset="0"/>
                                           <a:ea typeface="+mn-ea"/>
                                           <a:cs typeface="+mn-cs"/>
                                         </a:rPr>
@@ -9100,7 +9042,7 @@
                                             <a:schemeClr val="dk1"/>
                                           </a:solidFill>
                                           <a:effectLst/>
-                                          <a:latin typeface="+mn-lt"/>
+                                          <a:latin typeface="Cambria Math" panose="02040503050406030204" pitchFamily="18" charset="0"/>
                                           <a:ea typeface="+mn-ea"/>
                                           <a:cs typeface="+mn-cs"/>
                                         </a:rPr>
@@ -9112,7 +9054,7 @@
                                             <a:schemeClr val="dk1"/>
                                           </a:solidFill>
                                           <a:effectLst/>
-                                          <a:latin typeface="+mn-lt"/>
+                                          <a:latin typeface="Cambria Math" panose="02040503050406030204" pitchFamily="18" charset="0"/>
                                           <a:ea typeface="+mn-ea"/>
                                           <a:cs typeface="+mn-cs"/>
                                         </a:rPr>
@@ -9128,7 +9070,7 @@
                                     <a:schemeClr val="dk1"/>
                                   </a:solidFill>
                                   <a:effectLst/>
-                                  <a:latin typeface="+mn-lt"/>
+                                  <a:latin typeface="Cambria Math" panose="02040503050406030204" pitchFamily="18" charset="0"/>
                                   <a:ea typeface="+mn-ea"/>
                                   <a:cs typeface="+mn-cs"/>
                                 </a:rPr>
@@ -9148,17 +9090,25 @@
                             </a:rPr>
                             <a:t> </a:t>
                           </a:r>
-                          <a:br>
-                            <a:rPr lang="en-US" sz="2800" b="0" kern="1200" dirty="0">
-                              <a:solidFill>
-                                <a:schemeClr val="dk1"/>
-                              </a:solidFill>
-                              <a:effectLst/>
-                              <a:latin typeface="+mn-lt"/>
-                              <a:ea typeface="+mn-ea"/>
-                              <a:cs typeface="+mn-cs"/>
-                            </a:rPr>
-                          </a:br>
+                        </a:p>
+                        <a:p>
+                          <a:pPr marL="0" marR="0" lvl="0" indent="0" algn="l" defTabSz="2951958" rtl="0" eaLnBrk="1" fontAlgn="auto" latinLnBrk="0" hangingPunct="1">
+                            <a:lnSpc>
+                              <a:spcPct val="150000"/>
+                            </a:lnSpc>
+                            <a:spcBef>
+                              <a:spcPts val="0"/>
+                            </a:spcBef>
+                            <a:spcAft>
+                              <a:spcPts val="0"/>
+                            </a:spcAft>
+                            <a:buClrTx/>
+                            <a:buSzTx/>
+                            <a:buFont typeface="Arial" panose="020B0604020202020204" pitchFamily="34" charset="0"/>
+                            <a:buNone/>
+                            <a:tabLst/>
+                            <a:defRPr/>
+                          </a:pPr>
                           <a:endParaRPr lang="en-US" sz="3200" b="1" kern="1200" dirty="0">
                             <a:solidFill>
                               <a:schemeClr val="dk1"/>
@@ -9185,614 +9135,10 @@
                               <a:ea typeface="+mn-ea"/>
                               <a:cs typeface="+mn-cs"/>
                             </a:rPr>
-                            <a:t>Standard logistic regression Model </a:t>
-                          </a:r>
-                        </a:p>
-                        <a:p>
-                          <a:pPr marL="0" indent="0" algn="l" rtl="0">
-                            <a:lnSpc>
-                              <a:spcPct val="150000"/>
-                            </a:lnSpc>
-                            <a:buFont typeface="Arial" panose="020B0604020202020204" pitchFamily="34" charset="0"/>
-                            <a:buNone/>
-                          </a:pPr>
-                          <a14:m>
-                            <m:oMathPara xmlns:m="http://schemas.openxmlformats.org/officeDocument/2006/math">
-                              <m:oMathParaPr>
-                                <m:jc m:val="centerGroup"/>
-                              </m:oMathParaPr>
-                              <m:oMath xmlns:m="http://schemas.openxmlformats.org/officeDocument/2006/math">
-                                <m:r>
-                                  <a:rPr lang="en-US" sz="2800" i="1" kern="1200" smtClean="0">
-                                    <a:solidFill>
-                                      <a:schemeClr val="dk1"/>
-                                    </a:solidFill>
-                                    <a:effectLst/>
-                                    <a:latin typeface="+mn-lt"/>
-                                    <a:ea typeface="+mn-ea"/>
-                                    <a:cs typeface="+mn-cs"/>
-                                  </a:rPr>
-                                  <m:t>𝑠𝑡𝑎𝑛𝑑𝑎𝑟𝑡</m:t>
-                                </m:r>
-                                <m:r>
-                                  <a:rPr lang="en-US" sz="2800" i="1" kern="1200" smtClean="0">
-                                    <a:solidFill>
-                                      <a:schemeClr val="dk1"/>
-                                    </a:solidFill>
-                                    <a:effectLst/>
-                                    <a:latin typeface="+mn-lt"/>
-                                    <a:ea typeface="+mn-ea"/>
-                                    <a:cs typeface="+mn-cs"/>
-                                  </a:rPr>
-                                  <m:t> </m:t>
-                                </m:r>
-                                <m:r>
-                                  <a:rPr lang="en-US" sz="2800" i="1" kern="1200" smtClean="0">
-                                    <a:solidFill>
-                                      <a:schemeClr val="dk1"/>
-                                    </a:solidFill>
-                                    <a:effectLst/>
-                                    <a:latin typeface="+mn-lt"/>
-                                    <a:ea typeface="+mn-ea"/>
-                                    <a:cs typeface="+mn-cs"/>
-                                  </a:rPr>
-                                  <m:t>𝑙𝑜𝑔𝑖𝑠𝑡𝑖𝑐</m:t>
-                                </m:r>
-                                <m:r>
-                                  <a:rPr lang="en-US" sz="2800" i="1" kern="1200" smtClean="0">
-                                    <a:solidFill>
-                                      <a:schemeClr val="dk1"/>
-                                    </a:solidFill>
-                                    <a:effectLst/>
-                                    <a:latin typeface="+mn-lt"/>
-                                    <a:ea typeface="+mn-ea"/>
-                                    <a:cs typeface="+mn-cs"/>
-                                  </a:rPr>
-                                  <m:t> </m:t>
-                                </m:r>
-                                <m:r>
-                                  <a:rPr lang="en-US" sz="2800" i="1" kern="1200" smtClean="0">
-                                    <a:solidFill>
-                                      <a:schemeClr val="dk1"/>
-                                    </a:solidFill>
-                                    <a:effectLst/>
-                                    <a:latin typeface="+mn-lt"/>
-                                    <a:ea typeface="+mn-ea"/>
-                                    <a:cs typeface="+mn-cs"/>
-                                  </a:rPr>
-                                  <m:t>𝑚𝑑𝑙</m:t>
-                                </m:r>
-                                <m:r>
-                                  <a:rPr lang="en-US" sz="2800" i="1" kern="1200" smtClean="0">
-                                    <a:solidFill>
-                                      <a:schemeClr val="dk1"/>
-                                    </a:solidFill>
-                                    <a:effectLst/>
-                                    <a:latin typeface="+mn-lt"/>
-                                    <a:ea typeface="+mn-ea"/>
-                                    <a:cs typeface="+mn-cs"/>
-                                  </a:rPr>
-                                  <m:t>= </m:t>
-                                </m:r>
-                                <m:r>
-                                  <a:rPr lang="en-US" sz="2800" i="1" kern="1200" smtClean="0">
-                                    <a:solidFill>
-                                      <a:schemeClr val="dk1"/>
-                                    </a:solidFill>
-                                    <a:effectLst/>
-                                    <a:latin typeface="+mn-lt"/>
-                                    <a:ea typeface="+mn-ea"/>
-                                    <a:cs typeface="+mn-cs"/>
-                                  </a:rPr>
-                                  <m:t>𝐵𝑎𝑠</m:t>
-                                </m:r>
-                                <m:sSub>
-                                  <m:sSubPr>
-                                    <m:ctrlPr>
-                                      <a:rPr lang="en-US" sz="2800" i="1" kern="1200">
-                                        <a:solidFill>
-                                          <a:schemeClr val="dk1"/>
-                                        </a:solidFill>
-                                        <a:effectLst/>
-                                        <a:latin typeface="+mn-lt"/>
-                                        <a:ea typeface="+mn-ea"/>
-                                        <a:cs typeface="+mn-cs"/>
-                                      </a:rPr>
-                                    </m:ctrlPr>
-                                  </m:sSubPr>
-                                  <m:e>
-                                    <m:r>
-                                      <a:rPr lang="en-US" sz="2800" i="1" kern="1200">
-                                        <a:solidFill>
-                                          <a:schemeClr val="dk1"/>
-                                        </a:solidFill>
-                                        <a:effectLst/>
-                                        <a:latin typeface="+mn-lt"/>
-                                        <a:ea typeface="+mn-ea"/>
-                                        <a:cs typeface="+mn-cs"/>
-                                      </a:rPr>
-                                      <m:t>𝑒</m:t>
-                                    </m:r>
-                                  </m:e>
-                                  <m:sub>
-                                    <m:r>
-                                      <a:rPr lang="en-US" sz="2800" b="0" i="1" kern="1200" smtClean="0">
-                                        <a:solidFill>
-                                          <a:schemeClr val="dk1"/>
-                                        </a:solidFill>
-                                        <a:effectLst/>
-                                        <a:latin typeface="Cambria Math" panose="02040503050406030204" pitchFamily="18" charset="0"/>
-                                        <a:ea typeface="+mn-ea"/>
-                                        <a:cs typeface="+mn-cs"/>
-                                      </a:rPr>
-                                      <m:t>2</m:t>
-                                    </m:r>
-                                    <m:r>
-                                      <a:rPr lang="en-US" sz="2800" b="0" i="1" kern="1200" smtClean="0">
-                                        <a:solidFill>
-                                          <a:schemeClr val="dk1"/>
-                                        </a:solidFill>
-                                        <a:effectLst/>
-                                        <a:latin typeface="Cambria Math" panose="02040503050406030204" pitchFamily="18" charset="0"/>
-                                        <a:ea typeface="+mn-ea"/>
-                                        <a:cs typeface="+mn-cs"/>
-                                      </a:rPr>
-                                      <m:t>𝑛𝑑</m:t>
-                                    </m:r>
-                                    <m:r>
-                                      <a:rPr lang="en-US" sz="2800" i="1" kern="1200">
-                                        <a:solidFill>
-                                          <a:schemeClr val="dk1"/>
-                                        </a:solidFill>
-                                        <a:effectLst/>
-                                        <a:latin typeface="+mn-lt"/>
-                                        <a:ea typeface="+mn-ea"/>
-                                        <a:cs typeface="+mn-cs"/>
-                                      </a:rPr>
-                                      <m:t> </m:t>
-                                    </m:r>
-                                    <m:r>
-                                      <a:rPr lang="en-US" sz="2800" i="1" kern="1200">
-                                        <a:solidFill>
-                                          <a:schemeClr val="dk1"/>
-                                        </a:solidFill>
-                                        <a:effectLst/>
-                                        <a:latin typeface="+mn-lt"/>
-                                        <a:ea typeface="+mn-ea"/>
-                                        <a:cs typeface="+mn-cs"/>
-                                      </a:rPr>
-                                      <m:t>𝑦𝑒𝑎𝑟</m:t>
-                                    </m:r>
-                                  </m:sub>
-                                </m:sSub>
-                                <m:r>
-                                  <a:rPr lang="en-US" sz="2800" i="1" kern="1200">
-                                    <a:solidFill>
-                                      <a:schemeClr val="dk1"/>
-                                    </a:solidFill>
-                                    <a:effectLst/>
-                                    <a:latin typeface="+mn-lt"/>
-                                    <a:ea typeface="+mn-ea"/>
-                                    <a:cs typeface="+mn-cs"/>
-                                  </a:rPr>
-                                  <m:t>+ </m:t>
-                                </m:r>
-                                <m:sSub>
-                                  <m:sSubPr>
-                                    <m:ctrlPr>
-                                      <a:rPr lang="en-US" sz="2800" i="1" kern="1200">
-                                        <a:solidFill>
-                                          <a:schemeClr val="dk1"/>
-                                        </a:solidFill>
-                                        <a:effectLst/>
-                                        <a:latin typeface="+mn-lt"/>
-                                        <a:ea typeface="+mn-ea"/>
-                                        <a:cs typeface="+mn-cs"/>
-                                      </a:rPr>
-                                    </m:ctrlPr>
-                                  </m:sSubPr>
-                                  <m:e>
-                                    <m:sSub>
-                                      <m:sSubPr>
-                                        <m:ctrlPr>
-                                          <a:rPr lang="en-US" sz="2800" i="1" kern="1200">
-                                            <a:solidFill>
-                                              <a:schemeClr val="dk1"/>
-                                            </a:solidFill>
-                                            <a:effectLst/>
-                                            <a:latin typeface="+mn-lt"/>
-                                            <a:ea typeface="+mn-ea"/>
-                                            <a:cs typeface="+mn-cs"/>
-                                          </a:rPr>
-                                        </m:ctrlPr>
-                                      </m:sSubPr>
-                                      <m:e>
-                                        <m:r>
-                                          <a:rPr lang="en-US" sz="2800" i="1" kern="1200">
-                                            <a:solidFill>
-                                              <a:schemeClr val="dk1"/>
-                                            </a:solidFill>
-                                            <a:effectLst/>
-                                            <a:latin typeface="+mn-lt"/>
-                                            <a:ea typeface="+mn-ea"/>
-                                            <a:cs typeface="+mn-cs"/>
-                                          </a:rPr>
-                                          <m:t>𝛽</m:t>
-                                        </m:r>
-                                      </m:e>
-                                      <m:sub>
-                                        <m:r>
-                                          <a:rPr lang="en-US" sz="2800" i="1" kern="1200">
-                                            <a:solidFill>
-                                              <a:schemeClr val="dk1"/>
-                                            </a:solidFill>
-                                            <a:effectLst/>
-                                            <a:latin typeface="+mn-lt"/>
-                                            <a:ea typeface="+mn-ea"/>
-                                            <a:cs typeface="+mn-cs"/>
-                                          </a:rPr>
-                                          <m:t>20</m:t>
-                                        </m:r>
-                                      </m:sub>
-                                    </m:sSub>
-                                    <m:r>
-                                      <a:rPr lang="en-US" sz="2800" i="1" kern="1200">
-                                        <a:solidFill>
-                                          <a:schemeClr val="dk1"/>
-                                        </a:solidFill>
-                                        <a:effectLst/>
-                                        <a:latin typeface="+mn-lt"/>
-                                        <a:ea typeface="+mn-ea"/>
-                                        <a:cs typeface="+mn-cs"/>
-                                      </a:rPr>
-                                      <m:t>1</m:t>
-                                    </m:r>
-                                  </m:e>
-                                  <m:sub>
-                                    <m:r>
-                                      <a:rPr lang="en-US" sz="2800" i="1" kern="1200">
-                                        <a:solidFill>
-                                          <a:schemeClr val="dk1"/>
-                                        </a:solidFill>
-                                        <a:effectLst/>
-                                        <a:latin typeface="+mn-lt"/>
-                                        <a:ea typeface="+mn-ea"/>
-                                        <a:cs typeface="+mn-cs"/>
-                                      </a:rPr>
-                                      <m:t>𝐷𝑂</m:t>
-                                    </m:r>
-                                    <m:sSub>
-                                      <m:sSubPr>
-                                        <m:ctrlPr>
-                                          <a:rPr lang="en-US" sz="2800" i="1" kern="1200">
-                                            <a:solidFill>
-                                              <a:schemeClr val="dk1"/>
-                                            </a:solidFill>
-                                            <a:effectLst/>
-                                            <a:latin typeface="+mn-lt"/>
-                                            <a:ea typeface="+mn-ea"/>
-                                            <a:cs typeface="+mn-cs"/>
-                                          </a:rPr>
-                                        </m:ctrlPr>
-                                      </m:sSubPr>
-                                      <m:e>
-                                        <m:r>
-                                          <a:rPr lang="en-US" sz="2800" i="1" kern="1200">
-                                            <a:solidFill>
-                                              <a:schemeClr val="dk1"/>
-                                            </a:solidFill>
-                                            <a:effectLst/>
-                                            <a:latin typeface="+mn-lt"/>
-                                            <a:ea typeface="+mn-ea"/>
-                                            <a:cs typeface="+mn-cs"/>
-                                          </a:rPr>
-                                          <m:t>𝐵</m:t>
-                                        </m:r>
-                                      </m:e>
-                                      <m:sub>
-                                        <m:r>
-                                          <a:rPr lang="en-US" sz="2800" i="1" kern="1200">
-                                            <a:solidFill>
-                                              <a:schemeClr val="dk1"/>
-                                            </a:solidFill>
-                                            <a:effectLst/>
-                                            <a:latin typeface="+mn-lt"/>
-                                            <a:ea typeface="+mn-ea"/>
-                                            <a:cs typeface="+mn-cs"/>
-                                          </a:rPr>
-                                          <m:t>2</m:t>
-                                        </m:r>
-                                      </m:sub>
-                                    </m:sSub>
-                                  </m:sub>
-                                </m:sSub>
-                                <m:r>
-                                  <a:rPr lang="en-US" sz="2800" i="1" kern="1200">
-                                    <a:solidFill>
-                                      <a:schemeClr val="dk1"/>
-                                    </a:solidFill>
-                                    <a:effectLst/>
-                                    <a:latin typeface="+mn-lt"/>
-                                    <a:ea typeface="+mn-ea"/>
-                                    <a:cs typeface="+mn-cs"/>
-                                  </a:rPr>
-                                  <m:t>+</m:t>
-                                </m:r>
-                                <m:sSub>
-                                  <m:sSubPr>
-                                    <m:ctrlPr>
-                                      <a:rPr lang="en-US" sz="2800" i="1" kern="1200">
-                                        <a:solidFill>
-                                          <a:schemeClr val="dk1"/>
-                                        </a:solidFill>
-                                        <a:effectLst/>
-                                        <a:latin typeface="+mn-lt"/>
-                                        <a:ea typeface="+mn-ea"/>
-                                        <a:cs typeface="+mn-cs"/>
-                                      </a:rPr>
-                                    </m:ctrlPr>
-                                  </m:sSubPr>
-                                  <m:e>
-                                    <m:r>
-                                      <a:rPr lang="en-US" sz="2800" i="1" kern="1200">
-                                        <a:solidFill>
-                                          <a:schemeClr val="dk1"/>
-                                        </a:solidFill>
-                                        <a:effectLst/>
-                                        <a:latin typeface="+mn-lt"/>
-                                        <a:ea typeface="+mn-ea"/>
-                                        <a:cs typeface="+mn-cs"/>
-                                      </a:rPr>
-                                      <m:t>𝛽</m:t>
-                                    </m:r>
-                                  </m:e>
-                                  <m:sub>
-                                    <m:r>
-                                      <a:rPr lang="en-US" sz="2800" i="1" kern="1200">
-                                        <a:solidFill>
-                                          <a:schemeClr val="dk1"/>
-                                        </a:solidFill>
-                                        <a:effectLst/>
-                                        <a:latin typeface="+mn-lt"/>
-                                        <a:ea typeface="+mn-ea"/>
-                                        <a:cs typeface="+mn-cs"/>
-                                      </a:rPr>
-                                      <m:t>21</m:t>
-                                    </m:r>
-                                  </m:sub>
-                                </m:sSub>
-                                <m:sSub>
-                                  <m:sSubPr>
-                                    <m:ctrlPr>
-                                      <a:rPr lang="en-US" sz="2800" i="1" kern="1200">
-                                        <a:solidFill>
-                                          <a:schemeClr val="dk1"/>
-                                        </a:solidFill>
-                                        <a:effectLst/>
-                                        <a:latin typeface="+mn-lt"/>
-                                        <a:ea typeface="+mn-ea"/>
-                                        <a:cs typeface="+mn-cs"/>
-                                      </a:rPr>
-                                    </m:ctrlPr>
-                                  </m:sSubPr>
-                                  <m:e>
-                                    <m:r>
-                                      <a:rPr lang="en-US" sz="2800" i="1" kern="1200">
-                                        <a:solidFill>
-                                          <a:schemeClr val="dk1"/>
-                                        </a:solidFill>
-                                        <a:effectLst/>
-                                        <a:latin typeface="+mn-lt"/>
-                                        <a:ea typeface="+mn-ea"/>
-                                        <a:cs typeface="+mn-cs"/>
-                                      </a:rPr>
-                                      <m:t>1</m:t>
-                                    </m:r>
-                                  </m:e>
-                                  <m:sub>
-                                    <m:r>
-                                      <a:rPr lang="en-US" sz="2800" i="1" kern="1200">
-                                        <a:solidFill>
-                                          <a:schemeClr val="dk1"/>
-                                        </a:solidFill>
-                                        <a:effectLst/>
-                                        <a:latin typeface="+mn-lt"/>
-                                        <a:ea typeface="+mn-ea"/>
-                                        <a:cs typeface="+mn-cs"/>
-                                      </a:rPr>
-                                      <m:t>𝐷𝑂</m:t>
-                                    </m:r>
-                                    <m:sSub>
-                                      <m:sSubPr>
-                                        <m:ctrlPr>
-                                          <a:rPr lang="en-US" sz="2800" i="1" kern="1200">
-                                            <a:solidFill>
-                                              <a:schemeClr val="dk1"/>
-                                            </a:solidFill>
-                                            <a:effectLst/>
-                                            <a:latin typeface="+mn-lt"/>
-                                            <a:ea typeface="+mn-ea"/>
-                                            <a:cs typeface="+mn-cs"/>
-                                          </a:rPr>
-                                        </m:ctrlPr>
-                                      </m:sSubPr>
-                                      <m:e>
-                                        <m:r>
-                                          <a:rPr lang="en-US" sz="2800" i="1" kern="1200">
-                                            <a:solidFill>
-                                              <a:schemeClr val="dk1"/>
-                                            </a:solidFill>
-                                            <a:effectLst/>
-                                            <a:latin typeface="+mn-lt"/>
-                                            <a:ea typeface="+mn-ea"/>
-                                            <a:cs typeface="+mn-cs"/>
-                                          </a:rPr>
-                                          <m:t>𝐵</m:t>
-                                        </m:r>
-                                      </m:e>
-                                      <m:sub>
-                                        <m:r>
-                                          <a:rPr lang="en-US" sz="2800" i="1" kern="1200">
-                                            <a:solidFill>
-                                              <a:schemeClr val="dk1"/>
-                                            </a:solidFill>
-                                            <a:effectLst/>
-                                            <a:latin typeface="+mn-lt"/>
-                                            <a:ea typeface="+mn-ea"/>
-                                            <a:cs typeface="+mn-cs"/>
-                                          </a:rPr>
-                                          <m:t>3</m:t>
-                                        </m:r>
-                                      </m:sub>
-                                    </m:sSub>
-                                  </m:sub>
-                                </m:sSub>
-                                <m:r>
-                                  <a:rPr lang="en-US" sz="2800" i="1" kern="1200">
-                                    <a:solidFill>
-                                      <a:schemeClr val="dk1"/>
-                                    </a:solidFill>
-                                    <a:effectLst/>
-                                    <a:latin typeface="+mn-lt"/>
-                                    <a:ea typeface="+mn-ea"/>
-                                    <a:cs typeface="+mn-cs"/>
-                                  </a:rPr>
-                                  <m:t>+</m:t>
-                                </m:r>
-                                <m:sSub>
-                                  <m:sSubPr>
-                                    <m:ctrlPr>
-                                      <a:rPr lang="en-US" sz="2800" i="1" kern="1200">
-                                        <a:solidFill>
-                                          <a:schemeClr val="dk1"/>
-                                        </a:solidFill>
-                                        <a:effectLst/>
-                                        <a:latin typeface="+mn-lt"/>
-                                        <a:ea typeface="+mn-ea"/>
-                                        <a:cs typeface="+mn-cs"/>
-                                      </a:rPr>
-                                    </m:ctrlPr>
-                                  </m:sSubPr>
-                                  <m:e>
-                                    <m:r>
-                                      <a:rPr lang="en-US" sz="2800" i="1" kern="1200">
-                                        <a:solidFill>
-                                          <a:schemeClr val="dk1"/>
-                                        </a:solidFill>
-                                        <a:effectLst/>
-                                        <a:latin typeface="+mn-lt"/>
-                                        <a:ea typeface="+mn-ea"/>
-                                        <a:cs typeface="+mn-cs"/>
-                                      </a:rPr>
-                                      <m:t>𝛽</m:t>
-                                    </m:r>
-                                  </m:e>
-                                  <m:sub>
-                                    <m:r>
-                                      <a:rPr lang="en-US" sz="2800" i="1" kern="1200">
-                                        <a:solidFill>
-                                          <a:schemeClr val="dk1"/>
-                                        </a:solidFill>
-                                        <a:effectLst/>
-                                        <a:latin typeface="+mn-lt"/>
-                                        <a:ea typeface="+mn-ea"/>
-                                        <a:cs typeface="+mn-cs"/>
-                                      </a:rPr>
-                                      <m:t>22</m:t>
-                                    </m:r>
-                                  </m:sub>
-                                </m:sSub>
-                                <m:sSub>
-                                  <m:sSubPr>
-                                    <m:ctrlPr>
-                                      <a:rPr lang="en-US" sz="2800" i="1" kern="1200">
-                                        <a:solidFill>
-                                          <a:schemeClr val="dk1"/>
-                                        </a:solidFill>
-                                        <a:effectLst/>
-                                        <a:latin typeface="+mn-lt"/>
-                                        <a:ea typeface="+mn-ea"/>
-                                        <a:cs typeface="+mn-cs"/>
-                                      </a:rPr>
-                                    </m:ctrlPr>
-                                  </m:sSubPr>
-                                  <m:e>
-                                    <m:r>
-                                      <a:rPr lang="en-US" sz="2800" i="1" kern="1200">
-                                        <a:solidFill>
-                                          <a:schemeClr val="dk1"/>
-                                        </a:solidFill>
-                                        <a:effectLst/>
-                                        <a:latin typeface="+mn-lt"/>
-                                        <a:ea typeface="+mn-ea"/>
-                                        <a:cs typeface="+mn-cs"/>
-                                      </a:rPr>
-                                      <m:t>1</m:t>
-                                    </m:r>
-                                  </m:e>
-                                  <m:sub>
-                                    <m:r>
-                                      <a:rPr lang="en-US" sz="2800" i="1" kern="1200">
-                                        <a:solidFill>
-                                          <a:schemeClr val="dk1"/>
-                                        </a:solidFill>
-                                        <a:effectLst/>
-                                        <a:latin typeface="+mn-lt"/>
-                                        <a:ea typeface="+mn-ea"/>
-                                        <a:cs typeface="+mn-cs"/>
-                                      </a:rPr>
-                                      <m:t>𝐷𝑂</m:t>
-                                    </m:r>
-                                    <m:sSub>
-                                      <m:sSubPr>
-                                        <m:ctrlPr>
-                                          <a:rPr lang="en-US" sz="2800" i="1" kern="1200">
-                                            <a:solidFill>
-                                              <a:schemeClr val="dk1"/>
-                                            </a:solidFill>
-                                            <a:effectLst/>
-                                            <a:latin typeface="+mn-lt"/>
-                                            <a:ea typeface="+mn-ea"/>
-                                            <a:cs typeface="+mn-cs"/>
-                                          </a:rPr>
-                                        </m:ctrlPr>
-                                      </m:sSubPr>
-                                      <m:e>
-                                        <m:r>
-                                          <a:rPr lang="en-US" sz="2800" i="1" kern="1200">
-                                            <a:solidFill>
-                                              <a:schemeClr val="dk1"/>
-                                            </a:solidFill>
-                                            <a:effectLst/>
-                                            <a:latin typeface="+mn-lt"/>
-                                            <a:ea typeface="+mn-ea"/>
-                                            <a:cs typeface="+mn-cs"/>
-                                          </a:rPr>
-                                          <m:t>𝐵</m:t>
-                                        </m:r>
-                                      </m:e>
-                                      <m:sub>
-                                        <m:r>
-                                          <a:rPr lang="en-US" sz="2800" i="1" kern="1200">
-                                            <a:solidFill>
-                                              <a:schemeClr val="dk1"/>
-                                            </a:solidFill>
-                                            <a:effectLst/>
-                                            <a:latin typeface="+mn-lt"/>
-                                            <a:ea typeface="+mn-ea"/>
-                                            <a:cs typeface="+mn-cs"/>
-                                          </a:rPr>
-                                          <m:t>4</m:t>
-                                        </m:r>
-                                      </m:sub>
-                                    </m:sSub>
-                                  </m:sub>
-                                </m:sSub>
-                              </m:oMath>
-                            </m:oMathPara>
-                          </a14:m>
-                          <a:br>
-                            <a:rPr lang="en-US" sz="2800" kern="1200" dirty="0">
+                            <a:t>Standard logistic regression Model :</a:t>
+                          </a:r>
+                          <a:r>
+                            <a:rPr lang="en-US" sz="3200" b="1" kern="1200" baseline="0" dirty="0">
                               <a:solidFill>
                                 <a:schemeClr val="dk1"/>
                               </a:solidFill>
@@ -9800,63 +9146,8 @@
                               <a:ea typeface="+mn-ea"/>
                               <a:cs typeface="+mn-cs"/>
                             </a:rPr>
-                          </a:br>
-                          <a:endParaRPr lang="en-US" sz="2800" kern="1200" dirty="0">
-                            <a:solidFill>
-                              <a:schemeClr val="dk1"/>
-                            </a:solidFill>
-                            <a:latin typeface="+mj-lt"/>
-                            <a:ea typeface="+mn-ea"/>
-                            <a:cs typeface="+mn-cs"/>
-                          </a:endParaRPr>
-                        </a:p>
-                        <a:p>
-                          <a:pPr marL="457200" indent="-457200" algn="l" rtl="0">
-                            <a:lnSpc>
-                              <a:spcPct val="150000"/>
-                            </a:lnSpc>
-                            <a:buFont typeface="Arial" panose="020B0604020202020204" pitchFamily="34" charset="0"/>
-                            <a:buChar char="•"/>
-                          </a:pPr>
-                          <a:r>
-                            <a:rPr lang="en-US" sz="3200" b="1" kern="1200" dirty="0">
-                              <a:solidFill>
-                                <a:schemeClr val="dk1"/>
-                              </a:solidFill>
-                              <a:latin typeface="+mj-lt"/>
-                              <a:ea typeface="+mn-ea"/>
-                              <a:cs typeface="+mn-cs"/>
-                            </a:rPr>
-                            <a:t>Logistic regression using Generalized </a:t>
-                          </a:r>
-                          <a:r>
-                            <a:rPr lang="en-US" sz="3200" b="1" kern="1200">
-                              <a:solidFill>
-                                <a:schemeClr val="dk1"/>
-                              </a:solidFill>
-                              <a:latin typeface="+mj-lt"/>
-                              <a:ea typeface="+mn-ea"/>
-                              <a:cs typeface="+mn-cs"/>
-                            </a:rPr>
-                            <a:t>Additive Model</a:t>
-                          </a:r>
-                          <a:endParaRPr lang="en-US" sz="3200" b="1" kern="1200" dirty="0">
-                            <a:solidFill>
-                              <a:schemeClr val="dk1"/>
-                            </a:solidFill>
-                            <a:latin typeface="+mj-lt"/>
-                            <a:ea typeface="+mn-ea"/>
-                            <a:cs typeface="+mn-cs"/>
-                          </a:endParaRPr>
-                        </a:p>
-                        <a:p>
-                          <a:pPr marL="457200" indent="-457200" algn="l" rtl="0">
-                            <a:lnSpc>
-                              <a:spcPct val="150000"/>
-                            </a:lnSpc>
-                            <a:buFont typeface="Arial" panose="020B0604020202020204" pitchFamily="34" charset="0"/>
-                            <a:buChar char="•"/>
-                          </a:pPr>
+                            <a:t> </a:t>
+                          </a:r>
                           <a14:m>
                             <m:oMath xmlns:m="http://schemas.openxmlformats.org/officeDocument/2006/math">
                               <m:r>
@@ -9865,55 +9156,7 @@
                                     <a:schemeClr val="dk1"/>
                                   </a:solidFill>
                                   <a:effectLst/>
-                                  <a:latin typeface="+mn-lt"/>
-                                  <a:ea typeface="+mn-ea"/>
-                                  <a:cs typeface="+mn-cs"/>
-                                </a:rPr>
-                                <m:t>𝐿𝑜𝑔𝑖𝑠𝑡𝑖𝑐</m:t>
-                              </m:r>
-                              <m:r>
-                                <a:rPr lang="en-US" sz="2800" i="1" kern="1200" smtClean="0">
-                                  <a:solidFill>
-                                    <a:schemeClr val="dk1"/>
-                                  </a:solidFill>
-                                  <a:effectLst/>
-                                  <a:latin typeface="+mn-lt"/>
-                                  <a:ea typeface="+mn-ea"/>
-                                  <a:cs typeface="+mn-cs"/>
-                                </a:rPr>
-                                <m:t> </m:t>
-                              </m:r>
-                              <m:r>
-                                <a:rPr lang="en-US" sz="2800" i="1" kern="1200" smtClean="0">
-                                  <a:solidFill>
-                                    <a:schemeClr val="dk1"/>
-                                  </a:solidFill>
-                                  <a:effectLst/>
-                                  <a:latin typeface="+mn-lt"/>
-                                  <a:ea typeface="+mn-ea"/>
-                                  <a:cs typeface="+mn-cs"/>
-                                </a:rPr>
-                                <m:t>𝐺𝐴𝑀</m:t>
-                              </m:r>
-                              <m:r>
-                                <a:rPr lang="en-US" sz="2800" i="1" kern="1200" smtClean="0">
-                                  <a:solidFill>
-                                    <a:schemeClr val="dk1"/>
-                                  </a:solidFill>
-                                  <a:effectLst/>
-                                  <a:latin typeface="+mn-lt"/>
-                                  <a:ea typeface="+mn-ea"/>
-                                  <a:cs typeface="+mn-cs"/>
-                                </a:rPr>
-                                <m:t>= </m:t>
-                              </m:r>
-                              <m:r>
-                                <a:rPr lang="en-US" sz="2800" i="1" kern="1200" smtClean="0">
-                                  <a:solidFill>
-                                    <a:schemeClr val="dk1"/>
-                                  </a:solidFill>
-                                  <a:effectLst/>
-                                  <a:latin typeface="+mn-lt"/>
+                                  <a:latin typeface="Cambria Math" panose="02040503050406030204" pitchFamily="18" charset="0"/>
                                   <a:ea typeface="+mn-ea"/>
                                   <a:cs typeface="+mn-cs"/>
                                 </a:rPr>
@@ -9927,7 +9170,7 @@
                                         <a:schemeClr val="dk1"/>
                                       </a:solidFill>
                                       <a:effectLst/>
-                                      <a:latin typeface="+mn-lt"/>
+                                      <a:latin typeface="Cambria Math" panose="02040503050406030204" pitchFamily="18" charset="0"/>
                                       <a:ea typeface="+mn-ea"/>
                                       <a:cs typeface="+mn-cs"/>
                                     </a:rPr>
@@ -9940,7 +9183,564 @@
                                         <a:schemeClr val="dk1"/>
                                       </a:solidFill>
                                       <a:effectLst/>
-                                      <a:latin typeface="+mn-lt"/>
+                                      <a:latin typeface="Cambria Math" panose="02040503050406030204" pitchFamily="18" charset="0"/>
+                                      <a:ea typeface="+mn-ea"/>
+                                      <a:cs typeface="+mn-cs"/>
+                                    </a:rPr>
+                                    <m:t>𝑒</m:t>
+                                  </m:r>
+                                </m:e>
+                                <m:sub>
+                                  <m:r>
+                                    <a:rPr lang="en-US" sz="2800" b="0" i="1" kern="1200" smtClean="0">
+                                      <a:solidFill>
+                                        <a:schemeClr val="dk1"/>
+                                      </a:solidFill>
+                                      <a:effectLst/>
+                                      <a:latin typeface="Cambria Math" panose="02040503050406030204" pitchFamily="18" charset="0"/>
+                                      <a:ea typeface="+mn-ea"/>
+                                      <a:cs typeface="+mn-cs"/>
+                                    </a:rPr>
+                                    <m:t>2</m:t>
+                                  </m:r>
+                                  <m:r>
+                                    <a:rPr lang="en-US" sz="2800" b="0" i="1" kern="1200" smtClean="0">
+                                      <a:solidFill>
+                                        <a:schemeClr val="dk1"/>
+                                      </a:solidFill>
+                                      <a:effectLst/>
+                                      <a:latin typeface="Cambria Math" panose="02040503050406030204" pitchFamily="18" charset="0"/>
+                                      <a:ea typeface="+mn-ea"/>
+                                      <a:cs typeface="+mn-cs"/>
+                                    </a:rPr>
+                                    <m:t>𝑛𝑑</m:t>
+                                  </m:r>
+                                  <m:r>
+                                    <a:rPr lang="en-US" sz="2800" i="1" kern="1200">
+                                      <a:solidFill>
+                                        <a:schemeClr val="dk1"/>
+                                      </a:solidFill>
+                                      <a:effectLst/>
+                                      <a:latin typeface="Cambria Math" panose="02040503050406030204" pitchFamily="18" charset="0"/>
+                                      <a:ea typeface="+mn-ea"/>
+                                      <a:cs typeface="+mn-cs"/>
+                                    </a:rPr>
+                                    <m:t> </m:t>
+                                  </m:r>
+                                  <m:r>
+                                    <a:rPr lang="en-US" sz="2800" i="1" kern="1200">
+                                      <a:solidFill>
+                                        <a:schemeClr val="dk1"/>
+                                      </a:solidFill>
+                                      <a:effectLst/>
+                                      <a:latin typeface="Cambria Math" panose="02040503050406030204" pitchFamily="18" charset="0"/>
+                                      <a:ea typeface="+mn-ea"/>
+                                      <a:cs typeface="+mn-cs"/>
+                                    </a:rPr>
+                                    <m:t>𝑦𝑒𝑎𝑟</m:t>
+                                  </m:r>
+                                </m:sub>
+                              </m:sSub>
+                              <m:r>
+                                <a:rPr lang="en-US" sz="2800" i="1" kern="1200">
+                                  <a:solidFill>
+                                    <a:schemeClr val="dk1"/>
+                                  </a:solidFill>
+                                  <a:effectLst/>
+                                  <a:latin typeface="Cambria Math" panose="02040503050406030204" pitchFamily="18" charset="0"/>
+                                  <a:ea typeface="+mn-ea"/>
+                                  <a:cs typeface="+mn-cs"/>
+                                </a:rPr>
+                                <m:t>+ </m:t>
+                              </m:r>
+                              <m:sSub>
+                                <m:sSubPr>
+                                  <m:ctrlPr>
+                                    <a:rPr lang="en-US" sz="2800" i="1" kern="1200">
+                                      <a:solidFill>
+                                        <a:schemeClr val="dk1"/>
+                                      </a:solidFill>
+                                      <a:effectLst/>
+                                      <a:latin typeface="Cambria Math" panose="02040503050406030204" pitchFamily="18" charset="0"/>
+                                      <a:ea typeface="+mn-ea"/>
+                                      <a:cs typeface="+mn-cs"/>
+                                    </a:rPr>
+                                  </m:ctrlPr>
+                                </m:sSubPr>
+                                <m:e>
+                                  <m:sSub>
+                                    <m:sSubPr>
+                                      <m:ctrlPr>
+                                        <a:rPr lang="en-US" sz="2800" i="1" kern="1200">
+                                          <a:solidFill>
+                                            <a:schemeClr val="dk1"/>
+                                          </a:solidFill>
+                                          <a:effectLst/>
+                                          <a:latin typeface="Cambria Math" panose="02040503050406030204" pitchFamily="18" charset="0"/>
+                                          <a:ea typeface="+mn-ea"/>
+                                          <a:cs typeface="+mn-cs"/>
+                                        </a:rPr>
+                                      </m:ctrlPr>
+                                    </m:sSubPr>
+                                    <m:e>
+                                      <m:r>
+                                        <a:rPr lang="en-US" sz="2800" i="1" kern="1200">
+                                          <a:solidFill>
+                                            <a:schemeClr val="dk1"/>
+                                          </a:solidFill>
+                                          <a:effectLst/>
+                                          <a:latin typeface="Cambria Math" panose="02040503050406030204" pitchFamily="18" charset="0"/>
+                                          <a:ea typeface="+mn-ea"/>
+                                          <a:cs typeface="+mn-cs"/>
+                                        </a:rPr>
+                                        <m:t>𝛽</m:t>
+                                      </m:r>
+                                    </m:e>
+                                    <m:sub>
+                                      <m:r>
+                                        <a:rPr lang="en-US" sz="2800" i="1" kern="1200">
+                                          <a:solidFill>
+                                            <a:schemeClr val="dk1"/>
+                                          </a:solidFill>
+                                          <a:effectLst/>
+                                          <a:latin typeface="Cambria Math" panose="02040503050406030204" pitchFamily="18" charset="0"/>
+                                          <a:ea typeface="+mn-ea"/>
+                                          <a:cs typeface="+mn-cs"/>
+                                        </a:rPr>
+                                        <m:t>20</m:t>
+                                      </m:r>
+                                    </m:sub>
+                                  </m:sSub>
+                                  <m:r>
+                                    <a:rPr lang="en-US" sz="2800" i="1" kern="1200">
+                                      <a:solidFill>
+                                        <a:schemeClr val="dk1"/>
+                                      </a:solidFill>
+                                      <a:effectLst/>
+                                      <a:latin typeface="Cambria Math" panose="02040503050406030204" pitchFamily="18" charset="0"/>
+                                      <a:ea typeface="+mn-ea"/>
+                                      <a:cs typeface="+mn-cs"/>
+                                    </a:rPr>
+                                    <m:t>1</m:t>
+                                  </m:r>
+                                </m:e>
+                                <m:sub>
+                                  <m:r>
+                                    <a:rPr lang="en-US" sz="2800" i="1" kern="1200">
+                                      <a:solidFill>
+                                        <a:schemeClr val="dk1"/>
+                                      </a:solidFill>
+                                      <a:effectLst/>
+                                      <a:latin typeface="Cambria Math" panose="02040503050406030204" pitchFamily="18" charset="0"/>
+                                      <a:ea typeface="+mn-ea"/>
+                                      <a:cs typeface="+mn-cs"/>
+                                    </a:rPr>
+                                    <m:t>𝐷𝑂</m:t>
+                                  </m:r>
+                                  <m:sSub>
+                                    <m:sSubPr>
+                                      <m:ctrlPr>
+                                        <a:rPr lang="en-US" sz="2800" i="1" kern="1200">
+                                          <a:solidFill>
+                                            <a:schemeClr val="dk1"/>
+                                          </a:solidFill>
+                                          <a:effectLst/>
+                                          <a:latin typeface="Cambria Math" panose="02040503050406030204" pitchFamily="18" charset="0"/>
+                                          <a:ea typeface="+mn-ea"/>
+                                          <a:cs typeface="+mn-cs"/>
+                                        </a:rPr>
+                                      </m:ctrlPr>
+                                    </m:sSubPr>
+                                    <m:e>
+                                      <m:r>
+                                        <a:rPr lang="en-US" sz="2800" i="1" kern="1200">
+                                          <a:solidFill>
+                                            <a:schemeClr val="dk1"/>
+                                          </a:solidFill>
+                                          <a:effectLst/>
+                                          <a:latin typeface="Cambria Math" panose="02040503050406030204" pitchFamily="18" charset="0"/>
+                                          <a:ea typeface="+mn-ea"/>
+                                          <a:cs typeface="+mn-cs"/>
+                                        </a:rPr>
+                                        <m:t>𝐵</m:t>
+                                      </m:r>
+                                    </m:e>
+                                    <m:sub>
+                                      <m:r>
+                                        <a:rPr lang="en-US" sz="2800" i="1" kern="1200">
+                                          <a:solidFill>
+                                            <a:schemeClr val="dk1"/>
+                                          </a:solidFill>
+                                          <a:effectLst/>
+                                          <a:latin typeface="Cambria Math" panose="02040503050406030204" pitchFamily="18" charset="0"/>
+                                          <a:ea typeface="+mn-ea"/>
+                                          <a:cs typeface="+mn-cs"/>
+                                        </a:rPr>
+                                        <m:t>2</m:t>
+                                      </m:r>
+                                    </m:sub>
+                                  </m:sSub>
+                                </m:sub>
+                              </m:sSub>
+                              <m:r>
+                                <a:rPr lang="en-US" sz="2800" i="1" kern="1200">
+                                  <a:solidFill>
+                                    <a:schemeClr val="dk1"/>
+                                  </a:solidFill>
+                                  <a:effectLst/>
+                                  <a:latin typeface="Cambria Math" panose="02040503050406030204" pitchFamily="18" charset="0"/>
+                                  <a:ea typeface="+mn-ea"/>
+                                  <a:cs typeface="+mn-cs"/>
+                                </a:rPr>
+                                <m:t>+</m:t>
+                              </m:r>
+                              <m:sSub>
+                                <m:sSubPr>
+                                  <m:ctrlPr>
+                                    <a:rPr lang="en-US" sz="2800" i="1" kern="1200">
+                                      <a:solidFill>
+                                        <a:schemeClr val="dk1"/>
+                                      </a:solidFill>
+                                      <a:effectLst/>
+                                      <a:latin typeface="Cambria Math" panose="02040503050406030204" pitchFamily="18" charset="0"/>
+                                      <a:ea typeface="+mn-ea"/>
+                                      <a:cs typeface="+mn-cs"/>
+                                    </a:rPr>
+                                  </m:ctrlPr>
+                                </m:sSubPr>
+                                <m:e>
+                                  <m:r>
+                                    <a:rPr lang="en-US" sz="2800" i="1" kern="1200">
+                                      <a:solidFill>
+                                        <a:schemeClr val="dk1"/>
+                                      </a:solidFill>
+                                      <a:effectLst/>
+                                      <a:latin typeface="Cambria Math" panose="02040503050406030204" pitchFamily="18" charset="0"/>
+                                      <a:ea typeface="+mn-ea"/>
+                                      <a:cs typeface="+mn-cs"/>
+                                    </a:rPr>
+                                    <m:t>𝛽</m:t>
+                                  </m:r>
+                                </m:e>
+                                <m:sub>
+                                  <m:r>
+                                    <a:rPr lang="en-US" sz="2800" i="1" kern="1200">
+                                      <a:solidFill>
+                                        <a:schemeClr val="dk1"/>
+                                      </a:solidFill>
+                                      <a:effectLst/>
+                                      <a:latin typeface="Cambria Math" panose="02040503050406030204" pitchFamily="18" charset="0"/>
+                                      <a:ea typeface="+mn-ea"/>
+                                      <a:cs typeface="+mn-cs"/>
+                                    </a:rPr>
+                                    <m:t>21</m:t>
+                                  </m:r>
+                                </m:sub>
+                              </m:sSub>
+                              <m:sSub>
+                                <m:sSubPr>
+                                  <m:ctrlPr>
+                                    <a:rPr lang="en-US" sz="2800" i="1" kern="1200">
+                                      <a:solidFill>
+                                        <a:schemeClr val="dk1"/>
+                                      </a:solidFill>
+                                      <a:effectLst/>
+                                      <a:latin typeface="Cambria Math" panose="02040503050406030204" pitchFamily="18" charset="0"/>
+                                      <a:ea typeface="+mn-ea"/>
+                                      <a:cs typeface="+mn-cs"/>
+                                    </a:rPr>
+                                  </m:ctrlPr>
+                                </m:sSubPr>
+                                <m:e>
+                                  <m:r>
+                                    <a:rPr lang="en-US" sz="2800" i="1" kern="1200">
+                                      <a:solidFill>
+                                        <a:schemeClr val="dk1"/>
+                                      </a:solidFill>
+                                      <a:effectLst/>
+                                      <a:latin typeface="Cambria Math" panose="02040503050406030204" pitchFamily="18" charset="0"/>
+                                      <a:ea typeface="+mn-ea"/>
+                                      <a:cs typeface="+mn-cs"/>
+                                    </a:rPr>
+                                    <m:t>1</m:t>
+                                  </m:r>
+                                </m:e>
+                                <m:sub>
+                                  <m:r>
+                                    <a:rPr lang="en-US" sz="2800" i="1" kern="1200">
+                                      <a:solidFill>
+                                        <a:schemeClr val="dk1"/>
+                                      </a:solidFill>
+                                      <a:effectLst/>
+                                      <a:latin typeface="Cambria Math" panose="02040503050406030204" pitchFamily="18" charset="0"/>
+                                      <a:ea typeface="+mn-ea"/>
+                                      <a:cs typeface="+mn-cs"/>
+                                    </a:rPr>
+                                    <m:t>𝐷𝑂</m:t>
+                                  </m:r>
+                                  <m:sSub>
+                                    <m:sSubPr>
+                                      <m:ctrlPr>
+                                        <a:rPr lang="en-US" sz="2800" i="1" kern="1200">
+                                          <a:solidFill>
+                                            <a:schemeClr val="dk1"/>
+                                          </a:solidFill>
+                                          <a:effectLst/>
+                                          <a:latin typeface="Cambria Math" panose="02040503050406030204" pitchFamily="18" charset="0"/>
+                                          <a:ea typeface="+mn-ea"/>
+                                          <a:cs typeface="+mn-cs"/>
+                                        </a:rPr>
+                                      </m:ctrlPr>
+                                    </m:sSubPr>
+                                    <m:e>
+                                      <m:r>
+                                        <a:rPr lang="en-US" sz="2800" i="1" kern="1200">
+                                          <a:solidFill>
+                                            <a:schemeClr val="dk1"/>
+                                          </a:solidFill>
+                                          <a:effectLst/>
+                                          <a:latin typeface="Cambria Math" panose="02040503050406030204" pitchFamily="18" charset="0"/>
+                                          <a:ea typeface="+mn-ea"/>
+                                          <a:cs typeface="+mn-cs"/>
+                                        </a:rPr>
+                                        <m:t>𝐵</m:t>
+                                      </m:r>
+                                    </m:e>
+                                    <m:sub>
+                                      <m:r>
+                                        <a:rPr lang="en-US" sz="2800" i="1" kern="1200">
+                                          <a:solidFill>
+                                            <a:schemeClr val="dk1"/>
+                                          </a:solidFill>
+                                          <a:effectLst/>
+                                          <a:latin typeface="Cambria Math" panose="02040503050406030204" pitchFamily="18" charset="0"/>
+                                          <a:ea typeface="+mn-ea"/>
+                                          <a:cs typeface="+mn-cs"/>
+                                        </a:rPr>
+                                        <m:t>3</m:t>
+                                      </m:r>
+                                    </m:sub>
+                                  </m:sSub>
+                                </m:sub>
+                              </m:sSub>
+                              <m:r>
+                                <a:rPr lang="en-US" sz="2800" i="1" kern="1200">
+                                  <a:solidFill>
+                                    <a:schemeClr val="dk1"/>
+                                  </a:solidFill>
+                                  <a:effectLst/>
+                                  <a:latin typeface="Cambria Math" panose="02040503050406030204" pitchFamily="18" charset="0"/>
+                                  <a:ea typeface="+mn-ea"/>
+                                  <a:cs typeface="+mn-cs"/>
+                                </a:rPr>
+                                <m:t>+</m:t>
+                              </m:r>
+                              <m:sSub>
+                                <m:sSubPr>
+                                  <m:ctrlPr>
+                                    <a:rPr lang="en-US" sz="2800" i="1" kern="1200">
+                                      <a:solidFill>
+                                        <a:schemeClr val="dk1"/>
+                                      </a:solidFill>
+                                      <a:effectLst/>
+                                      <a:latin typeface="Cambria Math" panose="02040503050406030204" pitchFamily="18" charset="0"/>
+                                      <a:ea typeface="+mn-ea"/>
+                                      <a:cs typeface="+mn-cs"/>
+                                    </a:rPr>
+                                  </m:ctrlPr>
+                                </m:sSubPr>
+                                <m:e>
+                                  <m:r>
+                                    <a:rPr lang="en-US" sz="2800" i="1" kern="1200">
+                                      <a:solidFill>
+                                        <a:schemeClr val="dk1"/>
+                                      </a:solidFill>
+                                      <a:effectLst/>
+                                      <a:latin typeface="Cambria Math" panose="02040503050406030204" pitchFamily="18" charset="0"/>
+                                      <a:ea typeface="+mn-ea"/>
+                                      <a:cs typeface="+mn-cs"/>
+                                    </a:rPr>
+                                    <m:t>𝛽</m:t>
+                                  </m:r>
+                                </m:e>
+                                <m:sub>
+                                  <m:r>
+                                    <a:rPr lang="en-US" sz="2800" i="1" kern="1200">
+                                      <a:solidFill>
+                                        <a:schemeClr val="dk1"/>
+                                      </a:solidFill>
+                                      <a:effectLst/>
+                                      <a:latin typeface="Cambria Math" panose="02040503050406030204" pitchFamily="18" charset="0"/>
+                                      <a:ea typeface="+mn-ea"/>
+                                      <a:cs typeface="+mn-cs"/>
+                                    </a:rPr>
+                                    <m:t>22</m:t>
+                                  </m:r>
+                                </m:sub>
+                              </m:sSub>
+                              <m:sSub>
+                                <m:sSubPr>
+                                  <m:ctrlPr>
+                                    <a:rPr lang="en-US" sz="2800" i="1" kern="1200">
+                                      <a:solidFill>
+                                        <a:schemeClr val="dk1"/>
+                                      </a:solidFill>
+                                      <a:effectLst/>
+                                      <a:latin typeface="Cambria Math" panose="02040503050406030204" pitchFamily="18" charset="0"/>
+                                      <a:ea typeface="+mn-ea"/>
+                                      <a:cs typeface="+mn-cs"/>
+                                    </a:rPr>
+                                  </m:ctrlPr>
+                                </m:sSubPr>
+                                <m:e>
+                                  <m:r>
+                                    <a:rPr lang="en-US" sz="2800" i="1" kern="1200">
+                                      <a:solidFill>
+                                        <a:schemeClr val="dk1"/>
+                                      </a:solidFill>
+                                      <a:effectLst/>
+                                      <a:latin typeface="Cambria Math" panose="02040503050406030204" pitchFamily="18" charset="0"/>
+                                      <a:ea typeface="+mn-ea"/>
+                                      <a:cs typeface="+mn-cs"/>
+                                    </a:rPr>
+                                    <m:t>1</m:t>
+                                  </m:r>
+                                </m:e>
+                                <m:sub>
+                                  <m:r>
+                                    <a:rPr lang="en-US" sz="2800" i="1" kern="1200">
+                                      <a:solidFill>
+                                        <a:schemeClr val="dk1"/>
+                                      </a:solidFill>
+                                      <a:effectLst/>
+                                      <a:latin typeface="Cambria Math" panose="02040503050406030204" pitchFamily="18" charset="0"/>
+                                      <a:ea typeface="+mn-ea"/>
+                                      <a:cs typeface="+mn-cs"/>
+                                    </a:rPr>
+                                    <m:t>𝐷𝑂</m:t>
+                                  </m:r>
+                                  <m:sSub>
+                                    <m:sSubPr>
+                                      <m:ctrlPr>
+                                        <a:rPr lang="en-US" sz="2800" i="1" kern="1200">
+                                          <a:solidFill>
+                                            <a:schemeClr val="dk1"/>
+                                          </a:solidFill>
+                                          <a:effectLst/>
+                                          <a:latin typeface="Cambria Math" panose="02040503050406030204" pitchFamily="18" charset="0"/>
+                                          <a:ea typeface="+mn-ea"/>
+                                          <a:cs typeface="+mn-cs"/>
+                                        </a:rPr>
+                                      </m:ctrlPr>
+                                    </m:sSubPr>
+                                    <m:e>
+                                      <m:r>
+                                        <a:rPr lang="en-US" sz="2800" i="1" kern="1200">
+                                          <a:solidFill>
+                                            <a:schemeClr val="dk1"/>
+                                          </a:solidFill>
+                                          <a:effectLst/>
+                                          <a:latin typeface="Cambria Math" panose="02040503050406030204" pitchFamily="18" charset="0"/>
+                                          <a:ea typeface="+mn-ea"/>
+                                          <a:cs typeface="+mn-cs"/>
+                                        </a:rPr>
+                                        <m:t>𝐵</m:t>
+                                      </m:r>
+                                    </m:e>
+                                    <m:sub>
+                                      <m:r>
+                                        <a:rPr lang="en-US" sz="2800" i="1" kern="1200">
+                                          <a:solidFill>
+                                            <a:schemeClr val="dk1"/>
+                                          </a:solidFill>
+                                          <a:effectLst/>
+                                          <a:latin typeface="Cambria Math" panose="02040503050406030204" pitchFamily="18" charset="0"/>
+                                          <a:ea typeface="+mn-ea"/>
+                                          <a:cs typeface="+mn-cs"/>
+                                        </a:rPr>
+                                        <m:t>4</m:t>
+                                      </m:r>
+                                    </m:sub>
+                                  </m:sSub>
+                                </m:sub>
+                              </m:sSub>
+                            </m:oMath>
+                          </a14:m>
+                          <a:endParaRPr lang="en-US" sz="2800" kern="1200" dirty="0">
+                            <a:solidFill>
+                              <a:schemeClr val="dk1"/>
+                            </a:solidFill>
+                            <a:latin typeface="+mj-lt"/>
+                            <a:ea typeface="+mn-ea"/>
+                            <a:cs typeface="+mn-cs"/>
+                          </a:endParaRPr>
+                        </a:p>
+                        <a:p>
+                          <a:pPr marL="457200" indent="-457200" algn="l" rtl="0">
+                            <a:lnSpc>
+                              <a:spcPct val="150000"/>
+                            </a:lnSpc>
+                            <a:buFont typeface="Arial" panose="020B0604020202020204" pitchFamily="34" charset="0"/>
+                            <a:buChar char="•"/>
+                          </a:pPr>
+                          <a:r>
+                            <a:rPr lang="en-US" sz="3200" b="1" kern="1200" dirty="0">
+                              <a:solidFill>
+                                <a:schemeClr val="dk1"/>
+                              </a:solidFill>
+                              <a:latin typeface="+mj-lt"/>
+                              <a:ea typeface="+mn-ea"/>
+                              <a:cs typeface="+mn-cs"/>
+                            </a:rPr>
+                            <a:t>Logistic regression using Generalized Additive Model:</a:t>
+                          </a:r>
+                          <a:r>
+                            <a:rPr lang="en-US" sz="3200" b="1" kern="1200" baseline="0" dirty="0">
+                              <a:solidFill>
+                                <a:schemeClr val="dk1"/>
+                              </a:solidFill>
+                              <a:latin typeface="+mj-lt"/>
+                              <a:ea typeface="+mn-ea"/>
+                              <a:cs typeface="+mn-cs"/>
+                            </a:rPr>
+                            <a:t> </a:t>
+                          </a:r>
+                          <a14:m>
+                            <m:oMath xmlns:m="http://schemas.openxmlformats.org/officeDocument/2006/math">
+                              <m:r>
+                                <a:rPr lang="en-US" sz="2800" i="1" kern="1200" smtClean="0">
+                                  <a:solidFill>
+                                    <a:schemeClr val="dk1"/>
+                                  </a:solidFill>
+                                  <a:effectLst/>
+                                  <a:latin typeface="Cambria Math" panose="02040503050406030204" pitchFamily="18" charset="0"/>
+                                  <a:ea typeface="+mn-ea"/>
+                                  <a:cs typeface="+mn-cs"/>
+                                </a:rPr>
+                                <m:t>𝐵𝑎𝑠</m:t>
+                              </m:r>
+                              <m:sSub>
+                                <m:sSubPr>
+                                  <m:ctrlPr>
+                                    <a:rPr lang="en-US" sz="2800" i="1" kern="1200">
+                                      <a:solidFill>
+                                        <a:schemeClr val="dk1"/>
+                                      </a:solidFill>
+                                      <a:effectLst/>
+                                      <a:latin typeface="Cambria Math" panose="02040503050406030204" pitchFamily="18" charset="0"/>
+                                      <a:ea typeface="+mn-ea"/>
+                                      <a:cs typeface="+mn-cs"/>
+                                    </a:rPr>
+                                  </m:ctrlPr>
+                                </m:sSubPr>
+                                <m:e>
+                                  <m:r>
+                                    <a:rPr lang="en-US" sz="2800" i="1" kern="1200">
+                                      <a:solidFill>
+                                        <a:schemeClr val="dk1"/>
+                                      </a:solidFill>
+                                      <a:effectLst/>
+                                      <a:latin typeface="Cambria Math" panose="02040503050406030204" pitchFamily="18" charset="0"/>
                                       <a:ea typeface="+mn-ea"/>
                                       <a:cs typeface="+mn-cs"/>
                                     </a:rPr>
@@ -9954,7 +9754,7 @@
                                         <a:schemeClr val="dk1"/>
                                       </a:solidFill>
                                       <a:effectLst/>
-                                      <a:latin typeface="+mn-lt"/>
+                                      <a:latin typeface="Cambria Math" panose="02040503050406030204" pitchFamily="18" charset="0"/>
                                       <a:ea typeface="+mn-ea"/>
                                       <a:cs typeface="+mn-cs"/>
                                     </a:rPr>
@@ -9966,7 +9766,7 @@
                                         <a:schemeClr val="dk1"/>
                                       </a:solidFill>
                                       <a:effectLst/>
-                                      <a:latin typeface="+mn-lt"/>
+                                      <a:latin typeface="Cambria Math" panose="02040503050406030204" pitchFamily="18" charset="0"/>
                                       <a:ea typeface="+mn-ea"/>
                                       <a:cs typeface="+mn-cs"/>
                                     </a:rPr>
@@ -9978,7 +9778,7 @@
                                         <a:schemeClr val="dk1"/>
                                       </a:solidFill>
                                       <a:effectLst/>
-                                      <a:latin typeface="+mn-lt"/>
+                                      <a:latin typeface="Cambria Math" panose="02040503050406030204" pitchFamily="18" charset="0"/>
                                       <a:ea typeface="+mn-ea"/>
                                       <a:cs typeface="+mn-cs"/>
                                     </a:rPr>
@@ -9992,7 +9792,7 @@
                                     <a:schemeClr val="dk1"/>
                                   </a:solidFill>
                                   <a:effectLst/>
-                                  <a:latin typeface="+mn-lt"/>
+                                  <a:latin typeface="Cambria Math" panose="02040503050406030204" pitchFamily="18" charset="0"/>
                                   <a:ea typeface="+mn-ea"/>
                                   <a:cs typeface="+mn-cs"/>
                                 </a:rPr>
@@ -10008,7 +9808,7 @@
                                         <a:schemeClr val="dk1"/>
                                       </a:solidFill>
                                       <a:effectLst/>
-                                      <a:latin typeface="+mn-lt"/>
+                                      <a:latin typeface="Cambria Math" panose="02040503050406030204" pitchFamily="18" charset="0"/>
                                       <a:ea typeface="+mn-ea"/>
                                       <a:cs typeface="+mn-cs"/>
                                     </a:rPr>
@@ -10016,16 +9816,19 @@
                                 </m:naryPr>
                                 <m:sub>
                                   <m:r>
-                                    <a:rPr lang="en-US" sz="2800" i="1" kern="1200">
+                                    <m:rPr>
+                                      <m:brk/>
+                                    </m:rPr>
+                                    <a:rPr lang="en-US" sz="2800" b="0" i="1" kern="1200" smtClean="0">
                                       <a:solidFill>
                                         <a:schemeClr val="dk1"/>
                                       </a:solidFill>
                                       <a:effectLst/>
-                                      <a:latin typeface="+mn-lt"/>
+                                      <a:latin typeface="Cambria Math" panose="02040503050406030204" pitchFamily="18" charset="0"/>
                                       <a:ea typeface="+mn-ea"/>
                                       <a:cs typeface="+mn-cs"/>
                                     </a:rPr>
-                                    <m:t>𝑛</m:t>
+                                    <m:t>𝑖</m:t>
                                   </m:r>
                                   <m:r>
                                     <a:rPr lang="en-US" sz="2800" i="1" kern="1200">
@@ -10033,7 +9836,7 @@
                                         <a:schemeClr val="dk1"/>
                                       </a:solidFill>
                                       <a:effectLst/>
-                                      <a:latin typeface="+mn-lt"/>
+                                      <a:latin typeface="Cambria Math" panose="02040503050406030204" pitchFamily="18" charset="0"/>
                                       <a:ea typeface="+mn-ea"/>
                                       <a:cs typeface="+mn-cs"/>
                                     </a:rPr>
@@ -10045,7 +9848,7 @@
                                         <a:schemeClr val="dk1"/>
                                       </a:solidFill>
                                       <a:effectLst/>
-                                      <a:latin typeface="+mn-lt"/>
+                                      <a:latin typeface="Cambria Math" panose="02040503050406030204" pitchFamily="18" charset="0"/>
                                       <a:ea typeface="+mn-ea"/>
                                       <a:cs typeface="+mn-cs"/>
                                     </a:rPr>
@@ -10059,7 +9862,7 @@
                                         <a:schemeClr val="dk1"/>
                                       </a:solidFill>
                                       <a:effectLst/>
-                                      <a:latin typeface="+mn-lt"/>
+                                      <a:latin typeface="Cambria Math" panose="02040503050406030204" pitchFamily="18" charset="0"/>
                                       <a:ea typeface="+mn-ea"/>
                                       <a:cs typeface="+mn-cs"/>
                                     </a:rPr>
@@ -10075,7 +9878,7 @@
                                             <a:schemeClr val="dk1"/>
                                           </a:solidFill>
                                           <a:effectLst/>
-                                          <a:latin typeface="+mn-lt"/>
+                                          <a:latin typeface="Cambria Math" panose="02040503050406030204" pitchFamily="18" charset="0"/>
                                           <a:ea typeface="+mn-ea"/>
                                           <a:cs typeface="+mn-cs"/>
                                         </a:rPr>
@@ -10088,7 +9891,7 @@
                                             <a:schemeClr val="dk1"/>
                                           </a:solidFill>
                                           <a:effectLst/>
-                                          <a:latin typeface="+mn-lt"/>
+                                          <a:latin typeface="Cambria Math" panose="02040503050406030204" pitchFamily="18" charset="0"/>
                                           <a:ea typeface="+mn-ea"/>
                                           <a:cs typeface="+mn-cs"/>
                                         </a:rPr>
@@ -10097,16 +9900,16 @@
                                     </m:e>
                                     <m:sub>
                                       <m:r>
-                                        <a:rPr lang="en-US" sz="2800" i="1" kern="1200">
+                                        <a:rPr lang="en-US" sz="2800" b="0" i="1" kern="1200" smtClean="0">
                                           <a:solidFill>
                                             <a:schemeClr val="dk1"/>
                                           </a:solidFill>
                                           <a:effectLst/>
-                                          <a:latin typeface="+mn-lt"/>
+                                          <a:latin typeface="Cambria Math" panose="02040503050406030204" pitchFamily="18" charset="0"/>
                                           <a:ea typeface="+mn-ea"/>
                                           <a:cs typeface="+mn-cs"/>
                                         </a:rPr>
-                                        <m:t>𝑛</m:t>
+                                        <m:t>𝑖</m:t>
                                       </m:r>
                                     </m:sub>
                                   </m:sSub>
@@ -10116,7 +9919,7 @@
                                         <a:schemeClr val="dk1"/>
                                       </a:solidFill>
                                       <a:effectLst/>
-                                      <a:latin typeface="+mn-lt"/>
+                                      <a:latin typeface="Cambria Math" panose="02040503050406030204" pitchFamily="18" charset="0"/>
                                       <a:ea typeface="+mn-ea"/>
                                       <a:cs typeface="+mn-cs"/>
                                     </a:rPr>
@@ -10130,7 +9933,7 @@
                                             <a:schemeClr val="dk1"/>
                                           </a:solidFill>
                                           <a:effectLst/>
-                                          <a:latin typeface="+mn-lt"/>
+                                          <a:latin typeface="Cambria Math" panose="02040503050406030204" pitchFamily="18" charset="0"/>
                                           <a:ea typeface="+mn-ea"/>
                                           <a:cs typeface="+mn-cs"/>
                                         </a:rPr>
@@ -10143,7 +9946,7 @@
                                             <a:schemeClr val="dk1"/>
                                           </a:solidFill>
                                           <a:effectLst/>
-                                          <a:latin typeface="+mn-lt"/>
+                                          <a:latin typeface="Cambria Math" panose="02040503050406030204" pitchFamily="18" charset="0"/>
                                           <a:ea typeface="+mn-ea"/>
                                           <a:cs typeface="+mn-cs"/>
                                         </a:rPr>
@@ -10155,67 +9958,67 @@
                                             <a:schemeClr val="dk1"/>
                                           </a:solidFill>
                                           <a:effectLst/>
-                                          <a:latin typeface="+mn-lt"/>
+                                          <a:latin typeface="Cambria Math" panose="02040503050406030204" pitchFamily="18" charset="0"/>
                                           <a:ea typeface="+mn-ea"/>
                                           <a:cs typeface="+mn-cs"/>
                                         </a:rPr>
-                                        <m:t>𝑑𝑎𝑡𝑒</m:t>
+                                        <m:t>𝑑𝑎𝑦</m:t>
                                       </m:r>
                                       <m:r>
-                                        <a:rPr lang="en-US" sz="2800" i="1" kern="1200">
+                                        <a:rPr lang="en-US" sz="2800" b="0" i="1" kern="1200" smtClean="0">
                                           <a:solidFill>
                                             <a:schemeClr val="dk1"/>
                                           </a:solidFill>
                                           <a:effectLst/>
-                                          <a:latin typeface="+mn-lt"/>
+                                          <a:latin typeface="Cambria Math" panose="02040503050406030204" pitchFamily="18" charset="0"/>
                                           <a:ea typeface="+mn-ea"/>
                                           <a:cs typeface="+mn-cs"/>
                                         </a:rPr>
                                         <m:t> </m:t>
                                       </m:r>
                                       <m:r>
-                                        <a:rPr lang="en-US" sz="2800" i="1" kern="1200">
+                                        <a:rPr lang="en-US" sz="2800" b="0" i="1" kern="1200" smtClean="0">
                                           <a:solidFill>
                                             <a:schemeClr val="dk1"/>
                                           </a:solidFill>
                                           <a:effectLst/>
-                                          <a:latin typeface="+mn-lt"/>
+                                          <a:latin typeface="Cambria Math" panose="02040503050406030204" pitchFamily="18" charset="0"/>
                                           <a:ea typeface="+mn-ea"/>
                                           <a:cs typeface="+mn-cs"/>
                                         </a:rPr>
                                         <m:t>𝑜𝑓</m:t>
                                       </m:r>
                                       <m:r>
-                                        <a:rPr lang="en-US" sz="2800" i="1" kern="1200">
+                                        <a:rPr lang="en-US" sz="2800" b="0" i="1" kern="1200" smtClean="0">
                                           <a:solidFill>
                                             <a:schemeClr val="dk1"/>
                                           </a:solidFill>
                                           <a:effectLst/>
-                                          <a:latin typeface="+mn-lt"/>
+                                          <a:latin typeface="Cambria Math" panose="02040503050406030204" pitchFamily="18" charset="0"/>
                                           <a:ea typeface="+mn-ea"/>
                                           <a:cs typeface="+mn-cs"/>
                                         </a:rPr>
                                         <m:t> </m:t>
                                       </m:r>
                                       <m:r>
-                                        <a:rPr lang="en-US" sz="2800" i="1" kern="1200">
+                                        <a:rPr lang="en-US" sz="2800" b="0" i="1" kern="1200" smtClean="0">
                                           <a:solidFill>
                                             <a:schemeClr val="dk1"/>
                                           </a:solidFill>
                                           <a:effectLst/>
-                                          <a:latin typeface="+mn-lt"/>
+                                          <a:latin typeface="Cambria Math" panose="02040503050406030204" pitchFamily="18" charset="0"/>
                                           <a:ea typeface="+mn-ea"/>
                                           <a:cs typeface="+mn-cs"/>
                                         </a:rPr>
                                         <m:t>𝑏𝑖𝑟𝑡</m:t>
                                       </m:r>
                                       <m:r>
-                                        <a:rPr lang="en-US" sz="2800" i="1" kern="1200">
+                                        <a:rPr lang="en-US" sz="2800" b="0" i="1" kern="1200" smtClean="0">
                                           <a:solidFill>
                                             <a:schemeClr val="dk1"/>
                                           </a:solidFill>
                                           <a:effectLst/>
-                                          <a:latin typeface="+mn-lt"/>
+                                          <a:latin typeface="Cambria Math" panose="02040503050406030204" pitchFamily="18" charset="0"/>
                                           <a:ea typeface="+mn-ea"/>
                                           <a:cs typeface="+mn-cs"/>
                                         </a:rPr>
@@ -10227,31 +10030,7 @@
                                             <a:schemeClr val="dk1"/>
                                           </a:solidFill>
                                           <a:effectLst/>
-                                          <a:latin typeface="+mn-lt"/>
-                                          <a:ea typeface="+mn-ea"/>
-                                          <a:cs typeface="+mn-cs"/>
-                                        </a:rPr>
-                                        <m:t> </m:t>
-                                      </m:r>
-                                      <m:r>
-                                        <a:rPr lang="en-US" sz="2800" i="1" kern="1200">
-                                          <a:solidFill>
-                                            <a:schemeClr val="dk1"/>
-                                          </a:solidFill>
-                                          <a:effectLst/>
-                                          <a:latin typeface="+mn-lt"/>
-                                          <a:ea typeface="+mn-ea"/>
-                                          <a:cs typeface="+mn-cs"/>
-                                        </a:rPr>
-                                        <m:t>𝑐𝑜𝑢𝑛𝑡</m:t>
-                                      </m:r>
-                                      <m:r>
-                                        <a:rPr lang="en-US" sz="2800" i="1" kern="1200">
-                                          <a:solidFill>
-                                            <a:schemeClr val="dk1"/>
-                                          </a:solidFill>
-                                          <a:effectLst/>
-                                          <a:latin typeface="+mn-lt"/>
+                                          <a:latin typeface="Cambria Math" panose="02040503050406030204" pitchFamily="18" charset="0"/>
                                           <a:ea typeface="+mn-ea"/>
                                           <a:cs typeface="+mn-cs"/>
                                         </a:rPr>
@@ -10260,16 +10039,16 @@
                                     </m:e>
                                     <m:sup>
                                       <m:r>
-                                        <a:rPr lang="en-US" sz="2800" i="1" kern="1200">
+                                        <a:rPr lang="en-US" sz="2800" b="0" i="1" kern="1200" smtClean="0">
                                           <a:solidFill>
                                             <a:schemeClr val="dk1"/>
                                           </a:solidFill>
                                           <a:effectLst/>
-                                          <a:latin typeface="+mn-lt"/>
+                                          <a:latin typeface="Cambria Math" panose="02040503050406030204" pitchFamily="18" charset="0"/>
                                           <a:ea typeface="+mn-ea"/>
                                           <a:cs typeface="+mn-cs"/>
                                         </a:rPr>
-                                        <m:t>𝑛</m:t>
+                                        <m:t>𝑖</m:t>
                                       </m:r>
                                     </m:sup>
                                   </m:sSup>
@@ -10362,14 +10141,14 @@
               <p:nvPr>
                 <p:extLst>
                   <p:ext uri="{D42A27DB-BD31-4B8C-83A1-F6EECF244321}">
-                    <p14:modId xmlns:p14="http://schemas.microsoft.com/office/powerpoint/2010/main" val="3024389625"/>
+                    <p14:modId xmlns:p14="http://schemas.microsoft.com/office/powerpoint/2010/main" val="3266362276"/>
                   </p:ext>
                 </p:extLst>
               </p:nvPr>
             </p:nvGraphicFramePr>
             <p:xfrm>
-              <a:off x="93744" y="25050291"/>
-              <a:ext cx="13680000" cy="9383071"/>
+              <a:off x="0" y="25050291"/>
+              <a:ext cx="13773744" cy="9436588"/>
             </p:xfrm>
             <a:graphic>
               <a:graphicData uri="http://schemas.openxmlformats.org/drawingml/2006/table">
@@ -10378,7 +10157,7 @@
                     <a:tableStyleId>{F5AB1C69-6EDB-4FF4-983F-18BD219EF322}</a:tableStyleId>
                   </a:tblPr>
                   <a:tblGrid>
-                    <a:gridCol w="13680000">
+                    <a:gridCol w="13773744">
                       <a:extLst>
                         <a:ext uri="{9D8B030D-6E8A-4147-A177-3AD203B41FA5}">
                           <a16:colId xmlns:a16="http://schemas.microsoft.com/office/drawing/2014/main" val="3747045786"/>
@@ -10403,7 +10182,7 @@
                             <a:rPr lang="en-US" sz="3200" dirty="0">
                               <a:latin typeface="+mj-lt"/>
                             </a:rPr>
-                            <a:t>Statistical Methods</a:t>
+                            <a:t>Statistical Models</a:t>
                           </a:r>
                           <a:endParaRPr lang="en-US" sz="3200" kern="1200" dirty="0">
                             <a:solidFill>
@@ -10460,13 +10239,13 @@
                       </a:ext>
                     </a:extLst>
                   </a:tr>
-                  <a:tr h="8635676">
-                    <a:tc>
-                      <a:txBody>
-                        <a:bodyPr/>
-                        <a:lstStyle/>
-                        <a:p>
-                          <a:endParaRPr lang="en-US"/>
+                  <a:tr h="8689193">
+                    <a:tc>
+                      <a:txBody>
+                        <a:bodyPr/>
+                        <a:lstStyle/>
+                        <a:p>
+                          <a:endParaRPr lang="he-IL"/>
                         </a:p>
                       </a:txBody>
                       <a:tcPr>
@@ -10517,7 +10296,7 @@
                         <a:blipFill>
                           <a:blip r:embed="rId5"/>
                           <a:stretch>
-                            <a:fillRect l="-134" t="-8892" r="-267" b="-423"/>
+                            <a:fillRect l="-177" t="-8836" r="-265" b="-421"/>
                           </a:stretch>
                         </a:blipFill>
                       </a:tcPr>
@@ -10549,14 +10328,14 @@
           <p:nvPr>
             <p:extLst>
               <p:ext uri="{D42A27DB-BD31-4B8C-83A1-F6EECF244321}">
-                <p14:modId xmlns:p14="http://schemas.microsoft.com/office/powerpoint/2010/main" val="3856819166"/>
+                <p14:modId xmlns:p14="http://schemas.microsoft.com/office/powerpoint/2010/main" val="2079840438"/>
               </p:ext>
             </p:extLst>
           </p:nvPr>
         </p:nvGraphicFramePr>
         <p:xfrm>
           <a:off x="13881928" y="29693735"/>
-          <a:ext cx="15516000" cy="4705837"/>
+          <a:ext cx="15516000" cy="4793144"/>
         </p:xfrm>
         <a:graphic>
           <a:graphicData uri="http://schemas.openxmlformats.org/drawingml/2006/table">
@@ -10573,7 +10352,7 @@
                   </a:extLst>
                 </a:gridCol>
               </a:tblGrid>
-              <a:tr h="945431">
+              <a:tr h="750644">
                 <a:tc>
                   <a:txBody>
                     <a:bodyPr/>
@@ -10636,7 +10415,7 @@
                   </a:ext>
                 </a:extLst>
               </a:tr>
-              <a:tr h="3760406">
+              <a:tr h="4042500">
                 <a:tc>
                   <a:txBody>
                     <a:bodyPr/>
@@ -10658,7 +10437,7 @@
                           <a:ea typeface="+mn-ea"/>
                           <a:cs typeface="+mn-cs"/>
                         </a:rPr>
-                        <a:t>In the logistic model, birth date variables are significant. The smoothed estimator in Logistic GAM</a:t>
+                        <a:t>In the Logistic model, birth date variables are significant. The smoothed estimator in Logistic GAM</a:t>
                       </a:r>
                       <a:r>
                         <a:rPr lang="he-IL" sz="3200" kern="1200" dirty="0">
@@ -10777,7 +10556,7 @@
           <p:nvPr>
             <p:extLst>
               <p:ext uri="{D42A27DB-BD31-4B8C-83A1-F6EECF244321}">
-                <p14:modId xmlns:p14="http://schemas.microsoft.com/office/powerpoint/2010/main" val="2654195442"/>
+                <p14:modId xmlns:p14="http://schemas.microsoft.com/office/powerpoint/2010/main" val="2965366390"/>
               </p:ext>
             </p:extLst>
           </p:nvPr>
@@ -11131,7 +10910,7 @@
                           <a:latin typeface="Calibri Light" panose="020F0302020204030204" pitchFamily="34" charset="0"/>
                           <a:cs typeface="Calibri Light" panose="020F0302020204030204" pitchFamily="34" charset="0"/>
                         </a:rPr>
-                        <a:t>March19 to March 20</a:t>
+                        <a:t>March19 to March20</a:t>
                       </a:r>
                       <a:endParaRPr lang="en-US" sz="3200" b="0" i="0" u="none" strike="noStrike" dirty="0">
                         <a:solidFill>
@@ -11532,7 +11311,7 @@
               <p:nvPr>
                 <p:extLst>
                   <p:ext uri="{D42A27DB-BD31-4B8C-83A1-F6EECF244321}">
-                    <p14:modId xmlns:p14="http://schemas.microsoft.com/office/powerpoint/2010/main" val="1109589106"/>
+                    <p14:modId xmlns:p14="http://schemas.microsoft.com/office/powerpoint/2010/main" val="2916585032"/>
                   </p:ext>
                 </p:extLst>
               </p:nvPr>
@@ -17027,7 +16806,18 @@
                                     <a:latin typeface="Cambria Math" panose="02040503050406030204" pitchFamily="18" charset="0"/>
                                     <a:cs typeface="Calibri Light" panose="020F0302020204030204" pitchFamily="34" charset="0"/>
                                   </a:rPr>
-                                  <m:t>𝑒𝑙𝑡</m:t>
+                                  <m:t>𝑒𝑎𝑙</m:t>
+                                </m:r>
+                                <m:r>
+                                  <a:rPr lang="en-US" sz="2800" b="0" i="1" u="none" strike="noStrike" smtClean="0">
+                                    <a:solidFill>
+                                      <a:srgbClr val="000000"/>
+                                    </a:solidFill>
+                                    <a:effectLst/>
+                                    <a:latin typeface="Cambria Math" panose="02040503050406030204" pitchFamily="18" charset="0"/>
+                                    <a:cs typeface="Calibri Light" panose="020F0302020204030204" pitchFamily="34" charset="0"/>
+                                  </a:rPr>
+                                  <m:t>𝑡</m:t>
                                 </m:r>
                                 <m:r>
                                   <a:rPr lang="en-US" sz="2800" b="0" i="1" u="none" strike="noStrike" smtClean="0">
@@ -17509,7 +17299,18 @@
                                     <a:latin typeface="Cambria Math" panose="02040503050406030204" pitchFamily="18" charset="0"/>
                                     <a:cs typeface="Calibri Light" panose="020F0302020204030204" pitchFamily="34" charset="0"/>
                                   </a:rPr>
-                                  <m:t>𝑒𝑙𝑡</m:t>
+                                  <m:t>𝑒𝑎𝑙</m:t>
+                                </m:r>
+                                <m:r>
+                                  <a:rPr lang="en-US" sz="2800" b="0" i="1" u="none" strike="noStrike" smtClean="0">
+                                    <a:solidFill>
+                                      <a:srgbClr val="000000"/>
+                                    </a:solidFill>
+                                    <a:effectLst/>
+                                    <a:latin typeface="Cambria Math" panose="02040503050406030204" pitchFamily="18" charset="0"/>
+                                    <a:cs typeface="Calibri Light" panose="020F0302020204030204" pitchFamily="34" charset="0"/>
+                                  </a:rPr>
+                                  <m:t>𝑡</m:t>
                                 </m:r>
                                 <m:r>
                                   <a:rPr lang="en-US" sz="2800" b="0" i="1" u="none" strike="noStrike" smtClean="0">
@@ -20406,29 +20207,7 @@
                                         <a:latin typeface="Cambria Math" panose="02040503050406030204" pitchFamily="18" charset="0"/>
                                         <a:cs typeface="Calibri Light" panose="020F0302020204030204" pitchFamily="34" charset="0"/>
                                       </a:rPr>
-                                      <m:t>𝑑𝑎𝑦</m:t>
-                                    </m:r>
-                                    <m:r>
-                                      <a:rPr lang="en-US" sz="2800" b="0" i="1" u="none" strike="noStrike" smtClean="0">
-                                        <a:solidFill>
-                                          <a:srgbClr val="000000"/>
-                                        </a:solidFill>
-                                        <a:effectLst/>
-                                        <a:latin typeface="Cambria Math" panose="02040503050406030204" pitchFamily="18" charset="0"/>
-                                        <a:cs typeface="Calibri Light" panose="020F0302020204030204" pitchFamily="34" charset="0"/>
-                                      </a:rPr>
-                                      <m:t>.</m:t>
-                                    </m:r>
-                                    <m:r>
-                                      <a:rPr lang="en-US" sz="2800" b="0" i="1" u="none" strike="noStrike" smtClean="0">
-                                        <a:solidFill>
-                                          <a:srgbClr val="000000"/>
-                                        </a:solidFill>
-                                        <a:effectLst/>
-                                        <a:latin typeface="Cambria Math" panose="02040503050406030204" pitchFamily="18" charset="0"/>
-                                        <a:cs typeface="Calibri Light" panose="020F0302020204030204" pitchFamily="34" charset="0"/>
-                                      </a:rPr>
-                                      <m:t>𝑐𝑎𝑟𝑒</m:t>
+                                      <m:t>𝑑𝑎𝑦𝑐𝑎𝑟𝑒</m:t>
                                     </m:r>
                                   </m:sub>
                                 </m:sSub>
@@ -23183,7 +22962,7 @@
               <p:nvPr>
                 <p:extLst>
                   <p:ext uri="{D42A27DB-BD31-4B8C-83A1-F6EECF244321}">
-                    <p14:modId xmlns:p14="http://schemas.microsoft.com/office/powerpoint/2010/main" val="1109589106"/>
+                    <p14:modId xmlns:p14="http://schemas.microsoft.com/office/powerpoint/2010/main" val="2916585032"/>
                   </p:ext>
                 </p:extLst>
               </p:nvPr>
@@ -24025,7 +23804,7 @@
                         <a:bodyPr/>
                         <a:lstStyle/>
                         <a:p>
-                          <a:endParaRPr lang="en-US"/>
+                          <a:endParaRPr lang="he-IL"/>
                         </a:p>
                       </a:txBody>
                       <a:tcPr marL="6350" marR="6350" marT="6350" marB="0" anchor="ctr">
@@ -24493,7 +24272,7 @@
                         <a:bodyPr/>
                         <a:lstStyle/>
                         <a:p>
-                          <a:endParaRPr lang="en-US"/>
+                          <a:endParaRPr lang="he-IL"/>
                         </a:p>
                       </a:txBody>
                       <a:tcPr marL="6350" marR="6350" marT="6350" marB="0" anchor="ctr">
@@ -24894,7 +24673,7 @@
                         <a:bodyPr/>
                         <a:lstStyle/>
                         <a:p>
-                          <a:endParaRPr lang="en-US"/>
+                          <a:endParaRPr lang="he-IL"/>
                         </a:p>
                       </a:txBody>
                       <a:tcPr marL="6350" marR="6350" marT="6350" marB="0" anchor="ctr">
@@ -25274,7 +25053,7 @@
                         <a:bodyPr/>
                         <a:lstStyle/>
                         <a:p>
-                          <a:endParaRPr lang="en-US"/>
+                          <a:endParaRPr lang="he-IL"/>
                         </a:p>
                       </a:txBody>
                       <a:tcPr marL="6350" marR="6350" marT="6350" marB="0" anchor="ctr">
@@ -25670,7 +25449,7 @@
                         <a:bodyPr/>
                         <a:lstStyle/>
                         <a:p>
-                          <a:endParaRPr lang="en-US"/>
+                          <a:endParaRPr lang="he-IL"/>
                         </a:p>
                       </a:txBody>
                       <a:tcPr marL="6350" marR="6350" marT="6350" marB="0" anchor="ctr">
@@ -26069,7 +25848,7 @@
                         <a:bodyPr/>
                         <a:lstStyle/>
                         <a:p>
-                          <a:endParaRPr lang="en-US"/>
+                          <a:endParaRPr lang="he-IL"/>
                         </a:p>
                       </a:txBody>
                       <a:tcPr marL="6350" marR="6350" marT="6350" marB="0" anchor="ctr">
@@ -26486,7 +26265,7 @@
                         <a:bodyPr/>
                         <a:lstStyle/>
                         <a:p>
-                          <a:endParaRPr lang="en-US"/>
+                          <a:endParaRPr lang="he-IL"/>
                         </a:p>
                       </a:txBody>
                       <a:tcPr marL="6350" marR="6350" marT="6350" marB="0" anchor="ctr">
@@ -26866,7 +26645,7 @@
                         <a:bodyPr/>
                         <a:lstStyle/>
                         <a:p>
-                          <a:endParaRPr lang="en-US"/>
+                          <a:endParaRPr lang="he-IL"/>
                         </a:p>
                       </a:txBody>
                       <a:tcPr marL="6350" marR="6350" marT="6350" marB="0" anchor="ctr">
@@ -27246,7 +27025,7 @@
                         <a:bodyPr/>
                         <a:lstStyle/>
                         <a:p>
-                          <a:endParaRPr lang="en-US"/>
+                          <a:endParaRPr lang="he-IL"/>
                         </a:p>
                       </a:txBody>
                       <a:tcPr marL="6350" marR="6350" marT="6350" marB="0" anchor="ctr">
@@ -27626,7 +27405,7 @@
                         <a:bodyPr/>
                         <a:lstStyle/>
                         <a:p>
-                          <a:endParaRPr lang="en-US"/>
+                          <a:endParaRPr lang="he-IL"/>
                         </a:p>
                       </a:txBody>
                       <a:tcPr marL="6350" marR="6350" marT="6350" marB="0" anchor="ctr">
@@ -28022,7 +27801,7 @@
                         <a:bodyPr/>
                         <a:lstStyle/>
                         <a:p>
-                          <a:endParaRPr lang="en-US"/>
+                          <a:endParaRPr lang="he-IL"/>
                         </a:p>
                       </a:txBody>
                       <a:tcPr marL="6350" marR="6350" marT="6350" marB="0" anchor="ctr">
@@ -28402,7 +28181,7 @@
                         <a:bodyPr/>
                         <a:lstStyle/>
                         <a:p>
-                          <a:endParaRPr lang="en-US"/>
+                          <a:endParaRPr lang="he-IL"/>
                         </a:p>
                       </a:txBody>
                       <a:tcPr marL="6350" marR="6350" marT="6350" marB="0" anchor="ctr">
@@ -28785,7 +28564,7 @@
                         <a:bodyPr/>
                         <a:lstStyle/>
                         <a:p>
-                          <a:endParaRPr lang="en-US"/>
+                          <a:endParaRPr lang="he-IL"/>
                         </a:p>
                       </a:txBody>
                       <a:tcPr marL="6350" marR="6350" marT="6350" marB="0" anchor="ctr">
@@ -29202,7 +28981,7 @@
                         <a:bodyPr/>
                         <a:lstStyle/>
                         <a:p>
-                          <a:endParaRPr lang="en-US"/>
+                          <a:endParaRPr lang="he-IL"/>
                         </a:p>
                       </a:txBody>
                       <a:tcPr marL="6350" marR="6350" marT="6350" marB="0" anchor="ctr">
@@ -29582,7 +29361,7 @@
                         <a:bodyPr/>
                         <a:lstStyle/>
                         <a:p>
-                          <a:endParaRPr lang="en-US"/>
+                          <a:endParaRPr lang="he-IL"/>
                         </a:p>
                       </a:txBody>
                       <a:tcPr marL="6350" marR="6350" marT="6350" marB="0" anchor="ctr">
@@ -29965,7 +29744,7 @@
                         <a:bodyPr/>
                         <a:lstStyle/>
                         <a:p>
-                          <a:endParaRPr lang="en-US"/>
+                          <a:endParaRPr lang="he-IL"/>
                         </a:p>
                       </a:txBody>
                       <a:tcPr marL="6350" marR="6350" marT="6350" marB="0" anchor="ctr">
@@ -30369,7 +30148,7 @@
                         <a:bodyPr/>
                         <a:lstStyle/>
                         <a:p>
-                          <a:endParaRPr lang="en-US"/>
+                          <a:endParaRPr lang="he-IL"/>
                         </a:p>
                       </a:txBody>
                       <a:tcPr marL="6350" marR="6350" marT="6350" marB="0" anchor="ctr">
@@ -30777,7 +30556,7 @@
                         <a:bodyPr/>
                         <a:lstStyle/>
                         <a:p>
-                          <a:endParaRPr lang="en-US"/>
+                          <a:endParaRPr lang="he-IL"/>
                         </a:p>
                       </a:txBody>
                       <a:tcPr marL="6350" marR="6350" marT="6350" marB="0" anchor="ctr">
@@ -31176,7 +30955,7 @@
                         <a:bodyPr/>
                         <a:lstStyle/>
                         <a:p>
-                          <a:endParaRPr lang="en-US"/>
+                          <a:endParaRPr lang="he-IL"/>
                         </a:p>
                       </a:txBody>
                       <a:tcPr marL="6350" marR="6350" marT="6350" marB="0" anchor="ctr">
@@ -31580,7 +31359,7 @@
                         <a:bodyPr/>
                         <a:lstStyle/>
                         <a:p>
-                          <a:endParaRPr lang="en-US"/>
+                          <a:endParaRPr lang="he-IL"/>
                         </a:p>
                       </a:txBody>
                       <a:tcPr marL="6350" marR="6350" marT="6350" marB="0" anchor="ctr">
@@ -31984,7 +31763,7 @@
                         <a:bodyPr/>
                         <a:lstStyle/>
                         <a:p>
-                          <a:endParaRPr lang="en-US"/>
+                          <a:endParaRPr lang="he-IL"/>
                         </a:p>
                       </a:txBody>
                       <a:tcPr marL="6350" marR="6350" marT="6350" marB="0" anchor="ctr">
@@ -32394,7 +32173,7 @@
                         <a:bodyPr/>
                         <a:lstStyle/>
                         <a:p>
-                          <a:endParaRPr lang="en-US"/>
+                          <a:endParaRPr lang="he-IL"/>
                         </a:p>
                       </a:txBody>
                       <a:tcPr marL="6350" marR="6350" marT="6350" marB="0" anchor="ctr">
@@ -32769,7 +32548,7 @@
                         <a:bodyPr/>
                         <a:lstStyle/>
                         <a:p>
-                          <a:endParaRPr lang="en-US"/>
+                          <a:endParaRPr lang="he-IL"/>
                         </a:p>
                       </a:txBody>
                       <a:tcPr marL="6350" marR="6350" marT="6350" marB="0" anchor="ctr">

</xml_diff>